<commit_message>
edit poster -> add plots and text
</commit_message>
<xml_diff>
--- a/poster/poster_dm_a1.pptx
+++ b/poster/poster_dm_a1.pptx
@@ -2966,6 +2966,95 @@
           <a:chExt cx="0" cy="0"/>
         </a:xfrm>
       </p:grpSpPr>
+      <p:pic>
+        <p:nvPicPr>
+          <p:cNvPr id="27" name="Grafik 26"/>
+          <p:cNvPicPr>
+            <a:picLocks noChangeAspect="1"/>
+          </p:cNvPicPr>
+          <p:nvPr/>
+        </p:nvPicPr>
+        <p:blipFill rotWithShape="1">
+          <a:blip r:embed="rId2">
+            <a:extLst>
+              <a:ext uri="{28A0092B-C50C-407E-A947-70E740481C1C}">
+                <a14:useLocalDpi xmlns:a14="http://schemas.microsoft.com/office/drawing/2010/main" val="0"/>
+              </a:ext>
+            </a:extLst>
+          </a:blip>
+          <a:srcRect b="5028"/>
+          <a:stretch/>
+        </p:blipFill>
+        <p:spPr>
+          <a:xfrm>
+            <a:off x="11063336" y="11620279"/>
+            <a:ext cx="7881101" cy="6250925"/>
+          </a:xfrm>
+          <a:prstGeom prst="rect">
+            <a:avLst/>
+          </a:prstGeom>
+        </p:spPr>
+      </p:pic>
+      <p:pic>
+        <p:nvPicPr>
+          <p:cNvPr id="68" name="Grafik 67"/>
+          <p:cNvPicPr>
+            <a:picLocks noChangeAspect="1"/>
+          </p:cNvPicPr>
+          <p:nvPr/>
+        </p:nvPicPr>
+        <p:blipFill>
+          <a:blip r:embed="rId3">
+            <a:extLst>
+              <a:ext uri="{28A0092B-C50C-407E-A947-70E740481C1C}">
+                <a14:useLocalDpi xmlns:a14="http://schemas.microsoft.com/office/drawing/2010/main" val="0"/>
+              </a:ext>
+            </a:extLst>
+          </a:blip>
+          <a:stretch>
+            <a:fillRect/>
+          </a:stretch>
+        </p:blipFill>
+        <p:spPr>
+          <a:xfrm>
+            <a:off x="10120217" y="5205375"/>
+            <a:ext cx="5054868" cy="3167157"/>
+          </a:xfrm>
+          <a:prstGeom prst="rect">
+            <a:avLst/>
+          </a:prstGeom>
+        </p:spPr>
+      </p:pic>
+      <p:pic>
+        <p:nvPicPr>
+          <p:cNvPr id="69" name="Grafik 68"/>
+          <p:cNvPicPr>
+            <a:picLocks noChangeAspect="1"/>
+          </p:cNvPicPr>
+          <p:nvPr/>
+        </p:nvPicPr>
+        <p:blipFill>
+          <a:blip r:embed="rId4">
+            <a:extLst>
+              <a:ext uri="{28A0092B-C50C-407E-A947-70E740481C1C}">
+                <a14:useLocalDpi xmlns:a14="http://schemas.microsoft.com/office/drawing/2010/main" val="0"/>
+              </a:ext>
+            </a:extLst>
+          </a:blip>
+          <a:stretch>
+            <a:fillRect/>
+          </a:stretch>
+        </p:blipFill>
+        <p:spPr>
+          <a:xfrm>
+            <a:off x="15046028" y="5193946"/>
+            <a:ext cx="5132784" cy="3215976"/>
+          </a:xfrm>
+          <a:prstGeom prst="rect">
+            <a:avLst/>
+          </a:prstGeom>
+        </p:spPr>
+      </p:pic>
       <p:sp>
         <p:nvSpPr>
           <p:cNvPr id="5" name="Rechteck 4"/>
@@ -3165,8 +3254,8 @@
         </p:nvSpPr>
         <p:spPr>
           <a:xfrm>
-            <a:off x="720000" y="3960000"/>
-            <a:ext cx="9000000" cy="2677656"/>
+            <a:off x="720000" y="3670440"/>
+            <a:ext cx="9000000" cy="2308324"/>
           </a:xfrm>
           <a:prstGeom prst="rect">
             <a:avLst/>
@@ -3181,502 +3270,134 @@
           <a:p>
             <a:pPr algn="just"/>
             <a:r>
-              <a:rPr lang="en-US" sz="2400" dirty="0" err="1" smtClean="0"/>
-              <a:t>Sdsds</a:t>
-            </a:r>
-            <a:r>
-              <a:rPr lang="en-US" sz="2400" dirty="0" smtClean="0"/>
-              <a:t> </a:t>
-            </a:r>
-            <a:r>
-              <a:rPr lang="en-US" sz="2400" dirty="0" err="1" smtClean="0"/>
-              <a:t>dsdsdsd</a:t>
-            </a:r>
-            <a:r>
-              <a:rPr lang="en-US" sz="2400" dirty="0" smtClean="0"/>
-              <a:t> </a:t>
-            </a:r>
-            <a:r>
-              <a:rPr lang="en-US" sz="2400" dirty="0" err="1" smtClean="0"/>
-              <a:t>lask</a:t>
-            </a:r>
-            <a:r>
-              <a:rPr lang="en-US" sz="2400" dirty="0" smtClean="0"/>
-              <a:t> </a:t>
-            </a:r>
-            <a:r>
-              <a:rPr lang="en-US" sz="2400" dirty="0" err="1" smtClean="0"/>
-              <a:t>döka</a:t>
-            </a:r>
-            <a:r>
-              <a:rPr lang="en-US" sz="2400" dirty="0" smtClean="0"/>
-              <a:t>  </a:t>
-            </a:r>
-            <a:r>
-              <a:rPr lang="en-US" sz="2400" dirty="0" err="1" smtClean="0"/>
-              <a:t>ösldkö</a:t>
-            </a:r>
-            <a:r>
-              <a:rPr lang="en-US" sz="2400" dirty="0" smtClean="0"/>
-              <a:t> </a:t>
-            </a:r>
-            <a:r>
-              <a:rPr lang="en-US" sz="2400" dirty="0" err="1" smtClean="0"/>
-              <a:t>laskd</a:t>
-            </a:r>
-            <a:r>
-              <a:rPr lang="en-US" sz="2400" dirty="0" smtClean="0"/>
-              <a:t> </a:t>
-            </a:r>
-            <a:r>
-              <a:rPr lang="en-US" sz="2400" dirty="0" err="1" smtClean="0"/>
-              <a:t>öka</a:t>
-            </a:r>
-            <a:r>
-              <a:rPr lang="en-US" sz="2400" dirty="0" smtClean="0"/>
-              <a:t> </a:t>
-            </a:r>
-            <a:r>
-              <a:rPr lang="en-US" sz="2400" dirty="0" err="1" smtClean="0"/>
-              <a:t>sdölkasdöl</a:t>
-            </a:r>
-            <a:r>
-              <a:rPr lang="en-US" sz="2400" dirty="0" smtClean="0"/>
-              <a:t> </a:t>
-            </a:r>
-            <a:r>
-              <a:rPr lang="en-US" sz="2400" dirty="0" err="1" smtClean="0"/>
-              <a:t>kölas</a:t>
-            </a:r>
-            <a:r>
-              <a:rPr lang="en-US" sz="2400" dirty="0" smtClean="0"/>
-              <a:t> </a:t>
-            </a:r>
-            <a:r>
-              <a:rPr lang="en-US" sz="2400" dirty="0" err="1" smtClean="0"/>
-              <a:t>kklj</a:t>
-            </a:r>
-            <a:r>
-              <a:rPr lang="en-US" sz="2400" dirty="0" smtClean="0"/>
-              <a:t> </a:t>
-            </a:r>
-            <a:r>
-              <a:rPr lang="en-US" sz="2400" dirty="0" err="1" smtClean="0"/>
-              <a:t>kjkjasd</a:t>
-            </a:r>
-            <a:r>
-              <a:rPr lang="en-US" sz="2400" dirty="0" smtClean="0"/>
-              <a:t> </a:t>
-            </a:r>
-            <a:r>
-              <a:rPr lang="en-US" sz="2400" dirty="0" err="1" smtClean="0"/>
-              <a:t>lkjks</a:t>
-            </a:r>
-            <a:r>
-              <a:rPr lang="en-US" sz="2400" dirty="0" smtClean="0"/>
-              <a:t> </a:t>
-            </a:r>
-            <a:r>
-              <a:rPr lang="en-US" sz="2400" dirty="0" err="1" smtClean="0"/>
-              <a:t>lkjdse</a:t>
-            </a:r>
-            <a:r>
-              <a:rPr lang="en-US" sz="2400" dirty="0" smtClean="0"/>
-              <a:t> </a:t>
-            </a:r>
-            <a:r>
-              <a:rPr lang="en-US" sz="2400" dirty="0" err="1" smtClean="0"/>
-              <a:t>lkerkjasd</a:t>
-            </a:r>
-            <a:r>
-              <a:rPr lang="en-US" sz="2400" dirty="0" smtClean="0"/>
-              <a:t> </a:t>
-            </a:r>
-            <a:r>
-              <a:rPr lang="en-US" sz="2400" dirty="0" err="1" smtClean="0"/>
-              <a:t>sadlkmsd</a:t>
-            </a:r>
-            <a:r>
-              <a:rPr lang="en-US" sz="2400" dirty="0" smtClean="0"/>
-              <a:t> </a:t>
-            </a:r>
-            <a:r>
-              <a:rPr lang="en-US" sz="2400" dirty="0" err="1" smtClean="0"/>
-              <a:t>salkdjkj</a:t>
-            </a:r>
-            <a:r>
-              <a:rPr lang="en-US" sz="2400" dirty="0" smtClean="0"/>
-              <a:t> sad </a:t>
-            </a:r>
-            <a:r>
-              <a:rPr lang="en-US" sz="2400" dirty="0" err="1" smtClean="0"/>
-              <a:t>sadklkjsad</a:t>
-            </a:r>
-            <a:r>
-              <a:rPr lang="en-US" sz="2400" dirty="0" smtClean="0"/>
-              <a:t> </a:t>
-            </a:r>
-            <a:r>
-              <a:rPr lang="en-US" sz="2400" dirty="0" err="1" smtClean="0"/>
-              <a:t>klasdlkj</a:t>
-            </a:r>
-            <a:r>
-              <a:rPr lang="en-US" sz="2400" dirty="0" smtClean="0"/>
-              <a:t> </a:t>
-            </a:r>
-            <a:r>
-              <a:rPr lang="en-US" sz="2400" dirty="0" err="1" smtClean="0"/>
-              <a:t>asdkjl</a:t>
-            </a:r>
-            <a:r>
-              <a:rPr lang="en-US" sz="2400" dirty="0" smtClean="0"/>
-              <a:t>  </a:t>
-            </a:r>
-            <a:r>
-              <a:rPr lang="en-US" sz="2400" dirty="0" err="1" smtClean="0"/>
-              <a:t>kas</a:t>
-            </a:r>
-            <a:r>
-              <a:rPr lang="en-US" sz="2400" dirty="0" smtClean="0"/>
-              <a:t> </a:t>
-            </a:r>
-            <a:r>
-              <a:rPr lang="en-US" sz="2400" dirty="0" err="1" smtClean="0"/>
-              <a:t>jdklsa</a:t>
-            </a:r>
-            <a:r>
-              <a:rPr lang="en-US" sz="2400" dirty="0" smtClean="0"/>
-              <a:t> </a:t>
-            </a:r>
-            <a:r>
-              <a:rPr lang="en-US" sz="2400" dirty="0" err="1" smtClean="0"/>
-              <a:t>klasjdkjasdlkj</a:t>
-            </a:r>
-            <a:r>
-              <a:rPr lang="en-US" sz="2400" dirty="0" smtClean="0"/>
-              <a:t> </a:t>
-            </a:r>
-            <a:r>
-              <a:rPr lang="en-US" sz="2400" dirty="0" err="1" smtClean="0"/>
-              <a:t>dsadk</a:t>
-            </a:r>
-            <a:r>
-              <a:rPr lang="en-US" sz="2400" dirty="0" smtClean="0"/>
-              <a:t> </a:t>
-            </a:r>
-            <a:r>
-              <a:rPr lang="en-US" sz="2400" dirty="0" err="1" smtClean="0"/>
-              <a:t>lkasdjlaksjd</a:t>
-            </a:r>
-            <a:r>
-              <a:rPr lang="en-US" sz="2400" dirty="0" smtClean="0"/>
-              <a:t> </a:t>
-            </a:r>
-            <a:r>
-              <a:rPr lang="en-US" sz="2400" dirty="0" err="1" smtClean="0"/>
-              <a:t>Sdsds</a:t>
-            </a:r>
-            <a:r>
-              <a:rPr lang="en-US" sz="2400" dirty="0" smtClean="0"/>
-              <a:t> </a:t>
-            </a:r>
-            <a:r>
-              <a:rPr lang="en-US" sz="2400" dirty="0" err="1" smtClean="0"/>
-              <a:t>dsdsdsd</a:t>
-            </a:r>
-            <a:r>
-              <a:rPr lang="en-US" sz="2400" dirty="0" smtClean="0"/>
-              <a:t> </a:t>
-            </a:r>
-            <a:r>
-              <a:rPr lang="en-US" sz="2400" dirty="0" err="1" smtClean="0"/>
-              <a:t>lask</a:t>
-            </a:r>
-            <a:r>
-              <a:rPr lang="en-US" sz="2400" dirty="0" smtClean="0"/>
-              <a:t> </a:t>
-            </a:r>
-            <a:r>
-              <a:rPr lang="en-US" sz="2400" dirty="0" err="1" smtClean="0"/>
-              <a:t>döka</a:t>
-            </a:r>
-            <a:r>
-              <a:rPr lang="en-US" sz="2400" dirty="0" smtClean="0"/>
-              <a:t>  </a:t>
-            </a:r>
-            <a:r>
-              <a:rPr lang="en-US" sz="2400" dirty="0" err="1" smtClean="0"/>
-              <a:t>ösldkö</a:t>
-            </a:r>
-            <a:r>
-              <a:rPr lang="en-US" sz="2400" dirty="0" smtClean="0"/>
-              <a:t> </a:t>
-            </a:r>
-            <a:r>
-              <a:rPr lang="en-US" sz="2400" dirty="0" err="1" smtClean="0"/>
-              <a:t>laskd</a:t>
-            </a:r>
-            <a:r>
-              <a:rPr lang="en-US" sz="2400" dirty="0" smtClean="0"/>
-              <a:t> </a:t>
-            </a:r>
-            <a:r>
-              <a:rPr lang="en-US" sz="2400" dirty="0" err="1" smtClean="0"/>
-              <a:t>öka</a:t>
-            </a:r>
-            <a:r>
-              <a:rPr lang="en-US" sz="2400" dirty="0" smtClean="0"/>
-              <a:t> </a:t>
-            </a:r>
-            <a:r>
-              <a:rPr lang="en-US" sz="2400" dirty="0" err="1" smtClean="0"/>
-              <a:t>sdölkasdöl</a:t>
-            </a:r>
-            <a:r>
-              <a:rPr lang="en-US" sz="2400" dirty="0" smtClean="0"/>
-              <a:t> </a:t>
-            </a:r>
-            <a:r>
-              <a:rPr lang="en-US" sz="2400" dirty="0" err="1" smtClean="0"/>
-              <a:t>kölas</a:t>
-            </a:r>
-            <a:r>
-              <a:rPr lang="en-US" sz="2400" dirty="0" smtClean="0"/>
-              <a:t> </a:t>
-            </a:r>
-            <a:r>
-              <a:rPr lang="en-US" sz="2400" dirty="0" err="1" smtClean="0"/>
-              <a:t>kklj</a:t>
-            </a:r>
-            <a:r>
-              <a:rPr lang="en-US" sz="2400" dirty="0" smtClean="0"/>
-              <a:t> </a:t>
-            </a:r>
-            <a:r>
-              <a:rPr lang="en-US" sz="2400" dirty="0" err="1" smtClean="0"/>
-              <a:t>kjkjasd</a:t>
-            </a:r>
-            <a:r>
-              <a:rPr lang="en-US" sz="2400" dirty="0" smtClean="0"/>
-              <a:t> </a:t>
-            </a:r>
-            <a:r>
-              <a:rPr lang="en-US" sz="2400" dirty="0" err="1" smtClean="0"/>
-              <a:t>lkjks</a:t>
-            </a:r>
-            <a:r>
-              <a:rPr lang="en-US" sz="2400" dirty="0" smtClean="0"/>
-              <a:t> </a:t>
-            </a:r>
-            <a:r>
-              <a:rPr lang="en-US" sz="2400" dirty="0" err="1" smtClean="0"/>
-              <a:t>lkjdse</a:t>
-            </a:r>
-            <a:r>
-              <a:rPr lang="en-US" sz="2400" dirty="0" smtClean="0"/>
-              <a:t> </a:t>
-            </a:r>
-            <a:r>
-              <a:rPr lang="en-US" sz="2400" dirty="0" err="1" smtClean="0"/>
-              <a:t>lkerkjasd</a:t>
-            </a:r>
-            <a:r>
-              <a:rPr lang="en-US" sz="2400" dirty="0" smtClean="0"/>
-              <a:t> </a:t>
-            </a:r>
-            <a:r>
-              <a:rPr lang="en-US" sz="2400" dirty="0" err="1" smtClean="0"/>
-              <a:t>sadlkmsd</a:t>
-            </a:r>
-            <a:r>
-              <a:rPr lang="en-US" sz="2400" dirty="0" smtClean="0"/>
-              <a:t> </a:t>
-            </a:r>
-            <a:r>
-              <a:rPr lang="en-US" sz="2400" dirty="0" err="1" smtClean="0"/>
-              <a:t>salkdjkj</a:t>
-            </a:r>
-            <a:r>
-              <a:rPr lang="en-US" sz="2400" dirty="0" smtClean="0"/>
-              <a:t> sad </a:t>
-            </a:r>
-            <a:r>
-              <a:rPr lang="en-US" sz="2400" dirty="0" err="1" smtClean="0"/>
-              <a:t>sadklkjsad</a:t>
-            </a:r>
-            <a:r>
-              <a:rPr lang="en-US" sz="2400" dirty="0" smtClean="0"/>
-              <a:t> </a:t>
-            </a:r>
-            <a:r>
-              <a:rPr lang="en-US" sz="2400" dirty="0" err="1" smtClean="0"/>
-              <a:t>klasdlkj</a:t>
-            </a:r>
-            <a:r>
-              <a:rPr lang="en-US" sz="2400" dirty="0" smtClean="0"/>
-              <a:t> </a:t>
-            </a:r>
-            <a:r>
-              <a:rPr lang="en-US" sz="2400" dirty="0" err="1" smtClean="0"/>
-              <a:t>asdkjl</a:t>
-            </a:r>
-            <a:r>
-              <a:rPr lang="en-US" sz="2400" dirty="0" smtClean="0"/>
-              <a:t>  </a:t>
-            </a:r>
-            <a:r>
-              <a:rPr lang="en-US" sz="2400" dirty="0" err="1" smtClean="0"/>
-              <a:t>kas</a:t>
-            </a:r>
-            <a:r>
-              <a:rPr lang="en-US" sz="2400" dirty="0" smtClean="0"/>
-              <a:t> </a:t>
-            </a:r>
-            <a:r>
-              <a:rPr lang="en-US" sz="2400" dirty="0" err="1" smtClean="0"/>
-              <a:t>jdklsa</a:t>
-            </a:r>
-            <a:r>
-              <a:rPr lang="en-US" sz="2400" dirty="0" smtClean="0"/>
-              <a:t> </a:t>
-            </a:r>
-            <a:r>
-              <a:rPr lang="en-US" sz="2400" dirty="0" err="1" smtClean="0"/>
-              <a:t>klasjdkjasdlkj</a:t>
-            </a:r>
-            <a:r>
-              <a:rPr lang="en-US" sz="2400" dirty="0" smtClean="0"/>
-              <a:t> </a:t>
-            </a:r>
-            <a:r>
-              <a:rPr lang="en-US" sz="2400" dirty="0" err="1" smtClean="0"/>
-              <a:t>dsadk</a:t>
-            </a:r>
-            <a:r>
-              <a:rPr lang="en-US" sz="2400" dirty="0" smtClean="0"/>
-              <a:t> </a:t>
-            </a:r>
-            <a:r>
-              <a:rPr lang="en-US" sz="2400" dirty="0" err="1" smtClean="0"/>
-              <a:t>lkasdjlaksjd</a:t>
-            </a:r>
-            <a:r>
-              <a:rPr lang="en-US" sz="2400" dirty="0" smtClean="0"/>
-              <a:t> </a:t>
-            </a:r>
-          </a:p>
-          <a:p>
-            <a:pPr algn="just"/>
+              <a:rPr lang="en-US" sz="2400" dirty="0" smtClean="0"/>
+              <a:t>The Internet has become more and more a platform for user-generated content. Especially the movie industry is interesting for many users and there are different platforms which offer exchange of information about movies or rating systems, e.g. IMDb. The aim of this project is to use this user generated-content to build a recommender system and to figure out which factors lead to a good user rating. </a:t>
+            </a:r>
             <a:endParaRPr lang="en-US" sz="2400" dirty="0"/>
           </a:p>
         </p:txBody>
       </p:sp>
-      <p:sp>
-        <p:nvSpPr>
-          <p:cNvPr id="14" name="Rechteck 13"/>
-          <p:cNvSpPr/>
+      <p:grpSp>
+        <p:nvGrpSpPr>
+          <p:cNvPr id="60" name="Gruppieren 59"/>
+          <p:cNvGrpSpPr/>
           <p:nvPr/>
-        </p:nvSpPr>
-        <p:spPr>
+        </p:nvGrpSpPr>
+        <p:grpSpPr>
           <a:xfrm>
-            <a:off x="720000" y="7200000"/>
-            <a:ext cx="720000" cy="720000"/>
+            <a:off x="720000" y="6259919"/>
+            <a:ext cx="6120000" cy="720000"/>
+            <a:chOff x="720000" y="7200000"/>
+            <a:chExt cx="6120000" cy="720000"/>
           </a:xfrm>
-          <a:prstGeom prst="rect">
-            <a:avLst/>
-          </a:prstGeom>
-          <a:solidFill>
-            <a:schemeClr val="bg1">
-              <a:lumMod val="85000"/>
-            </a:schemeClr>
-          </a:solidFill>
-          <a:ln>
-            <a:noFill/>
-          </a:ln>
-        </p:spPr>
-        <p:style>
-          <a:lnRef idx="2">
-            <a:schemeClr val="accent3">
-              <a:shade val="50000"/>
-            </a:schemeClr>
-          </a:lnRef>
-          <a:fillRef idx="1">
-            <a:schemeClr val="accent3"/>
-          </a:fillRef>
-          <a:effectRef idx="0">
-            <a:schemeClr val="accent3"/>
-          </a:effectRef>
-          <a:fontRef idx="minor">
-            <a:schemeClr val="lt1"/>
-          </a:fontRef>
-        </p:style>
-        <p:txBody>
-          <a:bodyPr rtlCol="0" anchor="ctr"/>
-          <a:lstStyle/>
-          <a:p>
-            <a:pPr algn="ctr"/>
-            <a:endParaRPr lang="en-US"/>
-          </a:p>
-        </p:txBody>
-      </p:sp>
-      <p:sp>
-        <p:nvSpPr>
-          <p:cNvPr id="15" name="Rechteck 14"/>
-          <p:cNvSpPr/>
-          <p:nvPr/>
-        </p:nvSpPr>
-        <p:spPr>
-          <a:xfrm>
-            <a:off x="1800000" y="7200000"/>
-            <a:ext cx="5040000" cy="720000"/>
-          </a:xfrm>
-          <a:prstGeom prst="rect">
-            <a:avLst/>
-          </a:prstGeom>
-          <a:solidFill>
-            <a:schemeClr val="bg1">
-              <a:lumMod val="50000"/>
-            </a:schemeClr>
-          </a:solidFill>
-          <a:ln>
-            <a:noFill/>
-          </a:ln>
-        </p:spPr>
-        <p:style>
-          <a:lnRef idx="2">
-            <a:schemeClr val="accent1">
-              <a:shade val="50000"/>
-            </a:schemeClr>
-          </a:lnRef>
-          <a:fillRef idx="1">
-            <a:schemeClr val="accent1"/>
-          </a:fillRef>
-          <a:effectRef idx="0">
-            <a:schemeClr val="accent1"/>
-          </a:effectRef>
-          <a:fontRef idx="minor">
-            <a:schemeClr val="lt1"/>
-          </a:fontRef>
-        </p:style>
-        <p:txBody>
-          <a:bodyPr rtlCol="0" anchor="ctr"/>
-          <a:lstStyle/>
-          <a:p>
-            <a:pPr algn="ctr"/>
-            <a:r>
-              <a:rPr lang="en-US" sz="3600" dirty="0" smtClean="0">
+        </p:grpSpPr>
+        <p:sp>
+          <p:nvSpPr>
+            <p:cNvPr id="14" name="Rechteck 13"/>
+            <p:cNvSpPr/>
+            <p:nvPr/>
+          </p:nvSpPr>
+          <p:spPr>
+            <a:xfrm>
+              <a:off x="720000" y="7200000"/>
+              <a:ext cx="720000" cy="720000"/>
+            </a:xfrm>
+            <a:prstGeom prst="rect">
+              <a:avLst/>
+            </a:prstGeom>
+            <a:solidFill>
+              <a:schemeClr val="bg1">
+                <a:lumMod val="85000"/>
+              </a:schemeClr>
+            </a:solidFill>
+            <a:ln>
+              <a:noFill/>
+            </a:ln>
+          </p:spPr>
+          <p:style>
+            <a:lnRef idx="2">
+              <a:schemeClr val="accent3">
+                <a:shade val="50000"/>
+              </a:schemeClr>
+            </a:lnRef>
+            <a:fillRef idx="1">
+              <a:schemeClr val="accent3"/>
+            </a:fillRef>
+            <a:effectRef idx="0">
+              <a:schemeClr val="accent3"/>
+            </a:effectRef>
+            <a:fontRef idx="minor">
+              <a:schemeClr val="lt1"/>
+            </a:fontRef>
+          </p:style>
+          <p:txBody>
+            <a:bodyPr rtlCol="0" anchor="ctr"/>
+            <a:lstStyle/>
+            <a:p>
+              <a:pPr algn="ctr"/>
+              <a:endParaRPr lang="en-US"/>
+            </a:p>
+          </p:txBody>
+        </p:sp>
+        <p:sp>
+          <p:nvSpPr>
+            <p:cNvPr id="15" name="Rechteck 14"/>
+            <p:cNvSpPr/>
+            <p:nvPr/>
+          </p:nvSpPr>
+          <p:spPr>
+            <a:xfrm>
+              <a:off x="1800000" y="7200000"/>
+              <a:ext cx="5040000" cy="720000"/>
+            </a:xfrm>
+            <a:prstGeom prst="rect">
+              <a:avLst/>
+            </a:prstGeom>
+            <a:solidFill>
+              <a:schemeClr val="bg1">
+                <a:lumMod val="50000"/>
+              </a:schemeClr>
+            </a:solidFill>
+            <a:ln>
+              <a:noFill/>
+            </a:ln>
+          </p:spPr>
+          <p:style>
+            <a:lnRef idx="2">
+              <a:schemeClr val="accent1">
+                <a:shade val="50000"/>
+              </a:schemeClr>
+            </a:lnRef>
+            <a:fillRef idx="1">
+              <a:schemeClr val="accent1"/>
+            </a:fillRef>
+            <a:effectRef idx="0">
+              <a:schemeClr val="accent1"/>
+            </a:effectRef>
+            <a:fontRef idx="minor">
+              <a:schemeClr val="lt1"/>
+            </a:fontRef>
+          </p:style>
+          <p:txBody>
+            <a:bodyPr rtlCol="0" anchor="ctr"/>
+            <a:lstStyle/>
+            <a:p>
+              <a:pPr algn="ctr"/>
+              <a:r>
+                <a:rPr lang="en-US" sz="3600" dirty="0" smtClean="0">
+                  <a:latin typeface="Franklin Gothic Medium" panose="020B0603020102020204" pitchFamily="34" charset="0"/>
+                  <a:cs typeface="Aharoni" panose="02010803020104030203" pitchFamily="2" charset="-79"/>
+                </a:rPr>
+                <a:t>Data</a:t>
+              </a:r>
+              <a:endParaRPr lang="en-US" sz="3600" b="1" dirty="0">
                 <a:latin typeface="Franklin Gothic Medium" panose="020B0603020102020204" pitchFamily="34" charset="0"/>
                 <a:cs typeface="Aharoni" panose="02010803020104030203" pitchFamily="2" charset="-79"/>
-              </a:rPr>
-              <a:t>Data</a:t>
-            </a:r>
-            <a:endParaRPr lang="en-US" sz="3600" b="1" dirty="0">
-              <a:latin typeface="Franklin Gothic Medium" panose="020B0603020102020204" pitchFamily="34" charset="0"/>
-              <a:cs typeface="Aharoni" panose="02010803020104030203" pitchFamily="2" charset="-79"/>
-            </a:endParaRPr>
-          </a:p>
-        </p:txBody>
-      </p:sp>
+              </a:endParaRPr>
+            </a:p>
+          </p:txBody>
+        </p:sp>
+      </p:grpSp>
       <p:cxnSp>
         <p:nvCxnSpPr>
           <p:cNvPr id="17" name="Gerader Verbinder 16"/>
@@ -3714,30 +3435,6 @@
           </a:fontRef>
         </p:style>
       </p:cxnSp>
-      <p:pic>
-        <p:nvPicPr>
-          <p:cNvPr id="18" name="Grafik 17"/>
-          <p:cNvPicPr>
-            <a:picLocks noChangeAspect="1"/>
-          </p:cNvPicPr>
-          <p:nvPr/>
-        </p:nvPicPr>
-        <p:blipFill>
-          <a:blip r:embed="rId2"/>
-          <a:stretch>
-            <a:fillRect/>
-          </a:stretch>
-        </p:blipFill>
-        <p:spPr>
-          <a:xfrm>
-            <a:off x="800810" y="11510519"/>
-            <a:ext cx="9217362" cy="4939522"/>
-          </a:xfrm>
-          <a:prstGeom prst="rect">
-            <a:avLst/>
-          </a:prstGeom>
-        </p:spPr>
-      </p:pic>
       <p:sp>
         <p:nvSpPr>
           <p:cNvPr id="20" name="Textfeld 19"/>
@@ -3746,8 +3443,8 @@
         </p:nvSpPr>
         <p:spPr>
           <a:xfrm>
-            <a:off x="720000" y="8286344"/>
-            <a:ext cx="9000000" cy="3785652"/>
+            <a:off x="720000" y="7085250"/>
+            <a:ext cx="9000000" cy="3046988"/>
           </a:xfrm>
           <a:prstGeom prst="rect">
             <a:avLst/>
@@ -3762,549 +3459,85 @@
           <a:p>
             <a:pPr algn="just"/>
             <a:r>
-              <a:rPr lang="en-US" sz="2400" dirty="0" err="1" smtClean="0"/>
-              <a:t>Sdsds</a:t>
-            </a:r>
-            <a:r>
-              <a:rPr lang="en-US" sz="2400" dirty="0" smtClean="0"/>
-              <a:t> </a:t>
-            </a:r>
-            <a:r>
-              <a:rPr lang="en-US" sz="2400" dirty="0" err="1" smtClean="0"/>
-              <a:t>dsdsdsd</a:t>
-            </a:r>
-            <a:r>
-              <a:rPr lang="en-US" sz="2400" dirty="0" smtClean="0"/>
-              <a:t> </a:t>
-            </a:r>
-            <a:r>
-              <a:rPr lang="en-US" sz="2400" dirty="0" err="1" smtClean="0"/>
-              <a:t>lask</a:t>
-            </a:r>
-            <a:r>
-              <a:rPr lang="en-US" sz="2400" dirty="0" smtClean="0"/>
-              <a:t> </a:t>
-            </a:r>
-            <a:r>
-              <a:rPr lang="en-US" sz="2400" dirty="0" err="1" smtClean="0"/>
-              <a:t>döka</a:t>
-            </a:r>
-            <a:r>
-              <a:rPr lang="en-US" sz="2400" dirty="0" smtClean="0"/>
-              <a:t>  </a:t>
-            </a:r>
-            <a:r>
-              <a:rPr lang="en-US" sz="2400" dirty="0" err="1" smtClean="0"/>
-              <a:t>ösldkö</a:t>
-            </a:r>
-            <a:r>
-              <a:rPr lang="en-US" sz="2400" dirty="0" smtClean="0"/>
-              <a:t> </a:t>
-            </a:r>
-            <a:r>
-              <a:rPr lang="en-US" sz="2400" dirty="0" err="1" smtClean="0"/>
-              <a:t>laskd</a:t>
-            </a:r>
-            <a:r>
-              <a:rPr lang="en-US" sz="2400" dirty="0" smtClean="0"/>
-              <a:t> </a:t>
-            </a:r>
-            <a:r>
-              <a:rPr lang="en-US" sz="2400" dirty="0" err="1" smtClean="0"/>
-              <a:t>öka</a:t>
-            </a:r>
-            <a:r>
-              <a:rPr lang="en-US" sz="2400" dirty="0" smtClean="0"/>
-              <a:t> </a:t>
-            </a:r>
-            <a:r>
-              <a:rPr lang="en-US" sz="2400" dirty="0" err="1" smtClean="0"/>
-              <a:t>sdölkasdöl</a:t>
-            </a:r>
-            <a:r>
-              <a:rPr lang="en-US" sz="2400" dirty="0" smtClean="0"/>
-              <a:t> </a:t>
-            </a:r>
-            <a:r>
-              <a:rPr lang="en-US" sz="2400" dirty="0" err="1" smtClean="0"/>
-              <a:t>kölas</a:t>
-            </a:r>
-            <a:r>
-              <a:rPr lang="en-US" sz="2400" dirty="0" smtClean="0"/>
-              <a:t> </a:t>
-            </a:r>
-            <a:r>
-              <a:rPr lang="en-US" sz="2400" dirty="0" err="1" smtClean="0"/>
-              <a:t>kklj</a:t>
-            </a:r>
-            <a:r>
-              <a:rPr lang="en-US" sz="2400" dirty="0" smtClean="0"/>
-              <a:t> </a:t>
-            </a:r>
-            <a:r>
-              <a:rPr lang="en-US" sz="2400" dirty="0" err="1" smtClean="0"/>
-              <a:t>kjkjasd</a:t>
-            </a:r>
-            <a:r>
-              <a:rPr lang="en-US" sz="2400" dirty="0" smtClean="0"/>
-              <a:t> </a:t>
-            </a:r>
-            <a:r>
-              <a:rPr lang="en-US" sz="2400" dirty="0" err="1" smtClean="0"/>
-              <a:t>lkjks</a:t>
-            </a:r>
-            <a:r>
-              <a:rPr lang="en-US" sz="2400" dirty="0" smtClean="0"/>
-              <a:t> </a:t>
-            </a:r>
-            <a:r>
-              <a:rPr lang="en-US" sz="2400" dirty="0" err="1" smtClean="0"/>
-              <a:t>lkjdse</a:t>
-            </a:r>
-            <a:r>
-              <a:rPr lang="en-US" sz="2400" dirty="0" smtClean="0"/>
-              <a:t> </a:t>
-            </a:r>
-            <a:r>
-              <a:rPr lang="en-US" sz="2400" dirty="0" err="1" smtClean="0"/>
-              <a:t>lkerkjasd</a:t>
-            </a:r>
-            <a:r>
-              <a:rPr lang="en-US" sz="2400" dirty="0" smtClean="0"/>
-              <a:t> </a:t>
-            </a:r>
-            <a:r>
-              <a:rPr lang="en-US" sz="2400" dirty="0" err="1" smtClean="0"/>
-              <a:t>sadlkmsd</a:t>
-            </a:r>
-            <a:r>
-              <a:rPr lang="en-US" sz="2400" dirty="0" smtClean="0"/>
-              <a:t> </a:t>
-            </a:r>
-            <a:r>
-              <a:rPr lang="en-US" sz="2400" dirty="0" err="1" smtClean="0"/>
-              <a:t>salkdjkj</a:t>
-            </a:r>
-            <a:r>
-              <a:rPr lang="en-US" sz="2400" dirty="0" smtClean="0"/>
-              <a:t> sad </a:t>
-            </a:r>
-            <a:r>
-              <a:rPr lang="en-US" sz="2400" dirty="0" err="1" smtClean="0"/>
-              <a:t>sadklkjsad</a:t>
-            </a:r>
-            <a:r>
-              <a:rPr lang="en-US" sz="2400" dirty="0" smtClean="0"/>
-              <a:t> </a:t>
-            </a:r>
-            <a:r>
-              <a:rPr lang="en-US" sz="2400" dirty="0" err="1" smtClean="0"/>
-              <a:t>klasdlkj</a:t>
-            </a:r>
-            <a:r>
-              <a:rPr lang="en-US" sz="2400" dirty="0" smtClean="0"/>
-              <a:t> </a:t>
-            </a:r>
-            <a:r>
-              <a:rPr lang="en-US" sz="2400" dirty="0" err="1" smtClean="0"/>
-              <a:t>asdkjl</a:t>
-            </a:r>
-            <a:r>
-              <a:rPr lang="en-US" sz="2400" dirty="0" smtClean="0"/>
-              <a:t>  </a:t>
-            </a:r>
-            <a:r>
-              <a:rPr lang="en-US" sz="2400" dirty="0" err="1" smtClean="0"/>
-              <a:t>kas</a:t>
-            </a:r>
-            <a:r>
-              <a:rPr lang="en-US" sz="2400" dirty="0" smtClean="0"/>
-              <a:t> </a:t>
-            </a:r>
-            <a:r>
-              <a:rPr lang="en-US" sz="2400" dirty="0" err="1" smtClean="0"/>
-              <a:t>jdklsa</a:t>
-            </a:r>
-            <a:r>
-              <a:rPr lang="en-US" sz="2400" dirty="0" smtClean="0"/>
-              <a:t> </a:t>
-            </a:r>
-            <a:r>
-              <a:rPr lang="en-US" sz="2400" dirty="0" err="1" smtClean="0"/>
-              <a:t>klasjdkjasdlkj</a:t>
-            </a:r>
-            <a:r>
-              <a:rPr lang="en-US" sz="2400" dirty="0" smtClean="0"/>
-              <a:t> </a:t>
-            </a:r>
-            <a:r>
-              <a:rPr lang="en-US" sz="2400" dirty="0" err="1" smtClean="0"/>
-              <a:t>dsadk</a:t>
-            </a:r>
-            <a:r>
-              <a:rPr lang="en-US" sz="2400" dirty="0" smtClean="0"/>
-              <a:t> </a:t>
-            </a:r>
-            <a:r>
-              <a:rPr lang="en-US" sz="2400" dirty="0" err="1" smtClean="0"/>
-              <a:t>lkasdjlaksjd</a:t>
-            </a:r>
-            <a:r>
-              <a:rPr lang="en-US" sz="2400" dirty="0" smtClean="0"/>
-              <a:t> </a:t>
-            </a:r>
-            <a:r>
-              <a:rPr lang="en-US" sz="2400" dirty="0" err="1" smtClean="0"/>
-              <a:t>Sdsds</a:t>
-            </a:r>
-            <a:r>
-              <a:rPr lang="en-US" sz="2400" dirty="0" smtClean="0"/>
-              <a:t> </a:t>
-            </a:r>
-            <a:r>
-              <a:rPr lang="en-US" sz="2400" dirty="0" err="1" smtClean="0"/>
-              <a:t>dsdsdsd</a:t>
-            </a:r>
-            <a:r>
-              <a:rPr lang="en-US" sz="2400" dirty="0" smtClean="0"/>
-              <a:t> </a:t>
-            </a:r>
-            <a:r>
-              <a:rPr lang="en-US" sz="2400" dirty="0" err="1" smtClean="0"/>
-              <a:t>lask</a:t>
-            </a:r>
-            <a:r>
-              <a:rPr lang="en-US" sz="2400" dirty="0" smtClean="0"/>
-              <a:t> </a:t>
-            </a:r>
-            <a:r>
-              <a:rPr lang="en-US" sz="2400" dirty="0" err="1" smtClean="0"/>
-              <a:t>döka</a:t>
-            </a:r>
-            <a:r>
-              <a:rPr lang="en-US" sz="2400" dirty="0" smtClean="0"/>
-              <a:t>  </a:t>
-            </a:r>
-            <a:r>
-              <a:rPr lang="en-US" sz="2400" dirty="0" err="1" smtClean="0"/>
-              <a:t>ösldkö</a:t>
-            </a:r>
-            <a:r>
-              <a:rPr lang="en-US" sz="2400" dirty="0" smtClean="0"/>
-              <a:t> </a:t>
-            </a:r>
-            <a:r>
-              <a:rPr lang="en-US" sz="2400" dirty="0" err="1" smtClean="0"/>
-              <a:t>laskd</a:t>
-            </a:r>
-            <a:r>
-              <a:rPr lang="en-US" sz="2400" dirty="0" smtClean="0"/>
-              <a:t> </a:t>
-            </a:r>
-            <a:r>
-              <a:rPr lang="en-US" sz="2400" dirty="0" err="1" smtClean="0"/>
-              <a:t>öka</a:t>
-            </a:r>
-            <a:r>
-              <a:rPr lang="en-US" sz="2400" dirty="0" smtClean="0"/>
-              <a:t> </a:t>
-            </a:r>
-            <a:r>
-              <a:rPr lang="en-US" sz="2400" dirty="0" err="1" smtClean="0"/>
-              <a:t>sdölkasdöl</a:t>
-            </a:r>
-            <a:r>
-              <a:rPr lang="en-US" sz="2400" dirty="0" smtClean="0"/>
-              <a:t> </a:t>
-            </a:r>
-            <a:r>
-              <a:rPr lang="en-US" sz="2400" dirty="0" err="1" smtClean="0"/>
-              <a:t>kölas</a:t>
-            </a:r>
-            <a:r>
-              <a:rPr lang="en-US" sz="2400" dirty="0" smtClean="0"/>
-              <a:t> </a:t>
-            </a:r>
-            <a:r>
-              <a:rPr lang="en-US" sz="2400" dirty="0" err="1" smtClean="0"/>
-              <a:t>kklj</a:t>
-            </a:r>
-            <a:r>
-              <a:rPr lang="en-US" sz="2400" dirty="0" smtClean="0"/>
-              <a:t> </a:t>
-            </a:r>
-            <a:r>
-              <a:rPr lang="en-US" sz="2400" dirty="0" err="1" smtClean="0"/>
-              <a:t>kjkjasd</a:t>
-            </a:r>
-            <a:r>
-              <a:rPr lang="en-US" sz="2400" dirty="0" smtClean="0"/>
-              <a:t> </a:t>
-            </a:r>
-            <a:r>
-              <a:rPr lang="en-US" sz="2400" dirty="0" err="1" smtClean="0"/>
-              <a:t>lkjks</a:t>
-            </a:r>
-            <a:r>
-              <a:rPr lang="en-US" sz="2400" dirty="0" smtClean="0"/>
-              <a:t> </a:t>
-            </a:r>
-            <a:r>
-              <a:rPr lang="en-US" sz="2400" dirty="0" err="1" smtClean="0"/>
-              <a:t>lkjdse</a:t>
-            </a:r>
-            <a:r>
-              <a:rPr lang="en-US" sz="2400" dirty="0" smtClean="0"/>
-              <a:t> </a:t>
-            </a:r>
-            <a:r>
-              <a:rPr lang="en-US" sz="2400" dirty="0" err="1" smtClean="0"/>
-              <a:t>lkerkjasd</a:t>
-            </a:r>
-            <a:r>
-              <a:rPr lang="en-US" sz="2400" dirty="0" smtClean="0"/>
-              <a:t> </a:t>
-            </a:r>
-            <a:r>
-              <a:rPr lang="en-US" sz="2400" dirty="0" err="1" smtClean="0"/>
-              <a:t>sadlkmsd</a:t>
-            </a:r>
-            <a:r>
-              <a:rPr lang="en-US" sz="2400" dirty="0" smtClean="0"/>
-              <a:t> </a:t>
-            </a:r>
-            <a:r>
-              <a:rPr lang="en-US" sz="2400" dirty="0" err="1" smtClean="0"/>
-              <a:t>salkdjkj</a:t>
-            </a:r>
-            <a:r>
-              <a:rPr lang="en-US" sz="2400" dirty="0" smtClean="0"/>
-              <a:t> sad </a:t>
-            </a:r>
-            <a:r>
-              <a:rPr lang="en-US" sz="2400" dirty="0" err="1" smtClean="0"/>
-              <a:t>sadklkjsad</a:t>
-            </a:r>
-            <a:r>
-              <a:rPr lang="en-US" sz="2400" dirty="0" smtClean="0"/>
-              <a:t> </a:t>
-            </a:r>
-            <a:r>
-              <a:rPr lang="en-US" sz="2400" dirty="0" err="1" smtClean="0"/>
-              <a:t>klasdlkj</a:t>
-            </a:r>
-            <a:r>
-              <a:rPr lang="en-US" sz="2400" dirty="0" smtClean="0"/>
-              <a:t> </a:t>
-            </a:r>
-            <a:r>
-              <a:rPr lang="en-US" sz="2400" dirty="0" err="1" smtClean="0"/>
-              <a:t>asdkjl</a:t>
-            </a:r>
-            <a:r>
-              <a:rPr lang="en-US" sz="2400" dirty="0" smtClean="0"/>
-              <a:t>  </a:t>
-            </a:r>
-            <a:r>
-              <a:rPr lang="en-US" sz="2400" dirty="0" err="1" smtClean="0"/>
-              <a:t>kas</a:t>
-            </a:r>
-            <a:r>
-              <a:rPr lang="en-US" sz="2400" dirty="0" smtClean="0"/>
-              <a:t> </a:t>
-            </a:r>
-            <a:r>
-              <a:rPr lang="en-US" sz="2400" dirty="0" err="1" smtClean="0"/>
-              <a:t>jdklsa</a:t>
-            </a:r>
-            <a:r>
-              <a:rPr lang="en-US" sz="2400" dirty="0" smtClean="0"/>
-              <a:t> </a:t>
-            </a:r>
-            <a:r>
-              <a:rPr lang="en-US" sz="2400" dirty="0" err="1" smtClean="0"/>
-              <a:t>klasjdkjasdlkj</a:t>
-            </a:r>
-            <a:r>
-              <a:rPr lang="en-US" sz="2400" dirty="0" smtClean="0"/>
-              <a:t> </a:t>
-            </a:r>
-            <a:r>
-              <a:rPr lang="en-US" sz="2400" dirty="0" err="1" smtClean="0"/>
-              <a:t>dsadk</a:t>
-            </a:r>
-            <a:r>
-              <a:rPr lang="en-US" sz="2400" dirty="0" smtClean="0"/>
-              <a:t> </a:t>
-            </a:r>
-            <a:r>
-              <a:rPr lang="en-US" sz="2400" dirty="0" err="1" smtClean="0"/>
-              <a:t>lkasdjlaksjd</a:t>
-            </a:r>
-            <a:r>
-              <a:rPr lang="en-US" sz="2400" dirty="0" smtClean="0"/>
-              <a:t> </a:t>
-            </a:r>
-            <a:r>
-              <a:rPr lang="en-US" sz="2400" dirty="0" err="1" smtClean="0"/>
-              <a:t>laskd</a:t>
-            </a:r>
-            <a:r>
-              <a:rPr lang="en-US" sz="2400" dirty="0" smtClean="0"/>
-              <a:t> </a:t>
-            </a:r>
-            <a:r>
-              <a:rPr lang="en-US" sz="2400" dirty="0" err="1" smtClean="0"/>
-              <a:t>öka</a:t>
-            </a:r>
-            <a:r>
-              <a:rPr lang="en-US" sz="2400" dirty="0" smtClean="0"/>
-              <a:t> </a:t>
-            </a:r>
-            <a:r>
-              <a:rPr lang="en-US" sz="2400" dirty="0" err="1" smtClean="0"/>
-              <a:t>sdölkasdöl</a:t>
-            </a:r>
-            <a:r>
-              <a:rPr lang="en-US" sz="2400" dirty="0" smtClean="0"/>
-              <a:t> </a:t>
-            </a:r>
-            <a:r>
-              <a:rPr lang="en-US" sz="2400" dirty="0" err="1" smtClean="0"/>
-              <a:t>kölas</a:t>
-            </a:r>
-            <a:r>
-              <a:rPr lang="en-US" sz="2400" dirty="0" smtClean="0"/>
-              <a:t> </a:t>
-            </a:r>
-            <a:r>
-              <a:rPr lang="en-US" sz="2400" dirty="0" err="1" smtClean="0"/>
-              <a:t>kklj</a:t>
-            </a:r>
-            <a:r>
-              <a:rPr lang="en-US" sz="2400" dirty="0" smtClean="0"/>
-              <a:t> </a:t>
-            </a:r>
-            <a:r>
-              <a:rPr lang="en-US" sz="2400" dirty="0" err="1" smtClean="0"/>
-              <a:t>kjkjasd</a:t>
-            </a:r>
-            <a:r>
-              <a:rPr lang="en-US" sz="2400" dirty="0" smtClean="0"/>
-              <a:t> </a:t>
-            </a:r>
-            <a:r>
-              <a:rPr lang="en-US" sz="2400" dirty="0" err="1" smtClean="0"/>
-              <a:t>lkjks</a:t>
-            </a:r>
-            <a:r>
-              <a:rPr lang="en-US" sz="2400" dirty="0" smtClean="0"/>
-              <a:t> </a:t>
-            </a:r>
-            <a:r>
-              <a:rPr lang="en-US" sz="2400" dirty="0" err="1" smtClean="0"/>
-              <a:t>lkjdse</a:t>
-            </a:r>
-            <a:r>
-              <a:rPr lang="en-US" sz="2400" dirty="0" smtClean="0"/>
-              <a:t> </a:t>
-            </a:r>
-            <a:r>
-              <a:rPr lang="en-US" sz="2400" dirty="0" err="1" smtClean="0"/>
-              <a:t>lkerkjasd</a:t>
-            </a:r>
-            <a:r>
-              <a:rPr lang="en-US" sz="2400" dirty="0" smtClean="0"/>
-              <a:t> </a:t>
-            </a:r>
-            <a:r>
-              <a:rPr lang="en-US" sz="2400" dirty="0" err="1" smtClean="0"/>
-              <a:t>sadlkmsd</a:t>
-            </a:r>
-            <a:r>
-              <a:rPr lang="en-US" sz="2400" dirty="0" smtClean="0"/>
-              <a:t> </a:t>
-            </a:r>
-            <a:r>
-              <a:rPr lang="en-US" sz="2400" dirty="0" err="1" smtClean="0"/>
-              <a:t>salkdjkj</a:t>
-            </a:r>
-            <a:r>
-              <a:rPr lang="en-US" sz="2400" dirty="0" smtClean="0"/>
-              <a:t> sad </a:t>
-            </a:r>
-            <a:r>
-              <a:rPr lang="en-US" sz="2400" dirty="0" err="1" smtClean="0"/>
-              <a:t>sadklkjsad</a:t>
-            </a:r>
-            <a:r>
-              <a:rPr lang="en-US" sz="2400" dirty="0" smtClean="0"/>
-              <a:t> </a:t>
-            </a:r>
-            <a:r>
-              <a:rPr lang="en-US" sz="2400" dirty="0" err="1" smtClean="0"/>
-              <a:t>klasdlkj</a:t>
-            </a:r>
-            <a:r>
-              <a:rPr lang="en-US" sz="2400" dirty="0" smtClean="0"/>
-              <a:t> </a:t>
-            </a:r>
-            <a:r>
-              <a:rPr lang="en-US" sz="2400" dirty="0" err="1" smtClean="0"/>
-              <a:t>asdkjl</a:t>
-            </a:r>
-            <a:r>
-              <a:rPr lang="en-US" sz="2400" dirty="0" smtClean="0"/>
-              <a:t>  </a:t>
-            </a:r>
-            <a:r>
-              <a:rPr lang="en-US" sz="2400" dirty="0" err="1" smtClean="0"/>
-              <a:t>kas</a:t>
-            </a:r>
-            <a:r>
-              <a:rPr lang="en-US" sz="2400" dirty="0" smtClean="0"/>
-              <a:t> </a:t>
-            </a:r>
-            <a:r>
-              <a:rPr lang="en-US" sz="2400" dirty="0" err="1" smtClean="0"/>
-              <a:t>jdklsa</a:t>
-            </a:r>
-            <a:r>
-              <a:rPr lang="en-US" sz="2400" dirty="0" smtClean="0"/>
-              <a:t> </a:t>
-            </a:r>
-            <a:r>
-              <a:rPr lang="en-US" sz="2400" dirty="0" err="1" smtClean="0"/>
-              <a:t>klasjdkjasdlkj</a:t>
-            </a:r>
-            <a:r>
-              <a:rPr lang="en-US" sz="2400" dirty="0" smtClean="0"/>
-              <a:t> </a:t>
-            </a:r>
-            <a:r>
-              <a:rPr lang="en-US" sz="2400" dirty="0" err="1" smtClean="0"/>
-              <a:t>dsadk</a:t>
-            </a:r>
-            <a:r>
-              <a:rPr lang="en-US" sz="2400" dirty="0" smtClean="0"/>
-              <a:t> </a:t>
-            </a:r>
-            <a:r>
-              <a:rPr lang="en-US" sz="2400" dirty="0" err="1" smtClean="0"/>
-              <a:t>lkasdjlaksjd</a:t>
-            </a:r>
-            <a:r>
-              <a:rPr lang="en-US" sz="2400" dirty="0" smtClean="0"/>
-              <a:t> </a:t>
-            </a:r>
-          </a:p>
-          <a:p>
-            <a:pPr algn="just"/>
-            <a:endParaRPr lang="en-US" sz="2400" dirty="0" smtClean="0"/>
+              <a:rPr lang="en-US" sz="2400" dirty="0" smtClean="0"/>
+              <a:t>Our project is based on datasets from 2 sources. The first part is gathered from </a:t>
+            </a:r>
+            <a:r>
+              <a:rPr lang="en-US" sz="2400" dirty="0" err="1" smtClean="0"/>
+              <a:t>kaggle</a:t>
+            </a:r>
+            <a:r>
+              <a:rPr lang="en-US" sz="2400" dirty="0" smtClean="0"/>
+              <a:t>-website. It contains metadata about movies, actors, genres, keywords and single user ratings. The size is </a:t>
+            </a:r>
+            <a:r>
+              <a:rPr lang="en-US" sz="2400" b="1" dirty="0" smtClean="0"/>
+              <a:t>about 900 MB</a:t>
+            </a:r>
+            <a:r>
+              <a:rPr lang="en-US" sz="2400" dirty="0" smtClean="0"/>
+              <a:t> and it has over </a:t>
+            </a:r>
+            <a:r>
+              <a:rPr lang="en-US" sz="2400" b="1" dirty="0" smtClean="0"/>
+              <a:t>45.000</a:t>
+            </a:r>
+            <a:r>
+              <a:rPr lang="en-US" sz="2400" dirty="0" smtClean="0"/>
+              <a:t> movies. Additionally we collected data from IMDb  and got rating data with more than </a:t>
+            </a:r>
+            <a:r>
+              <a:rPr lang="en-US" sz="2400" b="1" dirty="0" smtClean="0"/>
+              <a:t>45.000</a:t>
+            </a:r>
+            <a:r>
+              <a:rPr lang="en-US" sz="2400" dirty="0" smtClean="0"/>
+              <a:t> entries. </a:t>
+            </a:r>
           </a:p>
           <a:p>
             <a:pPr algn="just"/>
             <a:endParaRPr lang="en-US" sz="2400" dirty="0"/>
+          </a:p>
+          <a:p>
+            <a:pPr algn="just"/>
+            <a:r>
+              <a:rPr lang="en-US" sz="2400" dirty="0" smtClean="0"/>
+              <a:t>All in one, our dataset </a:t>
+            </a:r>
+            <a:r>
+              <a:rPr lang="en-US" sz="2400" dirty="0"/>
+              <a:t>is an ensemble of data collected from </a:t>
+            </a:r>
+            <a:r>
+              <a:rPr lang="en-US" sz="2400" b="1" dirty="0"/>
+              <a:t>TMDB</a:t>
+            </a:r>
+            <a:r>
+              <a:rPr lang="en-US" sz="2400" dirty="0"/>
+              <a:t>, </a:t>
+            </a:r>
+            <a:r>
+              <a:rPr lang="en-US" sz="2400" b="1" dirty="0" smtClean="0"/>
+              <a:t>IMDb</a:t>
+            </a:r>
+            <a:r>
+              <a:rPr lang="en-US" sz="2400" dirty="0" smtClean="0"/>
+              <a:t> </a:t>
+            </a:r>
+            <a:r>
+              <a:rPr lang="en-US" sz="2400" dirty="0"/>
+              <a:t>and </a:t>
+            </a:r>
+            <a:r>
+              <a:rPr lang="en-US" sz="2400" b="1" dirty="0" err="1"/>
+              <a:t>GroupLens</a:t>
+            </a:r>
+            <a:r>
+              <a:rPr lang="en-US" sz="2400" dirty="0" smtClean="0"/>
+              <a:t>.</a:t>
+            </a:r>
+            <a:endParaRPr lang="en-US" sz="2400" dirty="0" smtClean="0"/>
           </a:p>
         </p:txBody>
       </p:sp>
@@ -4345,112 +3578,127 @@
           </a:fontRef>
         </p:style>
       </p:cxnSp>
-      <p:sp>
-        <p:nvSpPr>
-          <p:cNvPr id="22" name="Rechteck 21"/>
-          <p:cNvSpPr/>
+      <p:grpSp>
+        <p:nvGrpSpPr>
+          <p:cNvPr id="67" name="Gruppieren 66"/>
+          <p:cNvGrpSpPr/>
           <p:nvPr/>
-        </p:nvSpPr>
-        <p:spPr>
+        </p:nvGrpSpPr>
+        <p:grpSpPr>
           <a:xfrm>
-            <a:off x="10800000" y="2880000"/>
-            <a:ext cx="720000" cy="720000"/>
+            <a:off x="720000" y="10540410"/>
+            <a:ext cx="6120000" cy="720000"/>
+            <a:chOff x="720000" y="11880000"/>
+            <a:chExt cx="6120000" cy="720000"/>
           </a:xfrm>
-          <a:prstGeom prst="rect">
-            <a:avLst/>
-          </a:prstGeom>
-          <a:solidFill>
-            <a:schemeClr val="bg1">
-              <a:lumMod val="85000"/>
-            </a:schemeClr>
-          </a:solidFill>
-          <a:ln>
-            <a:noFill/>
-          </a:ln>
-        </p:spPr>
-        <p:style>
-          <a:lnRef idx="2">
-            <a:schemeClr val="accent3">
-              <a:shade val="50000"/>
-            </a:schemeClr>
-          </a:lnRef>
-          <a:fillRef idx="1">
-            <a:schemeClr val="accent3"/>
-          </a:fillRef>
-          <a:effectRef idx="0">
-            <a:schemeClr val="accent3"/>
-          </a:effectRef>
-          <a:fontRef idx="minor">
-            <a:schemeClr val="lt1"/>
-          </a:fontRef>
-        </p:style>
-        <p:txBody>
-          <a:bodyPr rtlCol="0" anchor="ctr"/>
-          <a:lstStyle/>
-          <a:p>
-            <a:pPr algn="ctr"/>
-            <a:endParaRPr lang="en-US"/>
-          </a:p>
-        </p:txBody>
-      </p:sp>
-      <p:sp>
-        <p:nvSpPr>
-          <p:cNvPr id="23" name="Rechteck 22"/>
-          <p:cNvSpPr/>
-          <p:nvPr/>
-        </p:nvSpPr>
-        <p:spPr>
-          <a:xfrm>
-            <a:off x="11880000" y="2880000"/>
-            <a:ext cx="6480000" cy="720000"/>
-          </a:xfrm>
-          <a:prstGeom prst="rect">
-            <a:avLst/>
-          </a:prstGeom>
-          <a:solidFill>
-            <a:schemeClr val="bg1">
-              <a:lumMod val="50000"/>
-            </a:schemeClr>
-          </a:solidFill>
-          <a:ln>
-            <a:noFill/>
-          </a:ln>
-        </p:spPr>
-        <p:style>
-          <a:lnRef idx="2">
-            <a:schemeClr val="accent1">
-              <a:shade val="50000"/>
-            </a:schemeClr>
-          </a:lnRef>
-          <a:fillRef idx="1">
-            <a:schemeClr val="accent1"/>
-          </a:fillRef>
-          <a:effectRef idx="0">
-            <a:schemeClr val="accent1"/>
-          </a:effectRef>
-          <a:fontRef idx="minor">
-            <a:schemeClr val="lt1"/>
-          </a:fontRef>
-        </p:style>
-        <p:txBody>
-          <a:bodyPr rtlCol="0" anchor="ctr"/>
-          <a:lstStyle/>
-          <a:p>
-            <a:pPr algn="ctr"/>
-            <a:r>
-              <a:rPr lang="en-US" sz="3600" dirty="0" smtClean="0">
+        </p:grpSpPr>
+        <p:sp>
+          <p:nvSpPr>
+            <p:cNvPr id="22" name="Rechteck 21"/>
+            <p:cNvSpPr/>
+            <p:nvPr/>
+          </p:nvSpPr>
+          <p:spPr>
+            <a:xfrm>
+              <a:off x="720000" y="11880000"/>
+              <a:ext cx="720000" cy="720000"/>
+            </a:xfrm>
+            <a:prstGeom prst="rect">
+              <a:avLst/>
+            </a:prstGeom>
+            <a:solidFill>
+              <a:schemeClr val="bg1">
+                <a:lumMod val="85000"/>
+              </a:schemeClr>
+            </a:solidFill>
+            <a:ln>
+              <a:noFill/>
+            </a:ln>
+          </p:spPr>
+          <p:style>
+            <a:lnRef idx="2">
+              <a:schemeClr val="accent3">
+                <a:shade val="50000"/>
+              </a:schemeClr>
+            </a:lnRef>
+            <a:fillRef idx="1">
+              <a:schemeClr val="accent3"/>
+            </a:fillRef>
+            <a:effectRef idx="0">
+              <a:schemeClr val="accent3"/>
+            </a:effectRef>
+            <a:fontRef idx="minor">
+              <a:schemeClr val="lt1"/>
+            </a:fontRef>
+          </p:style>
+          <p:txBody>
+            <a:bodyPr rtlCol="0" anchor="ctr"/>
+            <a:lstStyle/>
+            <a:p>
+              <a:pPr algn="ctr"/>
+              <a:endParaRPr lang="en-US"/>
+            </a:p>
+          </p:txBody>
+        </p:sp>
+        <p:sp>
+          <p:nvSpPr>
+            <p:cNvPr id="23" name="Rechteck 22"/>
+            <p:cNvSpPr/>
+            <p:nvPr/>
+          </p:nvSpPr>
+          <p:spPr>
+            <a:xfrm>
+              <a:off x="1800000" y="11880000"/>
+              <a:ext cx="5040000" cy="720000"/>
+            </a:xfrm>
+            <a:prstGeom prst="rect">
+              <a:avLst/>
+            </a:prstGeom>
+            <a:solidFill>
+              <a:schemeClr val="bg1">
+                <a:lumMod val="50000"/>
+              </a:schemeClr>
+            </a:solidFill>
+            <a:ln>
+              <a:noFill/>
+            </a:ln>
+          </p:spPr>
+          <p:style>
+            <a:lnRef idx="2">
+              <a:schemeClr val="accent1">
+                <a:shade val="50000"/>
+              </a:schemeClr>
+            </a:lnRef>
+            <a:fillRef idx="1">
+              <a:schemeClr val="accent1"/>
+            </a:fillRef>
+            <a:effectRef idx="0">
+              <a:schemeClr val="accent1"/>
+            </a:effectRef>
+            <a:fontRef idx="minor">
+              <a:schemeClr val="lt1"/>
+            </a:fontRef>
+          </p:style>
+          <p:txBody>
+            <a:bodyPr rtlCol="0" anchor="ctr"/>
+            <a:lstStyle/>
+            <a:p>
+              <a:pPr algn="ctr"/>
+              <a:r>
+                <a:rPr lang="en-US" sz="3600" dirty="0" smtClean="0">
+                  <a:latin typeface="Franklin Gothic Medium" panose="020B0603020102020204" pitchFamily="34" charset="0"/>
+                  <a:cs typeface="Aharoni" panose="02010803020104030203" pitchFamily="2" charset="-79"/>
+                </a:rPr>
+                <a:t>Success factors</a:t>
+              </a:r>
+              <a:endParaRPr lang="en-US" sz="3600" b="1" dirty="0">
                 <a:latin typeface="Franklin Gothic Medium" panose="020B0603020102020204" pitchFamily="34" charset="0"/>
                 <a:cs typeface="Aharoni" panose="02010803020104030203" pitchFamily="2" charset="-79"/>
-              </a:rPr>
-              <a:t>Success factors for good rating</a:t>
-            </a:r>
-            <a:endParaRPr lang="en-US" sz="3600" b="1" dirty="0">
-              <a:latin typeface="Franklin Gothic Medium" panose="020B0603020102020204" pitchFamily="34" charset="0"/>
-              <a:cs typeface="Aharoni" panose="02010803020104030203" pitchFamily="2" charset="-79"/>
-            </a:endParaRPr>
-          </a:p>
-        </p:txBody>
-      </p:sp>
+              </a:endParaRPr>
+            </a:p>
+          </p:txBody>
+        </p:sp>
+      </p:grpSp>
       <p:sp>
         <p:nvSpPr>
           <p:cNvPr id="24" name="Rechteck 23"/>
@@ -4565,8 +3813,8 @@
         </p:nvSpPr>
         <p:spPr>
           <a:xfrm>
-            <a:off x="10800000" y="3960000"/>
-            <a:ext cx="9000000" cy="2677656"/>
+            <a:off x="720000" y="11335556"/>
+            <a:ext cx="9000000" cy="2308324"/>
           </a:xfrm>
           <a:prstGeom prst="rect">
             <a:avLst/>
@@ -4581,516 +3829,13 @@
           <a:p>
             <a:pPr algn="just"/>
             <a:r>
-              <a:rPr lang="en-US" sz="2400" dirty="0" err="1" smtClean="0"/>
-              <a:t>Sdsds</a:t>
-            </a:r>
-            <a:r>
-              <a:rPr lang="en-US" sz="2400" dirty="0" smtClean="0"/>
-              <a:t> </a:t>
-            </a:r>
-            <a:r>
-              <a:rPr lang="en-US" sz="2400" dirty="0" err="1" smtClean="0"/>
-              <a:t>dsdsdsd</a:t>
-            </a:r>
-            <a:r>
-              <a:rPr lang="en-US" sz="2400" dirty="0" smtClean="0"/>
-              <a:t> </a:t>
-            </a:r>
-            <a:r>
-              <a:rPr lang="en-US" sz="2400" dirty="0" err="1" smtClean="0"/>
-              <a:t>lask</a:t>
-            </a:r>
-            <a:r>
-              <a:rPr lang="en-US" sz="2400" dirty="0" smtClean="0"/>
-              <a:t> </a:t>
-            </a:r>
-            <a:r>
-              <a:rPr lang="en-US" sz="2400" dirty="0" err="1" smtClean="0"/>
-              <a:t>döka</a:t>
-            </a:r>
-            <a:r>
-              <a:rPr lang="en-US" sz="2400" dirty="0" smtClean="0"/>
-              <a:t>  </a:t>
-            </a:r>
-            <a:r>
-              <a:rPr lang="en-US" sz="2400" dirty="0" err="1" smtClean="0"/>
-              <a:t>ösldkö</a:t>
-            </a:r>
-            <a:r>
-              <a:rPr lang="en-US" sz="2400" dirty="0" smtClean="0"/>
-              <a:t> </a:t>
-            </a:r>
-            <a:r>
-              <a:rPr lang="en-US" sz="2400" dirty="0" err="1" smtClean="0"/>
-              <a:t>laskd</a:t>
-            </a:r>
-            <a:r>
-              <a:rPr lang="en-US" sz="2400" dirty="0" smtClean="0"/>
-              <a:t> </a:t>
-            </a:r>
-            <a:r>
-              <a:rPr lang="en-US" sz="2400" dirty="0" err="1" smtClean="0"/>
-              <a:t>öka</a:t>
-            </a:r>
-            <a:r>
-              <a:rPr lang="en-US" sz="2400" dirty="0" smtClean="0"/>
-              <a:t> </a:t>
-            </a:r>
-            <a:r>
-              <a:rPr lang="en-US" sz="2400" dirty="0" err="1" smtClean="0"/>
-              <a:t>sdölkasdöl</a:t>
-            </a:r>
-            <a:r>
-              <a:rPr lang="en-US" sz="2400" dirty="0" smtClean="0"/>
-              <a:t> </a:t>
-            </a:r>
-            <a:r>
-              <a:rPr lang="en-US" sz="2400" dirty="0" err="1" smtClean="0"/>
-              <a:t>kölas</a:t>
-            </a:r>
-            <a:r>
-              <a:rPr lang="en-US" sz="2400" dirty="0" smtClean="0"/>
-              <a:t> </a:t>
-            </a:r>
-            <a:r>
-              <a:rPr lang="en-US" sz="2400" dirty="0" err="1" smtClean="0"/>
-              <a:t>kklj</a:t>
-            </a:r>
-            <a:r>
-              <a:rPr lang="en-US" sz="2400" dirty="0" smtClean="0"/>
-              <a:t> </a:t>
-            </a:r>
-            <a:r>
-              <a:rPr lang="en-US" sz="2400" dirty="0" err="1" smtClean="0"/>
-              <a:t>kjkjasd</a:t>
-            </a:r>
-            <a:r>
-              <a:rPr lang="en-US" sz="2400" dirty="0" smtClean="0"/>
-              <a:t> </a:t>
-            </a:r>
-            <a:r>
-              <a:rPr lang="en-US" sz="2400" dirty="0" err="1" smtClean="0"/>
-              <a:t>lkjks</a:t>
-            </a:r>
-            <a:r>
-              <a:rPr lang="en-US" sz="2400" dirty="0" smtClean="0"/>
-              <a:t> </a:t>
-            </a:r>
-            <a:r>
-              <a:rPr lang="en-US" sz="2400" dirty="0" err="1" smtClean="0"/>
-              <a:t>lkjdse</a:t>
-            </a:r>
-            <a:r>
-              <a:rPr lang="en-US" sz="2400" dirty="0" smtClean="0"/>
-              <a:t> </a:t>
-            </a:r>
-            <a:r>
-              <a:rPr lang="en-US" sz="2400" dirty="0" err="1" smtClean="0"/>
-              <a:t>lkerkjasd</a:t>
-            </a:r>
-            <a:r>
-              <a:rPr lang="en-US" sz="2400" dirty="0" smtClean="0"/>
-              <a:t> </a:t>
-            </a:r>
-            <a:r>
-              <a:rPr lang="en-US" sz="2400" dirty="0" err="1" smtClean="0"/>
-              <a:t>sadlkmsd</a:t>
-            </a:r>
-            <a:r>
-              <a:rPr lang="en-US" sz="2400" dirty="0" smtClean="0"/>
-              <a:t> </a:t>
-            </a:r>
-            <a:r>
-              <a:rPr lang="en-US" sz="2400" dirty="0" err="1" smtClean="0"/>
-              <a:t>salkdjkj</a:t>
-            </a:r>
-            <a:r>
-              <a:rPr lang="en-US" sz="2400" dirty="0" smtClean="0"/>
-              <a:t> sad </a:t>
-            </a:r>
-            <a:r>
-              <a:rPr lang="en-US" sz="2400" dirty="0" err="1" smtClean="0"/>
-              <a:t>sadklkjsad</a:t>
-            </a:r>
-            <a:r>
-              <a:rPr lang="en-US" sz="2400" dirty="0" smtClean="0"/>
-              <a:t> </a:t>
-            </a:r>
-            <a:r>
-              <a:rPr lang="en-US" sz="2400" dirty="0" err="1" smtClean="0"/>
-              <a:t>klasdlkj</a:t>
-            </a:r>
-            <a:r>
-              <a:rPr lang="en-US" sz="2400" dirty="0" smtClean="0"/>
-              <a:t> </a:t>
-            </a:r>
-            <a:r>
-              <a:rPr lang="en-US" sz="2400" dirty="0" err="1" smtClean="0"/>
-              <a:t>asdkjl</a:t>
-            </a:r>
-            <a:r>
-              <a:rPr lang="en-US" sz="2400" dirty="0" smtClean="0"/>
-              <a:t>  </a:t>
-            </a:r>
-            <a:r>
-              <a:rPr lang="en-US" sz="2400" dirty="0" err="1" smtClean="0"/>
-              <a:t>kas</a:t>
-            </a:r>
-            <a:r>
-              <a:rPr lang="en-US" sz="2400" dirty="0" smtClean="0"/>
-              <a:t> </a:t>
-            </a:r>
-            <a:r>
-              <a:rPr lang="en-US" sz="2400" dirty="0" err="1" smtClean="0"/>
-              <a:t>jdklsa</a:t>
-            </a:r>
-            <a:r>
-              <a:rPr lang="en-US" sz="2400" dirty="0" smtClean="0"/>
-              <a:t> </a:t>
-            </a:r>
-            <a:r>
-              <a:rPr lang="en-US" sz="2400" dirty="0" err="1" smtClean="0"/>
-              <a:t>klasjdkjasdlkj</a:t>
-            </a:r>
-            <a:r>
-              <a:rPr lang="en-US" sz="2400" dirty="0" smtClean="0"/>
-              <a:t> </a:t>
-            </a:r>
-            <a:r>
-              <a:rPr lang="en-US" sz="2400" dirty="0" err="1" smtClean="0"/>
-              <a:t>dsadk</a:t>
-            </a:r>
-            <a:r>
-              <a:rPr lang="en-US" sz="2400" dirty="0" smtClean="0"/>
-              <a:t> </a:t>
-            </a:r>
-            <a:r>
-              <a:rPr lang="en-US" sz="2400" dirty="0" err="1" smtClean="0"/>
-              <a:t>lkasdjlaksjd</a:t>
-            </a:r>
-            <a:r>
-              <a:rPr lang="en-US" sz="2400" dirty="0" smtClean="0"/>
-              <a:t> </a:t>
-            </a:r>
-            <a:r>
-              <a:rPr lang="en-US" sz="2400" dirty="0" err="1" smtClean="0"/>
-              <a:t>Sdsds</a:t>
-            </a:r>
-            <a:r>
-              <a:rPr lang="en-US" sz="2400" dirty="0" smtClean="0"/>
-              <a:t> </a:t>
-            </a:r>
-            <a:r>
-              <a:rPr lang="en-US" sz="2400" dirty="0" err="1" smtClean="0"/>
-              <a:t>dsdsdsd</a:t>
-            </a:r>
-            <a:r>
-              <a:rPr lang="en-US" sz="2400" dirty="0" smtClean="0"/>
-              <a:t> </a:t>
-            </a:r>
-            <a:r>
-              <a:rPr lang="en-US" sz="2400" dirty="0" err="1" smtClean="0"/>
-              <a:t>lask</a:t>
-            </a:r>
-            <a:r>
-              <a:rPr lang="en-US" sz="2400" dirty="0" smtClean="0"/>
-              <a:t> </a:t>
-            </a:r>
-            <a:r>
-              <a:rPr lang="en-US" sz="2400" dirty="0" err="1" smtClean="0"/>
-              <a:t>döka</a:t>
-            </a:r>
-            <a:r>
-              <a:rPr lang="en-US" sz="2400" dirty="0" smtClean="0"/>
-              <a:t>  </a:t>
-            </a:r>
-            <a:r>
-              <a:rPr lang="en-US" sz="2400" dirty="0" err="1" smtClean="0"/>
-              <a:t>ösldkö</a:t>
-            </a:r>
-            <a:r>
-              <a:rPr lang="en-US" sz="2400" dirty="0" smtClean="0"/>
-              <a:t> </a:t>
-            </a:r>
-            <a:r>
-              <a:rPr lang="en-US" sz="2400" dirty="0" err="1" smtClean="0"/>
-              <a:t>laskd</a:t>
-            </a:r>
-            <a:r>
-              <a:rPr lang="en-US" sz="2400" dirty="0" smtClean="0"/>
-              <a:t> </a:t>
-            </a:r>
-            <a:r>
-              <a:rPr lang="en-US" sz="2400" dirty="0" err="1" smtClean="0"/>
-              <a:t>öka</a:t>
-            </a:r>
-            <a:r>
-              <a:rPr lang="en-US" sz="2400" dirty="0" smtClean="0"/>
-              <a:t> </a:t>
-            </a:r>
-            <a:r>
-              <a:rPr lang="en-US" sz="2400" dirty="0" err="1" smtClean="0"/>
-              <a:t>sdölkasdöl</a:t>
-            </a:r>
-            <a:r>
-              <a:rPr lang="en-US" sz="2400" dirty="0" smtClean="0"/>
-              <a:t> </a:t>
-            </a:r>
-            <a:r>
-              <a:rPr lang="en-US" sz="2400" dirty="0" err="1" smtClean="0"/>
-              <a:t>kölas</a:t>
-            </a:r>
-            <a:r>
-              <a:rPr lang="en-US" sz="2400" dirty="0" smtClean="0"/>
-              <a:t> </a:t>
-            </a:r>
-            <a:r>
-              <a:rPr lang="en-US" sz="2400" dirty="0" err="1" smtClean="0"/>
-              <a:t>kklj</a:t>
-            </a:r>
-            <a:r>
-              <a:rPr lang="en-US" sz="2400" dirty="0" smtClean="0"/>
-              <a:t> </a:t>
-            </a:r>
-            <a:r>
-              <a:rPr lang="en-US" sz="2400" dirty="0" err="1" smtClean="0"/>
-              <a:t>kjkjasd</a:t>
-            </a:r>
-            <a:r>
-              <a:rPr lang="en-US" sz="2400" dirty="0" smtClean="0"/>
-              <a:t> </a:t>
-            </a:r>
-            <a:r>
-              <a:rPr lang="en-US" sz="2400" dirty="0" err="1" smtClean="0"/>
-              <a:t>lkjks</a:t>
-            </a:r>
-            <a:r>
-              <a:rPr lang="en-US" sz="2400" dirty="0" smtClean="0"/>
-              <a:t> </a:t>
-            </a:r>
-            <a:r>
-              <a:rPr lang="en-US" sz="2400" dirty="0" err="1" smtClean="0"/>
-              <a:t>lkjdse</a:t>
-            </a:r>
-            <a:r>
-              <a:rPr lang="en-US" sz="2400" dirty="0" smtClean="0"/>
-              <a:t> </a:t>
-            </a:r>
-            <a:r>
-              <a:rPr lang="en-US" sz="2400" dirty="0" err="1" smtClean="0"/>
-              <a:t>lkerkjasd</a:t>
-            </a:r>
-            <a:r>
-              <a:rPr lang="en-US" sz="2400" dirty="0" smtClean="0"/>
-              <a:t> </a:t>
-            </a:r>
-            <a:r>
-              <a:rPr lang="en-US" sz="2400" dirty="0" err="1" smtClean="0"/>
-              <a:t>sadlkmsd</a:t>
-            </a:r>
-            <a:r>
-              <a:rPr lang="en-US" sz="2400" dirty="0" smtClean="0"/>
-              <a:t> </a:t>
-            </a:r>
-            <a:r>
-              <a:rPr lang="en-US" sz="2400" dirty="0" err="1" smtClean="0"/>
-              <a:t>salkdjkj</a:t>
-            </a:r>
-            <a:r>
-              <a:rPr lang="en-US" sz="2400" dirty="0" smtClean="0"/>
-              <a:t> sad </a:t>
-            </a:r>
-            <a:r>
-              <a:rPr lang="en-US" sz="2400" dirty="0" err="1" smtClean="0"/>
-              <a:t>sadklkjsad</a:t>
-            </a:r>
-            <a:r>
-              <a:rPr lang="en-US" sz="2400" dirty="0" smtClean="0"/>
-              <a:t> </a:t>
-            </a:r>
-            <a:r>
-              <a:rPr lang="en-US" sz="2400" dirty="0" err="1" smtClean="0"/>
-              <a:t>klasdlkj</a:t>
-            </a:r>
-            <a:r>
-              <a:rPr lang="en-US" sz="2400" dirty="0" smtClean="0"/>
-              <a:t> </a:t>
-            </a:r>
-            <a:r>
-              <a:rPr lang="en-US" sz="2400" dirty="0" err="1" smtClean="0"/>
-              <a:t>asdkjl</a:t>
-            </a:r>
-            <a:r>
-              <a:rPr lang="en-US" sz="2400" dirty="0" smtClean="0"/>
-              <a:t>  </a:t>
-            </a:r>
-            <a:r>
-              <a:rPr lang="en-US" sz="2400" dirty="0" err="1" smtClean="0"/>
-              <a:t>kas</a:t>
-            </a:r>
-            <a:r>
-              <a:rPr lang="en-US" sz="2400" dirty="0" smtClean="0"/>
-              <a:t> </a:t>
-            </a:r>
-            <a:r>
-              <a:rPr lang="en-US" sz="2400" dirty="0" err="1" smtClean="0"/>
-              <a:t>jdklsa</a:t>
-            </a:r>
-            <a:r>
-              <a:rPr lang="en-US" sz="2400" dirty="0" smtClean="0"/>
-              <a:t> </a:t>
-            </a:r>
-            <a:r>
-              <a:rPr lang="en-US" sz="2400" dirty="0" err="1" smtClean="0"/>
-              <a:t>klasjdkjasdlkj</a:t>
-            </a:r>
-            <a:r>
-              <a:rPr lang="en-US" sz="2400" dirty="0" smtClean="0"/>
-              <a:t> </a:t>
-            </a:r>
-            <a:r>
-              <a:rPr lang="en-US" sz="2400" dirty="0" err="1" smtClean="0"/>
-              <a:t>dsadk</a:t>
-            </a:r>
-            <a:r>
-              <a:rPr lang="en-US" sz="2400" dirty="0" smtClean="0"/>
-              <a:t> </a:t>
-            </a:r>
-            <a:r>
-              <a:rPr lang="en-US" sz="2400" dirty="0" err="1" smtClean="0"/>
-              <a:t>lkasdjlaksjd</a:t>
-            </a:r>
-            <a:r>
-              <a:rPr lang="en-US" sz="2400" dirty="0" smtClean="0"/>
-              <a:t> </a:t>
-            </a:r>
-          </a:p>
-          <a:p>
-            <a:pPr algn="just"/>
+              <a:rPr lang="en-US" sz="2400" dirty="0" smtClean="0"/>
+              <a:t>To figure out which factors might implicate good or outstanding user ratings, first of all the mean rating of the different rating systems had to be calculated for each area such as keywords, actors etc.. Therefore the average rating from all movies where e.g. a single keyword appears was calculated. Afterwards the mean rating was used to create a ranking of top 5 and worse 5 ratings. </a:t>
+            </a:r>
             <a:endParaRPr lang="en-US" sz="2400" dirty="0"/>
           </a:p>
         </p:txBody>
       </p:sp>
-      <p:pic>
-        <p:nvPicPr>
-          <p:cNvPr id="27" name="Grafik 26"/>
-          <p:cNvPicPr>
-            <a:picLocks noChangeAspect="1"/>
-          </p:cNvPicPr>
-          <p:nvPr/>
-        </p:nvPicPr>
-        <p:blipFill>
-          <a:blip r:embed="rId3">
-            <a:extLst>
-              <a:ext uri="{28A0092B-C50C-407E-A947-70E740481C1C}">
-                <a14:useLocalDpi xmlns:a14="http://schemas.microsoft.com/office/drawing/2010/main" val="0"/>
-              </a:ext>
-            </a:extLst>
-          </a:blip>
-          <a:stretch>
-            <a:fillRect/>
-          </a:stretch>
-        </p:blipFill>
-        <p:spPr>
-          <a:xfrm>
-            <a:off x="11309401" y="13980280"/>
-            <a:ext cx="8364374" cy="6985488"/>
-          </a:xfrm>
-          <a:prstGeom prst="rect">
-            <a:avLst/>
-          </a:prstGeom>
-        </p:spPr>
-      </p:pic>
-      <p:pic>
-        <p:nvPicPr>
-          <p:cNvPr id="32" name="Grafik 31"/>
-          <p:cNvPicPr>
-            <a:picLocks noChangeAspect="1"/>
-          </p:cNvPicPr>
-          <p:nvPr/>
-        </p:nvPicPr>
-        <p:blipFill>
-          <a:blip r:embed="rId4" cstate="print">
-            <a:extLst>
-              <a:ext uri="{28A0092B-C50C-407E-A947-70E740481C1C}">
-                <a14:useLocalDpi xmlns:a14="http://schemas.microsoft.com/office/drawing/2010/main" val="0"/>
-              </a:ext>
-            </a:extLst>
-          </a:blip>
-          <a:stretch>
-            <a:fillRect/>
-          </a:stretch>
-        </p:blipFill>
-        <p:spPr>
-          <a:xfrm>
-            <a:off x="10790667" y="6419258"/>
-            <a:ext cx="4442195" cy="3001483"/>
-          </a:xfrm>
-          <a:prstGeom prst="rect">
-            <a:avLst/>
-          </a:prstGeom>
-        </p:spPr>
-      </p:pic>
-      <p:pic>
-        <p:nvPicPr>
-          <p:cNvPr id="33" name="Grafik 32"/>
-          <p:cNvPicPr>
-            <a:picLocks noChangeAspect="1"/>
-          </p:cNvPicPr>
-          <p:nvPr/>
-        </p:nvPicPr>
-        <p:blipFill>
-          <a:blip r:embed="rId5" cstate="print">
-            <a:extLst>
-              <a:ext uri="{28A0092B-C50C-407E-A947-70E740481C1C}">
-                <a14:useLocalDpi xmlns:a14="http://schemas.microsoft.com/office/drawing/2010/main" val="0"/>
-              </a:ext>
-            </a:extLst>
-          </a:blip>
-          <a:stretch>
-            <a:fillRect/>
-          </a:stretch>
-        </p:blipFill>
-        <p:spPr>
-          <a:xfrm>
-            <a:off x="15336670" y="6449589"/>
-            <a:ext cx="4477765" cy="3025517"/>
-          </a:xfrm>
-          <a:prstGeom prst="rect">
-            <a:avLst/>
-          </a:prstGeom>
-        </p:spPr>
-      </p:pic>
-      <p:pic>
-        <p:nvPicPr>
-          <p:cNvPr id="34" name="Grafik 33"/>
-          <p:cNvPicPr>
-            <a:picLocks noChangeAspect="1"/>
-          </p:cNvPicPr>
-          <p:nvPr/>
-        </p:nvPicPr>
-        <p:blipFill>
-          <a:blip r:embed="rId6" cstate="print">
-            <a:extLst>
-              <a:ext uri="{28A0092B-C50C-407E-A947-70E740481C1C}">
-                <a14:useLocalDpi xmlns:a14="http://schemas.microsoft.com/office/drawing/2010/main" val="0"/>
-              </a:ext>
-            </a:extLst>
-          </a:blip>
-          <a:stretch>
-            <a:fillRect/>
-          </a:stretch>
-        </p:blipFill>
-        <p:spPr>
-          <a:xfrm>
-            <a:off x="12960000" y="9587290"/>
-            <a:ext cx="3736944" cy="2524962"/>
-          </a:xfrm>
-          <a:prstGeom prst="rect">
-            <a:avLst/>
-          </a:prstGeom>
-        </p:spPr>
-      </p:pic>
       <p:sp>
         <p:nvSpPr>
           <p:cNvPr id="36" name="Textfeld 35"/>
@@ -5099,8 +3844,8 @@
         </p:nvSpPr>
         <p:spPr>
           <a:xfrm>
-            <a:off x="10800000" y="12424740"/>
-            <a:ext cx="9000000" cy="1200329"/>
+            <a:off x="10799999" y="3645040"/>
+            <a:ext cx="9000000" cy="1569660"/>
           </a:xfrm>
           <a:prstGeom prst="rect">
             <a:avLst/>
@@ -5115,487 +3860,8 @@
           <a:p>
             <a:pPr algn="just"/>
             <a:r>
-              <a:rPr lang="en-US" sz="2400" dirty="0" err="1" smtClean="0"/>
-              <a:t>Sdsds</a:t>
-            </a:r>
-            <a:r>
-              <a:rPr lang="en-US" sz="2400" dirty="0" smtClean="0"/>
-              <a:t> </a:t>
-            </a:r>
-            <a:r>
-              <a:rPr lang="en-US" sz="2400" dirty="0" err="1" smtClean="0"/>
-              <a:t>dsdsdsd</a:t>
-            </a:r>
-            <a:r>
-              <a:rPr lang="en-US" sz="2400" dirty="0" smtClean="0"/>
-              <a:t> </a:t>
-            </a:r>
-            <a:r>
-              <a:rPr lang="en-US" sz="2400" dirty="0" err="1" smtClean="0"/>
-              <a:t>lask</a:t>
-            </a:r>
-            <a:r>
-              <a:rPr lang="en-US" sz="2400" dirty="0" smtClean="0"/>
-              <a:t> </a:t>
-            </a:r>
-            <a:r>
-              <a:rPr lang="en-US" sz="2400" dirty="0" err="1" smtClean="0"/>
-              <a:t>döka</a:t>
-            </a:r>
-            <a:r>
-              <a:rPr lang="en-US" sz="2400" dirty="0" smtClean="0"/>
-              <a:t>  </a:t>
-            </a:r>
-            <a:r>
-              <a:rPr lang="en-US" sz="2400" dirty="0" err="1" smtClean="0"/>
-              <a:t>ösldkö</a:t>
-            </a:r>
-            <a:r>
-              <a:rPr lang="en-US" sz="2400" dirty="0" smtClean="0"/>
-              <a:t> </a:t>
-            </a:r>
-            <a:r>
-              <a:rPr lang="en-US" sz="2400" dirty="0" err="1" smtClean="0"/>
-              <a:t>laskd</a:t>
-            </a:r>
-            <a:r>
-              <a:rPr lang="en-US" sz="2400" dirty="0" smtClean="0"/>
-              <a:t> </a:t>
-            </a:r>
-            <a:r>
-              <a:rPr lang="en-US" sz="2400" dirty="0" err="1" smtClean="0"/>
-              <a:t>öka</a:t>
-            </a:r>
-            <a:r>
-              <a:rPr lang="en-US" sz="2400" dirty="0" smtClean="0"/>
-              <a:t> </a:t>
-            </a:r>
-            <a:r>
-              <a:rPr lang="en-US" sz="2400" dirty="0" err="1" smtClean="0"/>
-              <a:t>sdölkasdöl</a:t>
-            </a:r>
-            <a:r>
-              <a:rPr lang="en-US" sz="2400" dirty="0" smtClean="0"/>
-              <a:t> </a:t>
-            </a:r>
-            <a:r>
-              <a:rPr lang="en-US" sz="2400" dirty="0" err="1" smtClean="0"/>
-              <a:t>kölas</a:t>
-            </a:r>
-            <a:r>
-              <a:rPr lang="en-US" sz="2400" dirty="0" smtClean="0"/>
-              <a:t> </a:t>
-            </a:r>
-            <a:r>
-              <a:rPr lang="en-US" sz="2400" dirty="0" err="1" smtClean="0"/>
-              <a:t>kklj</a:t>
-            </a:r>
-            <a:r>
-              <a:rPr lang="en-US" sz="2400" dirty="0" smtClean="0"/>
-              <a:t> </a:t>
-            </a:r>
-            <a:r>
-              <a:rPr lang="en-US" sz="2400" dirty="0" err="1" smtClean="0"/>
-              <a:t>kjkjasd</a:t>
-            </a:r>
-            <a:r>
-              <a:rPr lang="en-US" sz="2400" dirty="0" smtClean="0"/>
-              <a:t> </a:t>
-            </a:r>
-            <a:r>
-              <a:rPr lang="en-US" sz="2400" dirty="0" err="1" smtClean="0"/>
-              <a:t>lkjks</a:t>
-            </a:r>
-            <a:r>
-              <a:rPr lang="en-US" sz="2400" dirty="0" smtClean="0"/>
-              <a:t> </a:t>
-            </a:r>
-            <a:r>
-              <a:rPr lang="en-US" sz="2400" dirty="0" err="1" smtClean="0"/>
-              <a:t>lkjdse</a:t>
-            </a:r>
-            <a:r>
-              <a:rPr lang="en-US" sz="2400" dirty="0" smtClean="0"/>
-              <a:t> </a:t>
-            </a:r>
-            <a:r>
-              <a:rPr lang="en-US" sz="2400" dirty="0" err="1" smtClean="0"/>
-              <a:t>lkerkjasd</a:t>
-            </a:r>
-            <a:r>
-              <a:rPr lang="en-US" sz="2400" dirty="0" smtClean="0"/>
-              <a:t> </a:t>
-            </a:r>
-            <a:r>
-              <a:rPr lang="en-US" sz="2400" dirty="0" err="1" smtClean="0"/>
-              <a:t>sadlkmsd</a:t>
-            </a:r>
-            <a:r>
-              <a:rPr lang="en-US" sz="2400" dirty="0" smtClean="0"/>
-              <a:t> </a:t>
-            </a:r>
-            <a:r>
-              <a:rPr lang="en-US" sz="2400" dirty="0" err="1" smtClean="0"/>
-              <a:t>salkdjkj</a:t>
-            </a:r>
-            <a:r>
-              <a:rPr lang="en-US" sz="2400" dirty="0" smtClean="0"/>
-              <a:t> sad </a:t>
-            </a:r>
-            <a:r>
-              <a:rPr lang="en-US" sz="2400" dirty="0" err="1" smtClean="0"/>
-              <a:t>sadklkjsad</a:t>
-            </a:r>
-            <a:r>
-              <a:rPr lang="en-US" sz="2400" dirty="0" smtClean="0"/>
-              <a:t> </a:t>
-            </a:r>
-            <a:r>
-              <a:rPr lang="en-US" sz="2400" dirty="0" err="1" smtClean="0"/>
-              <a:t>klasdlkj</a:t>
-            </a:r>
-            <a:r>
-              <a:rPr lang="en-US" sz="2400" dirty="0" smtClean="0"/>
-              <a:t> </a:t>
-            </a:r>
-            <a:r>
-              <a:rPr lang="en-US" sz="2400" dirty="0" err="1" smtClean="0"/>
-              <a:t>asdkjl</a:t>
-            </a:r>
-            <a:r>
-              <a:rPr lang="en-US" sz="2400" dirty="0" smtClean="0"/>
-              <a:t>  </a:t>
-            </a:r>
-            <a:r>
-              <a:rPr lang="en-US" sz="2400" dirty="0" err="1" smtClean="0"/>
-              <a:t>kas</a:t>
-            </a:r>
-            <a:r>
-              <a:rPr lang="en-US" sz="2400" dirty="0" smtClean="0"/>
-              <a:t> </a:t>
-            </a:r>
-            <a:r>
-              <a:rPr lang="en-US" sz="2400" dirty="0" err="1" smtClean="0"/>
-              <a:t>jdklsa</a:t>
-            </a:r>
-            <a:r>
-              <a:rPr lang="en-US" sz="2400" dirty="0" smtClean="0"/>
-              <a:t> </a:t>
-            </a:r>
-            <a:r>
-              <a:rPr lang="en-US" sz="2400" dirty="0" err="1" smtClean="0"/>
-              <a:t>klasjdkjasdlkj</a:t>
-            </a:r>
-            <a:r>
-              <a:rPr lang="en-US" sz="2400" dirty="0" smtClean="0"/>
-              <a:t> </a:t>
-            </a:r>
-            <a:r>
-              <a:rPr lang="en-US" sz="2400" dirty="0" err="1" smtClean="0"/>
-              <a:t>dsadk</a:t>
-            </a:r>
-            <a:r>
-              <a:rPr lang="en-US" sz="2400" dirty="0" smtClean="0"/>
-              <a:t> </a:t>
-            </a:r>
-            <a:r>
-              <a:rPr lang="en-US" sz="2400" dirty="0" err="1" smtClean="0"/>
-              <a:t>lkasdjlaksjd</a:t>
-            </a:r>
-            <a:r>
-              <a:rPr lang="en-US" sz="2400" dirty="0" smtClean="0"/>
-              <a:t> </a:t>
-            </a:r>
-            <a:r>
-              <a:rPr lang="en-US" sz="2400" dirty="0" err="1" smtClean="0"/>
-              <a:t>Sdsds</a:t>
-            </a:r>
-            <a:r>
-              <a:rPr lang="en-US" sz="2400" dirty="0" smtClean="0"/>
-              <a:t> </a:t>
-            </a:r>
-            <a:r>
-              <a:rPr lang="en-US" sz="2400" dirty="0" err="1" smtClean="0"/>
-              <a:t>dsdsdsd</a:t>
-            </a:r>
-            <a:r>
-              <a:rPr lang="en-US" sz="2400" dirty="0" smtClean="0"/>
-              <a:t> </a:t>
-            </a:r>
-            <a:r>
-              <a:rPr lang="en-US" sz="2400" dirty="0" err="1" smtClean="0"/>
-              <a:t>lask</a:t>
-            </a:r>
-            <a:r>
-              <a:rPr lang="en-US" sz="2400" dirty="0" smtClean="0"/>
-              <a:t> </a:t>
-            </a:r>
-            <a:r>
-              <a:rPr lang="en-US" sz="2400" dirty="0" err="1" smtClean="0"/>
-              <a:t>döka</a:t>
-            </a:r>
-            <a:r>
-              <a:rPr lang="en-US" sz="2400" dirty="0" smtClean="0"/>
-              <a:t>  </a:t>
-            </a:r>
-            <a:r>
-              <a:rPr lang="en-US" sz="2400" dirty="0" err="1" smtClean="0"/>
-              <a:t>ösldkö</a:t>
-            </a:r>
-            <a:endParaRPr lang="en-US" sz="2400" dirty="0"/>
-          </a:p>
-        </p:txBody>
-      </p:sp>
-      <p:sp>
-        <p:nvSpPr>
-          <p:cNvPr id="38" name="Textfeld 37"/>
-          <p:cNvSpPr txBox="1"/>
-          <p:nvPr/>
-        </p:nvSpPr>
-        <p:spPr>
-          <a:xfrm>
-            <a:off x="907218" y="16872859"/>
-            <a:ext cx="9000000" cy="1200329"/>
-          </a:xfrm>
-          <a:prstGeom prst="rect">
-            <a:avLst/>
-          </a:prstGeom>
-          <a:noFill/>
-        </p:spPr>
-        <p:txBody>
-          <a:bodyPr wrap="square" rtlCol="0">
-            <a:spAutoFit/>
-          </a:bodyPr>
-          <a:lstStyle/>
-          <a:p>
-            <a:pPr algn="just"/>
-            <a:r>
-              <a:rPr lang="en-US" sz="2400" dirty="0" err="1" smtClean="0"/>
-              <a:t>Sdsds</a:t>
-            </a:r>
-            <a:r>
-              <a:rPr lang="en-US" sz="2400" dirty="0" smtClean="0"/>
-              <a:t> </a:t>
-            </a:r>
-            <a:r>
-              <a:rPr lang="en-US" sz="2400" dirty="0" err="1" smtClean="0"/>
-              <a:t>dsdsdsd</a:t>
-            </a:r>
-            <a:r>
-              <a:rPr lang="en-US" sz="2400" dirty="0" smtClean="0"/>
-              <a:t> </a:t>
-            </a:r>
-            <a:r>
-              <a:rPr lang="en-US" sz="2400" dirty="0" err="1" smtClean="0"/>
-              <a:t>lask</a:t>
-            </a:r>
-            <a:r>
-              <a:rPr lang="en-US" sz="2400" dirty="0" smtClean="0"/>
-              <a:t> </a:t>
-            </a:r>
-            <a:r>
-              <a:rPr lang="en-US" sz="2400" dirty="0" err="1" smtClean="0"/>
-              <a:t>döka</a:t>
-            </a:r>
-            <a:r>
-              <a:rPr lang="en-US" sz="2400" dirty="0" smtClean="0"/>
-              <a:t>  </a:t>
-            </a:r>
-            <a:r>
-              <a:rPr lang="en-US" sz="2400" dirty="0" err="1" smtClean="0"/>
-              <a:t>ösldkö</a:t>
-            </a:r>
-            <a:r>
-              <a:rPr lang="en-US" sz="2400" dirty="0" smtClean="0"/>
-              <a:t> </a:t>
-            </a:r>
-            <a:r>
-              <a:rPr lang="en-US" sz="2400" dirty="0" err="1" smtClean="0"/>
-              <a:t>laskd</a:t>
-            </a:r>
-            <a:r>
-              <a:rPr lang="en-US" sz="2400" dirty="0" smtClean="0"/>
-              <a:t> </a:t>
-            </a:r>
-            <a:r>
-              <a:rPr lang="en-US" sz="2400" dirty="0" err="1" smtClean="0"/>
-              <a:t>öka</a:t>
-            </a:r>
-            <a:r>
-              <a:rPr lang="en-US" sz="2400" dirty="0" smtClean="0"/>
-              <a:t> </a:t>
-            </a:r>
-            <a:r>
-              <a:rPr lang="en-US" sz="2400" dirty="0" err="1" smtClean="0"/>
-              <a:t>sdölkasdöl</a:t>
-            </a:r>
-            <a:r>
-              <a:rPr lang="en-US" sz="2400" dirty="0" smtClean="0"/>
-              <a:t> </a:t>
-            </a:r>
-            <a:r>
-              <a:rPr lang="en-US" sz="2400" dirty="0" err="1" smtClean="0"/>
-              <a:t>kölas</a:t>
-            </a:r>
-            <a:r>
-              <a:rPr lang="en-US" sz="2400" dirty="0" smtClean="0"/>
-              <a:t> </a:t>
-            </a:r>
-            <a:r>
-              <a:rPr lang="en-US" sz="2400" dirty="0" err="1" smtClean="0"/>
-              <a:t>kklj</a:t>
-            </a:r>
-            <a:r>
-              <a:rPr lang="en-US" sz="2400" dirty="0" smtClean="0"/>
-              <a:t> </a:t>
-            </a:r>
-            <a:r>
-              <a:rPr lang="en-US" sz="2400" dirty="0" err="1" smtClean="0"/>
-              <a:t>kjkjasd</a:t>
-            </a:r>
-            <a:r>
-              <a:rPr lang="en-US" sz="2400" dirty="0" smtClean="0"/>
-              <a:t> </a:t>
-            </a:r>
-            <a:r>
-              <a:rPr lang="en-US" sz="2400" dirty="0" err="1" smtClean="0"/>
-              <a:t>lkjks</a:t>
-            </a:r>
-            <a:r>
-              <a:rPr lang="en-US" sz="2400" dirty="0" smtClean="0"/>
-              <a:t> </a:t>
-            </a:r>
-            <a:r>
-              <a:rPr lang="en-US" sz="2400" dirty="0" err="1" smtClean="0"/>
-              <a:t>lkjdse</a:t>
-            </a:r>
-            <a:r>
-              <a:rPr lang="en-US" sz="2400" dirty="0" smtClean="0"/>
-              <a:t> </a:t>
-            </a:r>
-            <a:r>
-              <a:rPr lang="en-US" sz="2400" dirty="0" err="1" smtClean="0"/>
-              <a:t>lkerkjasd</a:t>
-            </a:r>
-            <a:r>
-              <a:rPr lang="en-US" sz="2400" dirty="0" smtClean="0"/>
-              <a:t> </a:t>
-            </a:r>
-            <a:r>
-              <a:rPr lang="en-US" sz="2400" dirty="0" err="1" smtClean="0"/>
-              <a:t>sadlkmsd</a:t>
-            </a:r>
-            <a:r>
-              <a:rPr lang="en-US" sz="2400" dirty="0" smtClean="0"/>
-              <a:t> </a:t>
-            </a:r>
-            <a:r>
-              <a:rPr lang="en-US" sz="2400" dirty="0" err="1" smtClean="0"/>
-              <a:t>salkdjkj</a:t>
-            </a:r>
-            <a:r>
-              <a:rPr lang="en-US" sz="2400" dirty="0" smtClean="0"/>
-              <a:t> sad </a:t>
-            </a:r>
-            <a:r>
-              <a:rPr lang="en-US" sz="2400" dirty="0" err="1" smtClean="0"/>
-              <a:t>sadklkjsad</a:t>
-            </a:r>
-            <a:r>
-              <a:rPr lang="en-US" sz="2400" dirty="0" smtClean="0"/>
-              <a:t> </a:t>
-            </a:r>
-            <a:r>
-              <a:rPr lang="en-US" sz="2400" dirty="0" err="1" smtClean="0"/>
-              <a:t>klasdlkj</a:t>
-            </a:r>
-            <a:r>
-              <a:rPr lang="en-US" sz="2400" dirty="0" smtClean="0"/>
-              <a:t> </a:t>
-            </a:r>
-            <a:r>
-              <a:rPr lang="en-US" sz="2400" dirty="0" err="1" smtClean="0"/>
-              <a:t>asdkjl</a:t>
-            </a:r>
-            <a:r>
-              <a:rPr lang="en-US" sz="2400" dirty="0" smtClean="0"/>
-              <a:t>  </a:t>
-            </a:r>
-            <a:r>
-              <a:rPr lang="en-US" sz="2400" dirty="0" err="1" smtClean="0"/>
-              <a:t>kas</a:t>
-            </a:r>
-            <a:r>
-              <a:rPr lang="en-US" sz="2400" dirty="0" smtClean="0"/>
-              <a:t> </a:t>
-            </a:r>
-            <a:r>
-              <a:rPr lang="en-US" sz="2400" dirty="0" err="1" smtClean="0"/>
-              <a:t>jdklsa</a:t>
-            </a:r>
-            <a:r>
-              <a:rPr lang="en-US" sz="2400" dirty="0" smtClean="0"/>
-              <a:t> </a:t>
-            </a:r>
-            <a:r>
-              <a:rPr lang="en-US" sz="2400" dirty="0" err="1" smtClean="0"/>
-              <a:t>klasjdkjasdlkj</a:t>
-            </a:r>
-            <a:r>
-              <a:rPr lang="en-US" sz="2400" dirty="0" smtClean="0"/>
-              <a:t> </a:t>
-            </a:r>
-            <a:r>
-              <a:rPr lang="en-US" sz="2400" dirty="0" err="1" smtClean="0"/>
-              <a:t>dsadk</a:t>
-            </a:r>
-            <a:r>
-              <a:rPr lang="en-US" sz="2400" dirty="0" smtClean="0"/>
-              <a:t> </a:t>
-            </a:r>
-            <a:r>
-              <a:rPr lang="en-US" sz="2400" dirty="0" err="1" smtClean="0"/>
-              <a:t>lkasdjlaksjd</a:t>
-            </a:r>
-            <a:r>
-              <a:rPr lang="en-US" sz="2400" dirty="0" smtClean="0"/>
-              <a:t> </a:t>
-            </a:r>
-            <a:r>
-              <a:rPr lang="en-US" sz="2400" dirty="0" err="1" smtClean="0"/>
-              <a:t>Sdsds</a:t>
-            </a:r>
-            <a:r>
-              <a:rPr lang="en-US" sz="2400" dirty="0" smtClean="0"/>
-              <a:t> </a:t>
-            </a:r>
-            <a:r>
-              <a:rPr lang="en-US" sz="2400" dirty="0" err="1" smtClean="0"/>
-              <a:t>dsdsdsd</a:t>
-            </a:r>
-            <a:r>
-              <a:rPr lang="en-US" sz="2400" dirty="0" smtClean="0"/>
-              <a:t> </a:t>
-            </a:r>
-            <a:r>
-              <a:rPr lang="en-US" sz="2400" dirty="0" err="1" smtClean="0"/>
-              <a:t>lask</a:t>
-            </a:r>
-            <a:r>
-              <a:rPr lang="en-US" sz="2400" dirty="0" smtClean="0"/>
-              <a:t> </a:t>
-            </a:r>
-            <a:r>
-              <a:rPr lang="en-US" sz="2400" dirty="0" err="1" smtClean="0"/>
-              <a:t>döka</a:t>
-            </a:r>
-            <a:r>
-              <a:rPr lang="en-US" sz="2400" dirty="0" smtClean="0"/>
-              <a:t>  </a:t>
-            </a:r>
-            <a:r>
-              <a:rPr lang="en-US" sz="2400" dirty="0" err="1" smtClean="0"/>
-              <a:t>ösldkö</a:t>
+              <a:rPr lang="en-US" sz="2400" dirty="0" smtClean="0"/>
+              <a:t>For determining top actors and actresses, we took these, who occur in more than 10 movies. The top actors of all movies had already been dead for several years. That’s the reason we made another ranking considering just movies of the last 10 years. </a:t>
             </a:r>
             <a:endParaRPr lang="en-US" sz="2400" dirty="0"/>
           </a:p>
@@ -5610,7 +3876,7 @@
           <p:nvPr/>
         </p:nvPicPr>
         <p:blipFill>
-          <a:blip r:embed="rId7" cstate="print">
+          <a:blip r:embed="rId5" cstate="print">
             <a:biLevel thresh="25000"/>
             <a:extLst>
               <a:ext uri="{28A0092B-C50C-407E-A947-70E740481C1C}">
@@ -6155,6 +4421,1100 @@
           </a:p>
           <a:p>
             <a:endParaRPr lang="en-US" dirty="0"/>
+          </a:p>
+        </p:txBody>
+      </p:sp>
+      <p:grpSp>
+        <p:nvGrpSpPr>
+          <p:cNvPr id="54" name="Gruppieren 53"/>
+          <p:cNvGrpSpPr/>
+          <p:nvPr/>
+        </p:nvGrpSpPr>
+        <p:grpSpPr>
+          <a:xfrm>
+            <a:off x="55887" y="16178416"/>
+            <a:ext cx="9664113" cy="4991909"/>
+            <a:chOff x="10206225" y="6568393"/>
+            <a:chExt cx="9664113" cy="4991909"/>
+          </a:xfrm>
+        </p:grpSpPr>
+        <p:pic>
+          <p:nvPicPr>
+            <p:cNvPr id="50" name="Grafik 49"/>
+            <p:cNvPicPr>
+              <a:picLocks noChangeAspect="1"/>
+            </p:cNvPicPr>
+            <p:nvPr/>
+          </p:nvPicPr>
+          <p:blipFill>
+            <a:blip r:embed="rId6">
+              <a:extLst>
+                <a:ext uri="{28A0092B-C50C-407E-A947-70E740481C1C}">
+                  <a14:useLocalDpi xmlns:a14="http://schemas.microsoft.com/office/drawing/2010/main" val="0"/>
+                </a:ext>
+              </a:extLst>
+            </a:blip>
+            <a:stretch>
+              <a:fillRect/>
+            </a:stretch>
+          </p:blipFill>
+          <p:spPr>
+            <a:xfrm>
+              <a:off x="15192910" y="7787876"/>
+              <a:ext cx="4677428" cy="3772426"/>
+            </a:xfrm>
+            <a:prstGeom prst="rect">
+              <a:avLst/>
+            </a:prstGeom>
+          </p:spPr>
+        </p:pic>
+        <p:pic>
+          <p:nvPicPr>
+            <p:cNvPr id="51" name="Grafik 50"/>
+            <p:cNvPicPr>
+              <a:picLocks noChangeAspect="1"/>
+            </p:cNvPicPr>
+            <p:nvPr/>
+          </p:nvPicPr>
+          <p:blipFill>
+            <a:blip r:embed="rId7">
+              <a:extLst>
+                <a:ext uri="{28A0092B-C50C-407E-A947-70E740481C1C}">
+                  <a14:useLocalDpi xmlns:a14="http://schemas.microsoft.com/office/drawing/2010/main" val="0"/>
+                </a:ext>
+              </a:extLst>
+            </a:blip>
+            <a:stretch>
+              <a:fillRect/>
+            </a:stretch>
+          </p:blipFill>
+          <p:spPr>
+            <a:xfrm>
+              <a:off x="10206225" y="6568393"/>
+              <a:ext cx="4677428" cy="3162741"/>
+            </a:xfrm>
+            <a:prstGeom prst="rect">
+              <a:avLst/>
+            </a:prstGeom>
+          </p:spPr>
+        </p:pic>
+        <p:pic>
+          <p:nvPicPr>
+            <p:cNvPr id="52" name="Grafik 51"/>
+            <p:cNvPicPr>
+              <a:picLocks noChangeAspect="1"/>
+            </p:cNvPicPr>
+            <p:nvPr/>
+          </p:nvPicPr>
+          <p:blipFill>
+            <a:blip r:embed="rId8">
+              <a:extLst>
+                <a:ext uri="{28A0092B-C50C-407E-A947-70E740481C1C}">
+                  <a14:useLocalDpi xmlns:a14="http://schemas.microsoft.com/office/drawing/2010/main" val="0"/>
+                </a:ext>
+              </a:extLst>
+            </a:blip>
+            <a:stretch>
+              <a:fillRect/>
+            </a:stretch>
+          </p:blipFill>
+          <p:spPr>
+            <a:xfrm>
+              <a:off x="10799999" y="9731133"/>
+              <a:ext cx="3990913" cy="1829169"/>
+            </a:xfrm>
+            <a:prstGeom prst="rect">
+              <a:avLst/>
+            </a:prstGeom>
+          </p:spPr>
+        </p:pic>
+        <p:pic>
+          <p:nvPicPr>
+            <p:cNvPr id="53" name="Grafik 52"/>
+            <p:cNvPicPr>
+              <a:picLocks noChangeAspect="1"/>
+            </p:cNvPicPr>
+            <p:nvPr/>
+          </p:nvPicPr>
+          <p:blipFill rotWithShape="1">
+            <a:blip r:embed="rId9">
+              <a:extLst>
+                <a:ext uri="{28A0092B-C50C-407E-A947-70E740481C1C}">
+                  <a14:useLocalDpi xmlns:a14="http://schemas.microsoft.com/office/drawing/2010/main" val="0"/>
+                </a:ext>
+              </a:extLst>
+            </a:blip>
+            <a:srcRect l="84951" t="38777" b="40335"/>
+            <a:stretch/>
+          </p:blipFill>
+          <p:spPr>
+            <a:xfrm>
+              <a:off x="18855734" y="6678081"/>
+              <a:ext cx="996004" cy="895350"/>
+            </a:xfrm>
+            <a:prstGeom prst="rect">
+              <a:avLst/>
+            </a:prstGeom>
+          </p:spPr>
+        </p:pic>
+      </p:grpSp>
+      <p:grpSp>
+        <p:nvGrpSpPr>
+          <p:cNvPr id="55" name="Gruppieren 54"/>
+          <p:cNvGrpSpPr/>
+          <p:nvPr/>
+        </p:nvGrpSpPr>
+        <p:grpSpPr>
+          <a:xfrm>
+            <a:off x="720000" y="14014892"/>
+            <a:ext cx="4320000" cy="540000"/>
+            <a:chOff x="720000" y="15480000"/>
+            <a:chExt cx="4320000" cy="540000"/>
+          </a:xfrm>
+        </p:grpSpPr>
+        <p:sp>
+          <p:nvSpPr>
+            <p:cNvPr id="56" name="Rechteck 55"/>
+            <p:cNvSpPr/>
+            <p:nvPr/>
+          </p:nvSpPr>
+          <p:spPr>
+            <a:xfrm>
+              <a:off x="720000" y="15480000"/>
+              <a:ext cx="540000" cy="540000"/>
+            </a:xfrm>
+            <a:prstGeom prst="rect">
+              <a:avLst/>
+            </a:prstGeom>
+            <a:solidFill>
+              <a:schemeClr val="bg1">
+                <a:lumMod val="85000"/>
+              </a:schemeClr>
+            </a:solidFill>
+            <a:ln>
+              <a:noFill/>
+            </a:ln>
+          </p:spPr>
+          <p:style>
+            <a:lnRef idx="2">
+              <a:schemeClr val="accent3">
+                <a:shade val="50000"/>
+              </a:schemeClr>
+            </a:lnRef>
+            <a:fillRef idx="1">
+              <a:schemeClr val="accent3"/>
+            </a:fillRef>
+            <a:effectRef idx="0">
+              <a:schemeClr val="accent3"/>
+            </a:effectRef>
+            <a:fontRef idx="minor">
+              <a:schemeClr val="lt1"/>
+            </a:fontRef>
+          </p:style>
+          <p:txBody>
+            <a:bodyPr rtlCol="0" anchor="ctr"/>
+            <a:lstStyle/>
+            <a:p>
+              <a:pPr algn="ctr"/>
+              <a:endParaRPr lang="en-US"/>
+            </a:p>
+          </p:txBody>
+        </p:sp>
+        <p:sp>
+          <p:nvSpPr>
+            <p:cNvPr id="58" name="Rechteck 57"/>
+            <p:cNvSpPr/>
+            <p:nvPr/>
+          </p:nvSpPr>
+          <p:spPr>
+            <a:xfrm>
+              <a:off x="1440000" y="15480000"/>
+              <a:ext cx="3600000" cy="540000"/>
+            </a:xfrm>
+            <a:prstGeom prst="rect">
+              <a:avLst/>
+            </a:prstGeom>
+            <a:solidFill>
+              <a:schemeClr val="bg1">
+                <a:lumMod val="65000"/>
+              </a:schemeClr>
+            </a:solidFill>
+            <a:ln>
+              <a:noFill/>
+            </a:ln>
+          </p:spPr>
+          <p:style>
+            <a:lnRef idx="2">
+              <a:schemeClr val="accent1">
+                <a:shade val="50000"/>
+              </a:schemeClr>
+            </a:lnRef>
+            <a:fillRef idx="1">
+              <a:schemeClr val="accent1"/>
+            </a:fillRef>
+            <a:effectRef idx="0">
+              <a:schemeClr val="accent1"/>
+            </a:effectRef>
+            <a:fontRef idx="minor">
+              <a:schemeClr val="lt1"/>
+            </a:fontRef>
+          </p:style>
+          <p:txBody>
+            <a:bodyPr rtlCol="0" anchor="ctr"/>
+            <a:lstStyle/>
+            <a:p>
+              <a:pPr algn="ctr"/>
+              <a:r>
+                <a:rPr lang="en-US" sz="3200" dirty="0" smtClean="0">
+                  <a:latin typeface="Franklin Gothic Medium" panose="020B0603020102020204" pitchFamily="34" charset="0"/>
+                  <a:cs typeface="Aharoni" panose="02010803020104030203" pitchFamily="2" charset="-79"/>
+                </a:rPr>
+                <a:t>Keywords</a:t>
+              </a:r>
+              <a:endParaRPr lang="en-US" sz="3200" b="1" dirty="0">
+                <a:latin typeface="Franklin Gothic Medium" panose="020B0603020102020204" pitchFamily="34" charset="0"/>
+                <a:cs typeface="Aharoni" panose="02010803020104030203" pitchFamily="2" charset="-79"/>
+              </a:endParaRPr>
+            </a:p>
+          </p:txBody>
+        </p:sp>
+      </p:grpSp>
+      <p:grpSp>
+        <p:nvGrpSpPr>
+          <p:cNvPr id="61" name="Gruppieren 60"/>
+          <p:cNvGrpSpPr/>
+          <p:nvPr/>
+        </p:nvGrpSpPr>
+        <p:grpSpPr>
+          <a:xfrm>
+            <a:off x="10800001" y="8853646"/>
+            <a:ext cx="4320000" cy="540000"/>
+            <a:chOff x="720000" y="15480000"/>
+            <a:chExt cx="4320000" cy="540000"/>
+          </a:xfrm>
+        </p:grpSpPr>
+        <p:sp>
+          <p:nvSpPr>
+            <p:cNvPr id="62" name="Rechteck 61"/>
+            <p:cNvSpPr/>
+            <p:nvPr/>
+          </p:nvSpPr>
+          <p:spPr>
+            <a:xfrm>
+              <a:off x="720000" y="15480000"/>
+              <a:ext cx="540000" cy="540000"/>
+            </a:xfrm>
+            <a:prstGeom prst="rect">
+              <a:avLst/>
+            </a:prstGeom>
+            <a:solidFill>
+              <a:schemeClr val="bg1">
+                <a:lumMod val="85000"/>
+              </a:schemeClr>
+            </a:solidFill>
+            <a:ln>
+              <a:noFill/>
+            </a:ln>
+          </p:spPr>
+          <p:style>
+            <a:lnRef idx="2">
+              <a:schemeClr val="accent3">
+                <a:shade val="50000"/>
+              </a:schemeClr>
+            </a:lnRef>
+            <a:fillRef idx="1">
+              <a:schemeClr val="accent3"/>
+            </a:fillRef>
+            <a:effectRef idx="0">
+              <a:schemeClr val="accent3"/>
+            </a:effectRef>
+            <a:fontRef idx="minor">
+              <a:schemeClr val="lt1"/>
+            </a:fontRef>
+          </p:style>
+          <p:txBody>
+            <a:bodyPr rtlCol="0" anchor="ctr"/>
+            <a:lstStyle/>
+            <a:p>
+              <a:pPr algn="ctr"/>
+              <a:endParaRPr lang="en-US"/>
+            </a:p>
+          </p:txBody>
+        </p:sp>
+        <p:sp>
+          <p:nvSpPr>
+            <p:cNvPr id="63" name="Rechteck 62"/>
+            <p:cNvSpPr/>
+            <p:nvPr/>
+          </p:nvSpPr>
+          <p:spPr>
+            <a:xfrm>
+              <a:off x="1440000" y="15480000"/>
+              <a:ext cx="3600000" cy="540000"/>
+            </a:xfrm>
+            <a:prstGeom prst="rect">
+              <a:avLst/>
+            </a:prstGeom>
+            <a:solidFill>
+              <a:schemeClr val="bg1">
+                <a:lumMod val="65000"/>
+              </a:schemeClr>
+            </a:solidFill>
+            <a:ln>
+              <a:noFill/>
+            </a:ln>
+          </p:spPr>
+          <p:style>
+            <a:lnRef idx="2">
+              <a:schemeClr val="accent1">
+                <a:shade val="50000"/>
+              </a:schemeClr>
+            </a:lnRef>
+            <a:fillRef idx="1">
+              <a:schemeClr val="accent1"/>
+            </a:fillRef>
+            <a:effectRef idx="0">
+              <a:schemeClr val="accent1"/>
+            </a:effectRef>
+            <a:fontRef idx="minor">
+              <a:schemeClr val="lt1"/>
+            </a:fontRef>
+          </p:style>
+          <p:txBody>
+            <a:bodyPr rtlCol="0" anchor="ctr"/>
+            <a:lstStyle/>
+            <a:p>
+              <a:pPr algn="ctr"/>
+              <a:r>
+                <a:rPr lang="en-US" sz="3200" dirty="0" smtClean="0">
+                  <a:latin typeface="Franklin Gothic Medium" panose="020B0603020102020204" pitchFamily="34" charset="0"/>
+                  <a:cs typeface="Aharoni" panose="02010803020104030203" pitchFamily="2" charset="-79"/>
+                </a:rPr>
+                <a:t>Genre</a:t>
+              </a:r>
+              <a:endParaRPr lang="en-US" sz="3200" b="1" dirty="0">
+                <a:latin typeface="Franklin Gothic Medium" panose="020B0603020102020204" pitchFamily="34" charset="0"/>
+                <a:cs typeface="Aharoni" panose="02010803020104030203" pitchFamily="2" charset="-79"/>
+              </a:endParaRPr>
+            </a:p>
+          </p:txBody>
+        </p:sp>
+      </p:grpSp>
+      <p:grpSp>
+        <p:nvGrpSpPr>
+          <p:cNvPr id="64" name="Gruppieren 63"/>
+          <p:cNvGrpSpPr/>
+          <p:nvPr/>
+        </p:nvGrpSpPr>
+        <p:grpSpPr>
+          <a:xfrm>
+            <a:off x="10800000" y="2988000"/>
+            <a:ext cx="4320000" cy="540000"/>
+            <a:chOff x="720000" y="15480000"/>
+            <a:chExt cx="4320000" cy="540000"/>
+          </a:xfrm>
+        </p:grpSpPr>
+        <p:sp>
+          <p:nvSpPr>
+            <p:cNvPr id="65" name="Rechteck 64"/>
+            <p:cNvSpPr/>
+            <p:nvPr/>
+          </p:nvSpPr>
+          <p:spPr>
+            <a:xfrm>
+              <a:off x="720000" y="15480000"/>
+              <a:ext cx="540000" cy="540000"/>
+            </a:xfrm>
+            <a:prstGeom prst="rect">
+              <a:avLst/>
+            </a:prstGeom>
+            <a:solidFill>
+              <a:schemeClr val="bg1">
+                <a:lumMod val="85000"/>
+              </a:schemeClr>
+            </a:solidFill>
+            <a:ln>
+              <a:noFill/>
+            </a:ln>
+          </p:spPr>
+          <p:style>
+            <a:lnRef idx="2">
+              <a:schemeClr val="accent3">
+                <a:shade val="50000"/>
+              </a:schemeClr>
+            </a:lnRef>
+            <a:fillRef idx="1">
+              <a:schemeClr val="accent3"/>
+            </a:fillRef>
+            <a:effectRef idx="0">
+              <a:schemeClr val="accent3"/>
+            </a:effectRef>
+            <a:fontRef idx="minor">
+              <a:schemeClr val="lt1"/>
+            </a:fontRef>
+          </p:style>
+          <p:txBody>
+            <a:bodyPr rtlCol="0" anchor="ctr"/>
+            <a:lstStyle/>
+            <a:p>
+              <a:pPr algn="ctr"/>
+              <a:endParaRPr lang="en-US"/>
+            </a:p>
+          </p:txBody>
+        </p:sp>
+        <p:sp>
+          <p:nvSpPr>
+            <p:cNvPr id="66" name="Rechteck 65"/>
+            <p:cNvSpPr/>
+            <p:nvPr/>
+          </p:nvSpPr>
+          <p:spPr>
+            <a:xfrm>
+              <a:off x="1440000" y="15480000"/>
+              <a:ext cx="3600000" cy="540000"/>
+            </a:xfrm>
+            <a:prstGeom prst="rect">
+              <a:avLst/>
+            </a:prstGeom>
+            <a:solidFill>
+              <a:schemeClr val="bg1">
+                <a:lumMod val="65000"/>
+              </a:schemeClr>
+            </a:solidFill>
+            <a:ln>
+              <a:noFill/>
+            </a:ln>
+          </p:spPr>
+          <p:style>
+            <a:lnRef idx="2">
+              <a:schemeClr val="accent1">
+                <a:shade val="50000"/>
+              </a:schemeClr>
+            </a:lnRef>
+            <a:fillRef idx="1">
+              <a:schemeClr val="accent1"/>
+            </a:fillRef>
+            <a:effectRef idx="0">
+              <a:schemeClr val="accent1"/>
+            </a:effectRef>
+            <a:fontRef idx="minor">
+              <a:schemeClr val="lt1"/>
+            </a:fontRef>
+          </p:style>
+          <p:txBody>
+            <a:bodyPr rtlCol="0" anchor="ctr"/>
+            <a:lstStyle/>
+            <a:p>
+              <a:pPr algn="ctr"/>
+              <a:r>
+                <a:rPr lang="en-US" sz="3200" dirty="0" smtClean="0">
+                  <a:latin typeface="Franklin Gothic Medium" panose="020B0603020102020204" pitchFamily="34" charset="0"/>
+                  <a:cs typeface="Aharoni" panose="02010803020104030203" pitchFamily="2" charset="-79"/>
+                </a:rPr>
+                <a:t>Actor/Actress</a:t>
+              </a:r>
+              <a:endParaRPr lang="en-US" sz="3200" b="1" dirty="0">
+                <a:latin typeface="Franklin Gothic Medium" panose="020B0603020102020204" pitchFamily="34" charset="0"/>
+                <a:cs typeface="Aharoni" panose="02010803020104030203" pitchFamily="2" charset="-79"/>
+              </a:endParaRPr>
+            </a:p>
+          </p:txBody>
+        </p:sp>
+      </p:grpSp>
+      <p:grpSp>
+        <p:nvGrpSpPr>
+          <p:cNvPr id="74" name="Gruppieren 73"/>
+          <p:cNvGrpSpPr/>
+          <p:nvPr/>
+        </p:nvGrpSpPr>
+        <p:grpSpPr>
+          <a:xfrm>
+            <a:off x="10800000" y="17835245"/>
+            <a:ext cx="4320000" cy="540000"/>
+            <a:chOff x="720000" y="15480000"/>
+            <a:chExt cx="4320000" cy="540000"/>
+          </a:xfrm>
+        </p:grpSpPr>
+        <p:sp>
+          <p:nvSpPr>
+            <p:cNvPr id="75" name="Rechteck 74"/>
+            <p:cNvSpPr/>
+            <p:nvPr/>
+          </p:nvSpPr>
+          <p:spPr>
+            <a:xfrm>
+              <a:off x="720000" y="15480000"/>
+              <a:ext cx="540000" cy="540000"/>
+            </a:xfrm>
+            <a:prstGeom prst="rect">
+              <a:avLst/>
+            </a:prstGeom>
+            <a:solidFill>
+              <a:schemeClr val="bg1">
+                <a:lumMod val="85000"/>
+              </a:schemeClr>
+            </a:solidFill>
+            <a:ln>
+              <a:noFill/>
+            </a:ln>
+          </p:spPr>
+          <p:style>
+            <a:lnRef idx="2">
+              <a:schemeClr val="accent3">
+                <a:shade val="50000"/>
+              </a:schemeClr>
+            </a:lnRef>
+            <a:fillRef idx="1">
+              <a:schemeClr val="accent3"/>
+            </a:fillRef>
+            <a:effectRef idx="0">
+              <a:schemeClr val="accent3"/>
+            </a:effectRef>
+            <a:fontRef idx="minor">
+              <a:schemeClr val="lt1"/>
+            </a:fontRef>
+          </p:style>
+          <p:txBody>
+            <a:bodyPr rtlCol="0" anchor="ctr"/>
+            <a:lstStyle/>
+            <a:p>
+              <a:pPr algn="ctr"/>
+              <a:endParaRPr lang="en-US"/>
+            </a:p>
+          </p:txBody>
+        </p:sp>
+        <p:sp>
+          <p:nvSpPr>
+            <p:cNvPr id="76" name="Rechteck 75"/>
+            <p:cNvSpPr/>
+            <p:nvPr/>
+          </p:nvSpPr>
+          <p:spPr>
+            <a:xfrm>
+              <a:off x="1440000" y="15480000"/>
+              <a:ext cx="3600000" cy="540000"/>
+            </a:xfrm>
+            <a:prstGeom prst="rect">
+              <a:avLst/>
+            </a:prstGeom>
+            <a:solidFill>
+              <a:schemeClr val="bg1">
+                <a:lumMod val="65000"/>
+              </a:schemeClr>
+            </a:solidFill>
+            <a:ln>
+              <a:noFill/>
+            </a:ln>
+          </p:spPr>
+          <p:style>
+            <a:lnRef idx="2">
+              <a:schemeClr val="accent1">
+                <a:shade val="50000"/>
+              </a:schemeClr>
+            </a:lnRef>
+            <a:fillRef idx="1">
+              <a:schemeClr val="accent1"/>
+            </a:fillRef>
+            <a:effectRef idx="0">
+              <a:schemeClr val="accent1"/>
+            </a:effectRef>
+            <a:fontRef idx="minor">
+              <a:schemeClr val="lt1"/>
+            </a:fontRef>
+          </p:style>
+          <p:txBody>
+            <a:bodyPr rtlCol="0" anchor="ctr"/>
+            <a:lstStyle/>
+            <a:p>
+              <a:pPr algn="ctr"/>
+              <a:r>
+                <a:rPr lang="en-US" sz="3200" dirty="0" smtClean="0">
+                  <a:latin typeface="Franklin Gothic Medium" panose="020B0603020102020204" pitchFamily="34" charset="0"/>
+                  <a:cs typeface="Aharoni" panose="02010803020104030203" pitchFamily="2" charset="-79"/>
+                </a:rPr>
+                <a:t>Perfect Movie</a:t>
+              </a:r>
+              <a:endParaRPr lang="en-US" sz="3200" b="1" dirty="0">
+                <a:latin typeface="Franklin Gothic Medium" panose="020B0603020102020204" pitchFamily="34" charset="0"/>
+                <a:cs typeface="Aharoni" panose="02010803020104030203" pitchFamily="2" charset="-79"/>
+              </a:endParaRPr>
+            </a:p>
+          </p:txBody>
+        </p:sp>
+      </p:grpSp>
+      <p:sp>
+        <p:nvSpPr>
+          <p:cNvPr id="78" name="Textfeld 77"/>
+          <p:cNvSpPr txBox="1"/>
+          <p:nvPr/>
+        </p:nvSpPr>
+        <p:spPr>
+          <a:xfrm>
+            <a:off x="720000" y="14713848"/>
+            <a:ext cx="9000000" cy="1200329"/>
+          </a:xfrm>
+          <a:prstGeom prst="rect">
+            <a:avLst/>
+          </a:prstGeom>
+          <a:noFill/>
+        </p:spPr>
+        <p:txBody>
+          <a:bodyPr wrap="square" rtlCol="0">
+            <a:spAutoFit/>
+          </a:bodyPr>
+          <a:lstStyle/>
+          <a:p>
+            <a:pPr algn="just"/>
+            <a:r>
+              <a:rPr lang="en-US" sz="2400" dirty="0" smtClean="0"/>
+              <a:t>For the evaluation, we just took these keywords, which occurs in more than 50 movies. We also used them to generate a top/flop ranking of relationships and animals. </a:t>
+            </a:r>
+            <a:endParaRPr lang="en-US" sz="2400" dirty="0"/>
+          </a:p>
+        </p:txBody>
+      </p:sp>
+      <p:sp>
+        <p:nvSpPr>
+          <p:cNvPr id="79" name="Textfeld 78"/>
+          <p:cNvSpPr txBox="1"/>
+          <p:nvPr/>
+        </p:nvSpPr>
+        <p:spPr>
+          <a:xfrm>
+            <a:off x="10799999" y="9587959"/>
+            <a:ext cx="9000000" cy="1200329"/>
+          </a:xfrm>
+          <a:prstGeom prst="rect">
+            <a:avLst/>
+          </a:prstGeom>
+          <a:noFill/>
+        </p:spPr>
+        <p:txBody>
+          <a:bodyPr wrap="square" rtlCol="0">
+            <a:spAutoFit/>
+          </a:bodyPr>
+          <a:lstStyle/>
+          <a:p>
+            <a:pPr algn="just"/>
+            <a:r>
+              <a:rPr lang="en-US" sz="2400" dirty="0" smtClean="0"/>
+              <a:t>There are 20 genres in total inside the dataset. For this analysis we just used movies with over 1000 votes to get a more evaluable result. The following plot shows, that …</a:t>
+            </a:r>
+            <a:endParaRPr lang="en-US" sz="2400" dirty="0"/>
+          </a:p>
+        </p:txBody>
+      </p:sp>
+      <p:sp>
+        <p:nvSpPr>
+          <p:cNvPr id="80" name="Textfeld 79"/>
+          <p:cNvSpPr txBox="1"/>
+          <p:nvPr/>
+        </p:nvSpPr>
+        <p:spPr>
+          <a:xfrm>
+            <a:off x="10799999" y="18602394"/>
+            <a:ext cx="9000000" cy="2677656"/>
+          </a:xfrm>
+          <a:prstGeom prst="rect">
+            <a:avLst/>
+          </a:prstGeom>
+          <a:noFill/>
+        </p:spPr>
+        <p:txBody>
+          <a:bodyPr wrap="square" rtlCol="0">
+            <a:spAutoFit/>
+          </a:bodyPr>
+          <a:lstStyle/>
+          <a:p>
+            <a:pPr algn="just"/>
+            <a:r>
+              <a:rPr lang="en-US" sz="2400" dirty="0" err="1" smtClean="0"/>
+              <a:t>Sdsds</a:t>
+            </a:r>
+            <a:r>
+              <a:rPr lang="en-US" sz="2400" dirty="0" smtClean="0"/>
+              <a:t> </a:t>
+            </a:r>
+            <a:r>
+              <a:rPr lang="en-US" sz="2400" dirty="0" err="1" smtClean="0"/>
+              <a:t>dsdsdsd</a:t>
+            </a:r>
+            <a:r>
+              <a:rPr lang="en-US" sz="2400" dirty="0" smtClean="0"/>
+              <a:t> </a:t>
+            </a:r>
+            <a:r>
+              <a:rPr lang="en-US" sz="2400" dirty="0" err="1" smtClean="0"/>
+              <a:t>lask</a:t>
+            </a:r>
+            <a:r>
+              <a:rPr lang="en-US" sz="2400" dirty="0" smtClean="0"/>
+              <a:t> </a:t>
+            </a:r>
+            <a:r>
+              <a:rPr lang="en-US" sz="2400" dirty="0" err="1" smtClean="0"/>
+              <a:t>döka</a:t>
+            </a:r>
+            <a:r>
+              <a:rPr lang="en-US" sz="2400" dirty="0" smtClean="0"/>
+              <a:t>  </a:t>
+            </a:r>
+            <a:r>
+              <a:rPr lang="en-US" sz="2400" dirty="0" err="1" smtClean="0"/>
+              <a:t>ösldkö</a:t>
+            </a:r>
+            <a:r>
+              <a:rPr lang="en-US" sz="2400" dirty="0" smtClean="0"/>
+              <a:t> </a:t>
+            </a:r>
+            <a:r>
+              <a:rPr lang="en-US" sz="2400" dirty="0" err="1" smtClean="0"/>
+              <a:t>laskd</a:t>
+            </a:r>
+            <a:r>
+              <a:rPr lang="en-US" sz="2400" dirty="0" smtClean="0"/>
+              <a:t> </a:t>
+            </a:r>
+            <a:r>
+              <a:rPr lang="en-US" sz="2400" dirty="0" err="1" smtClean="0"/>
+              <a:t>öka</a:t>
+            </a:r>
+            <a:r>
+              <a:rPr lang="en-US" sz="2400" dirty="0" smtClean="0"/>
+              <a:t> </a:t>
+            </a:r>
+            <a:r>
+              <a:rPr lang="en-US" sz="2400" dirty="0" err="1" smtClean="0"/>
+              <a:t>sdölkasdöl</a:t>
+            </a:r>
+            <a:r>
+              <a:rPr lang="en-US" sz="2400" dirty="0" smtClean="0"/>
+              <a:t> </a:t>
+            </a:r>
+            <a:r>
+              <a:rPr lang="en-US" sz="2400" dirty="0" err="1" smtClean="0"/>
+              <a:t>kölas</a:t>
+            </a:r>
+            <a:r>
+              <a:rPr lang="en-US" sz="2400" dirty="0" smtClean="0"/>
+              <a:t> </a:t>
+            </a:r>
+            <a:r>
+              <a:rPr lang="en-US" sz="2400" dirty="0" err="1" smtClean="0"/>
+              <a:t>kklj</a:t>
+            </a:r>
+            <a:r>
+              <a:rPr lang="en-US" sz="2400" dirty="0" smtClean="0"/>
+              <a:t> </a:t>
+            </a:r>
+            <a:r>
+              <a:rPr lang="en-US" sz="2400" dirty="0" err="1" smtClean="0"/>
+              <a:t>kjkjasd</a:t>
+            </a:r>
+            <a:r>
+              <a:rPr lang="en-US" sz="2400" dirty="0" smtClean="0"/>
+              <a:t> </a:t>
+            </a:r>
+            <a:r>
+              <a:rPr lang="en-US" sz="2400" dirty="0" err="1" smtClean="0"/>
+              <a:t>lkjks</a:t>
+            </a:r>
+            <a:r>
+              <a:rPr lang="en-US" sz="2400" dirty="0" smtClean="0"/>
+              <a:t> </a:t>
+            </a:r>
+            <a:r>
+              <a:rPr lang="en-US" sz="2400" dirty="0" err="1" smtClean="0"/>
+              <a:t>lkjdse</a:t>
+            </a:r>
+            <a:r>
+              <a:rPr lang="en-US" sz="2400" dirty="0" smtClean="0"/>
+              <a:t> </a:t>
+            </a:r>
+            <a:r>
+              <a:rPr lang="en-US" sz="2400" dirty="0" err="1" smtClean="0"/>
+              <a:t>lkerkjasd</a:t>
+            </a:r>
+            <a:r>
+              <a:rPr lang="en-US" sz="2400" dirty="0" smtClean="0"/>
+              <a:t> </a:t>
+            </a:r>
+            <a:r>
+              <a:rPr lang="en-US" sz="2400" dirty="0" err="1" smtClean="0"/>
+              <a:t>sadlkmsd</a:t>
+            </a:r>
+            <a:r>
+              <a:rPr lang="en-US" sz="2400" dirty="0" smtClean="0"/>
+              <a:t> </a:t>
+            </a:r>
+            <a:r>
+              <a:rPr lang="en-US" sz="2400" dirty="0" err="1" smtClean="0"/>
+              <a:t>salkdjkj</a:t>
+            </a:r>
+            <a:r>
+              <a:rPr lang="en-US" sz="2400" dirty="0" smtClean="0"/>
+              <a:t> sad </a:t>
+            </a:r>
+            <a:r>
+              <a:rPr lang="en-US" sz="2400" dirty="0" err="1" smtClean="0"/>
+              <a:t>sadklkjsad</a:t>
+            </a:r>
+            <a:r>
+              <a:rPr lang="en-US" sz="2400" dirty="0" smtClean="0"/>
+              <a:t> </a:t>
+            </a:r>
+            <a:r>
+              <a:rPr lang="en-US" sz="2400" dirty="0" err="1" smtClean="0"/>
+              <a:t>klasdlkj</a:t>
+            </a:r>
+            <a:r>
+              <a:rPr lang="en-US" sz="2400" dirty="0" smtClean="0"/>
+              <a:t> </a:t>
+            </a:r>
+            <a:r>
+              <a:rPr lang="en-US" sz="2400" dirty="0" err="1" smtClean="0"/>
+              <a:t>asdkjl</a:t>
+            </a:r>
+            <a:r>
+              <a:rPr lang="en-US" sz="2400" dirty="0" smtClean="0"/>
+              <a:t>  </a:t>
+            </a:r>
+            <a:r>
+              <a:rPr lang="en-US" sz="2400" dirty="0" err="1" smtClean="0"/>
+              <a:t>kas</a:t>
+            </a:r>
+            <a:r>
+              <a:rPr lang="en-US" sz="2400" dirty="0" smtClean="0"/>
+              <a:t> </a:t>
+            </a:r>
+            <a:r>
+              <a:rPr lang="en-US" sz="2400" dirty="0" err="1" smtClean="0"/>
+              <a:t>jdklsa</a:t>
+            </a:r>
+            <a:r>
+              <a:rPr lang="en-US" sz="2400" dirty="0" smtClean="0"/>
+              <a:t> </a:t>
+            </a:r>
+            <a:r>
+              <a:rPr lang="en-US" sz="2400" dirty="0" err="1" smtClean="0"/>
+              <a:t>klasjdkjasdlkj</a:t>
+            </a:r>
+            <a:r>
+              <a:rPr lang="en-US" sz="2400" dirty="0" smtClean="0"/>
+              <a:t> </a:t>
+            </a:r>
+            <a:r>
+              <a:rPr lang="en-US" sz="2400" dirty="0" err="1" smtClean="0"/>
+              <a:t>dsadk</a:t>
+            </a:r>
+            <a:r>
+              <a:rPr lang="en-US" sz="2400" dirty="0" smtClean="0"/>
+              <a:t> </a:t>
+            </a:r>
+            <a:r>
+              <a:rPr lang="en-US" sz="2400" dirty="0" err="1" smtClean="0"/>
+              <a:t>lkasdjlaksjd</a:t>
+            </a:r>
+            <a:r>
+              <a:rPr lang="en-US" sz="2400" dirty="0" smtClean="0"/>
+              <a:t> </a:t>
+            </a:r>
+            <a:r>
+              <a:rPr lang="en-US" sz="2400" dirty="0" err="1" smtClean="0"/>
+              <a:t>Sdsds</a:t>
+            </a:r>
+            <a:r>
+              <a:rPr lang="en-US" sz="2400" dirty="0" smtClean="0"/>
+              <a:t> </a:t>
+            </a:r>
+            <a:r>
+              <a:rPr lang="en-US" sz="2400" dirty="0" err="1" smtClean="0"/>
+              <a:t>dsdsdsd</a:t>
+            </a:r>
+            <a:r>
+              <a:rPr lang="en-US" sz="2400" dirty="0" smtClean="0"/>
+              <a:t> </a:t>
+            </a:r>
+            <a:r>
+              <a:rPr lang="en-US" sz="2400" dirty="0" err="1" smtClean="0"/>
+              <a:t>lask</a:t>
+            </a:r>
+            <a:r>
+              <a:rPr lang="en-US" sz="2400" dirty="0" smtClean="0"/>
+              <a:t> </a:t>
+            </a:r>
+            <a:r>
+              <a:rPr lang="en-US" sz="2400" dirty="0" err="1" smtClean="0"/>
+              <a:t>döka</a:t>
+            </a:r>
+            <a:r>
+              <a:rPr lang="en-US" sz="2400" dirty="0" smtClean="0"/>
+              <a:t>  </a:t>
+            </a:r>
+            <a:r>
+              <a:rPr lang="en-US" sz="2400" dirty="0" err="1" smtClean="0"/>
+              <a:t>ösldkö</a:t>
+            </a:r>
+            <a:r>
+              <a:rPr lang="en-US" sz="2400" dirty="0" smtClean="0"/>
+              <a:t> </a:t>
+            </a:r>
+            <a:r>
+              <a:rPr lang="en-US" sz="2400" dirty="0" err="1" smtClean="0"/>
+              <a:t>laskd</a:t>
+            </a:r>
+            <a:r>
+              <a:rPr lang="en-US" sz="2400" dirty="0" smtClean="0"/>
+              <a:t> </a:t>
+            </a:r>
+            <a:r>
+              <a:rPr lang="en-US" sz="2400" dirty="0" err="1" smtClean="0"/>
+              <a:t>öka</a:t>
+            </a:r>
+            <a:r>
+              <a:rPr lang="en-US" sz="2400" dirty="0" smtClean="0"/>
+              <a:t> </a:t>
+            </a:r>
+            <a:r>
+              <a:rPr lang="en-US" sz="2400" dirty="0" err="1" smtClean="0"/>
+              <a:t>sdölkasdöl</a:t>
+            </a:r>
+            <a:r>
+              <a:rPr lang="en-US" sz="2400" dirty="0" smtClean="0"/>
+              <a:t> </a:t>
+            </a:r>
+            <a:r>
+              <a:rPr lang="en-US" sz="2400" dirty="0" err="1" smtClean="0"/>
+              <a:t>kölas</a:t>
+            </a:r>
+            <a:r>
+              <a:rPr lang="en-US" sz="2400" dirty="0" smtClean="0"/>
+              <a:t> </a:t>
+            </a:r>
+            <a:r>
+              <a:rPr lang="en-US" sz="2400" dirty="0" err="1" smtClean="0"/>
+              <a:t>kklj</a:t>
+            </a:r>
+            <a:r>
+              <a:rPr lang="en-US" sz="2400" dirty="0" smtClean="0"/>
+              <a:t> </a:t>
+            </a:r>
+            <a:r>
+              <a:rPr lang="en-US" sz="2400" dirty="0" err="1" smtClean="0"/>
+              <a:t>kjkjasd</a:t>
+            </a:r>
+            <a:r>
+              <a:rPr lang="en-US" sz="2400" dirty="0" smtClean="0"/>
+              <a:t> </a:t>
+            </a:r>
+            <a:r>
+              <a:rPr lang="en-US" sz="2400" dirty="0" err="1" smtClean="0"/>
+              <a:t>lkjks</a:t>
+            </a:r>
+            <a:r>
+              <a:rPr lang="en-US" sz="2400" dirty="0" smtClean="0"/>
+              <a:t> </a:t>
+            </a:r>
+            <a:r>
+              <a:rPr lang="en-US" sz="2400" dirty="0" err="1" smtClean="0"/>
+              <a:t>lkjdse</a:t>
+            </a:r>
+            <a:r>
+              <a:rPr lang="en-US" sz="2400" dirty="0" smtClean="0"/>
+              <a:t> </a:t>
+            </a:r>
+            <a:r>
+              <a:rPr lang="en-US" sz="2400" dirty="0" err="1" smtClean="0"/>
+              <a:t>lkerkjasd</a:t>
+            </a:r>
+            <a:r>
+              <a:rPr lang="en-US" sz="2400" dirty="0" smtClean="0"/>
+              <a:t> </a:t>
+            </a:r>
+            <a:r>
+              <a:rPr lang="en-US" sz="2400" dirty="0" err="1" smtClean="0"/>
+              <a:t>sadlkmsd</a:t>
+            </a:r>
+            <a:r>
+              <a:rPr lang="en-US" sz="2400" dirty="0" smtClean="0"/>
+              <a:t> </a:t>
+            </a:r>
+            <a:r>
+              <a:rPr lang="en-US" sz="2400" dirty="0" err="1" smtClean="0"/>
+              <a:t>salkdjkj</a:t>
+            </a:r>
+            <a:r>
+              <a:rPr lang="en-US" sz="2400" dirty="0" smtClean="0"/>
+              <a:t> sad </a:t>
+            </a:r>
+            <a:r>
+              <a:rPr lang="en-US" sz="2400" dirty="0" err="1" smtClean="0"/>
+              <a:t>sadklkjsad</a:t>
+            </a:r>
+            <a:r>
+              <a:rPr lang="en-US" sz="2400" dirty="0" smtClean="0"/>
+              <a:t> </a:t>
+            </a:r>
+            <a:r>
+              <a:rPr lang="en-US" sz="2400" dirty="0" err="1" smtClean="0"/>
+              <a:t>klasdlkj</a:t>
+            </a:r>
+            <a:r>
+              <a:rPr lang="en-US" sz="2400" dirty="0" smtClean="0"/>
+              <a:t> </a:t>
+            </a:r>
+            <a:r>
+              <a:rPr lang="en-US" sz="2400" dirty="0" err="1" smtClean="0"/>
+              <a:t>asdkjl</a:t>
+            </a:r>
+            <a:r>
+              <a:rPr lang="en-US" sz="2400" dirty="0" smtClean="0"/>
+              <a:t>  </a:t>
+            </a:r>
+            <a:r>
+              <a:rPr lang="en-US" sz="2400" dirty="0" err="1" smtClean="0"/>
+              <a:t>kas</a:t>
+            </a:r>
+            <a:r>
+              <a:rPr lang="en-US" sz="2400" dirty="0" smtClean="0"/>
+              <a:t> </a:t>
+            </a:r>
+            <a:r>
+              <a:rPr lang="en-US" sz="2400" dirty="0" err="1" smtClean="0"/>
+              <a:t>jdklsa</a:t>
+            </a:r>
+            <a:r>
+              <a:rPr lang="en-US" sz="2400" dirty="0" smtClean="0"/>
+              <a:t> </a:t>
+            </a:r>
+            <a:r>
+              <a:rPr lang="en-US" sz="2400" dirty="0" err="1" smtClean="0"/>
+              <a:t>klasjdkjasdlkj</a:t>
+            </a:r>
+            <a:r>
+              <a:rPr lang="en-US" sz="2400" dirty="0" smtClean="0"/>
+              <a:t> </a:t>
+            </a:r>
+            <a:r>
+              <a:rPr lang="en-US" sz="2400" dirty="0" err="1" smtClean="0"/>
+              <a:t>dsadk</a:t>
+            </a:r>
+            <a:r>
+              <a:rPr lang="en-US" sz="2400" dirty="0" smtClean="0"/>
+              <a:t> </a:t>
+            </a:r>
+            <a:r>
+              <a:rPr lang="en-US" sz="2400" dirty="0" err="1" smtClean="0"/>
+              <a:t>lkasdjlaksjd</a:t>
+            </a:r>
+            <a:r>
+              <a:rPr lang="en-US" sz="2400" dirty="0" smtClean="0"/>
+              <a:t> </a:t>
+            </a:r>
+          </a:p>
+          <a:p>
+            <a:pPr algn="just"/>
+            <a:endParaRPr lang="en-US" sz="2400" dirty="0"/>
           </a:p>
         </p:txBody>
       </p:sp>

</xml_diff>

<commit_message>
intro to recommendation system on poster done
</commit_message>
<xml_diff>
--- a/poster/poster_dm_a1.pptx
+++ b/poster/poster_dm_a1.pptx
@@ -104,7 +104,16 @@
       </a:defRPr>
     </a:lvl9pPr>
   </p:defaultTextStyle>
+  <p:extLst>
+    <p:ext uri="{EFAFB233-063F-42B5-8137-9DF3F51BA10A}">
+      <p15:sldGuideLst xmlns:p15="http://schemas.microsoft.com/office/powerpoint/2012/main"/>
+    </p:ext>
+  </p:extLst>
 </p:presentation>
+</file>
+
+<file path=ppt/revisionInfo.xml><?xml version="1.0" encoding="utf-8"?>
+<p1510:revInfo xmlns:a="http://schemas.openxmlformats.org/drawingml/2006/main" xmlns:r="http://schemas.openxmlformats.org/officeDocument/2006/relationships" xmlns:p1510="http://schemas.microsoft.com/office/powerpoint/2015/10/main"/>
 </file>
 
 <file path=ppt/slideLayouts/slideLayout1.xml><?xml version="1.0" encoding="utf-8"?>
@@ -149,7 +158,7 @@
           </a:lstStyle>
           <a:p>
             <a:r>
-              <a:rPr lang="de-DE" smtClean="0"/>
+              <a:rPr lang="de-DE"/>
               <a:t>Titelmasterformat durch Klicken bearbeiten</a:t>
             </a:r>
             <a:endParaRPr lang="en-US" dirty="0"/>
@@ -214,7 +223,7 @@
           </a:lstStyle>
           <a:p>
             <a:r>
-              <a:rPr lang="de-DE" smtClean="0"/>
+              <a:rPr lang="de-DE"/>
               <a:t>Formatvorlage des Untertitelmasters durch Klicken bearbeiten</a:t>
             </a:r>
             <a:endParaRPr lang="en-US" dirty="0"/>
@@ -238,7 +247,7 @@
           <a:p>
             <a:fld id="{A3C79E79-5633-4DAD-A3E3-B36D650BAA39}" type="datetimeFigureOut">
               <a:rPr lang="en-US" smtClean="0"/>
-              <a:t>1/3/2018</a:t>
+              <a:t>1/4/2018</a:t>
             </a:fld>
             <a:endParaRPr lang="en-US"/>
           </a:p>
@@ -280,7 +289,7 @@
           <a:p>
             <a:fld id="{D8A040A9-1A12-4BB5-A188-BAB776D626BB}" type="slidenum">
               <a:rPr lang="en-US" smtClean="0"/>
-              <a:t>‹Nr.›</a:t>
+              <a:t>‹#›</a:t>
             </a:fld>
             <a:endParaRPr lang="en-US"/>
           </a:p>
@@ -332,7 +341,7 @@
           <a:lstStyle/>
           <a:p>
             <a:r>
-              <a:rPr lang="de-DE" smtClean="0"/>
+              <a:rPr lang="de-DE"/>
               <a:t>Titelmasterformat durch Klicken bearbeiten</a:t>
             </a:r>
             <a:endParaRPr lang="en-US" dirty="0"/>
@@ -356,35 +365,35 @@
           <a:p>
             <a:pPr lvl="0"/>
             <a:r>
-              <a:rPr lang="de-DE" smtClean="0"/>
+              <a:rPr lang="de-DE"/>
               <a:t>Textmasterformat bearbeiten</a:t>
             </a:r>
           </a:p>
           <a:p>
             <a:pPr lvl="1"/>
             <a:r>
-              <a:rPr lang="de-DE" smtClean="0"/>
+              <a:rPr lang="de-DE"/>
               <a:t>Zweite Ebene</a:t>
             </a:r>
           </a:p>
           <a:p>
             <a:pPr lvl="2"/>
             <a:r>
-              <a:rPr lang="de-DE" smtClean="0"/>
+              <a:rPr lang="de-DE"/>
               <a:t>Dritte Ebene</a:t>
             </a:r>
           </a:p>
           <a:p>
             <a:pPr lvl="3"/>
             <a:r>
-              <a:rPr lang="de-DE" smtClean="0"/>
+              <a:rPr lang="de-DE"/>
               <a:t>Vierte Ebene</a:t>
             </a:r>
           </a:p>
           <a:p>
             <a:pPr lvl="4"/>
             <a:r>
-              <a:rPr lang="de-DE" smtClean="0"/>
+              <a:rPr lang="de-DE"/>
               <a:t>Fünfte Ebene</a:t>
             </a:r>
             <a:endParaRPr lang="en-US" dirty="0"/>
@@ -408,7 +417,7 @@
           <a:p>
             <a:fld id="{A3C79E79-5633-4DAD-A3E3-B36D650BAA39}" type="datetimeFigureOut">
               <a:rPr lang="en-US" smtClean="0"/>
-              <a:t>1/3/2018</a:t>
+              <a:t>1/4/2018</a:t>
             </a:fld>
             <a:endParaRPr lang="en-US"/>
           </a:p>
@@ -450,7 +459,7 @@
           <a:p>
             <a:fld id="{D8A040A9-1A12-4BB5-A188-BAB776D626BB}" type="slidenum">
               <a:rPr lang="en-US" smtClean="0"/>
-              <a:t>‹Nr.›</a:t>
+              <a:t>‹#›</a:t>
             </a:fld>
             <a:endParaRPr lang="en-US"/>
           </a:p>
@@ -507,7 +516,7 @@
           <a:lstStyle/>
           <a:p>
             <a:r>
-              <a:rPr lang="de-DE" smtClean="0"/>
+              <a:rPr lang="de-DE"/>
               <a:t>Titelmasterformat durch Klicken bearbeiten</a:t>
             </a:r>
             <a:endParaRPr lang="en-US" dirty="0"/>
@@ -536,35 +545,35 @@
           <a:p>
             <a:pPr lvl="0"/>
             <a:r>
-              <a:rPr lang="de-DE" smtClean="0"/>
+              <a:rPr lang="de-DE"/>
               <a:t>Textmasterformat bearbeiten</a:t>
             </a:r>
           </a:p>
           <a:p>
             <a:pPr lvl="1"/>
             <a:r>
-              <a:rPr lang="de-DE" smtClean="0"/>
+              <a:rPr lang="de-DE"/>
               <a:t>Zweite Ebene</a:t>
             </a:r>
           </a:p>
           <a:p>
             <a:pPr lvl="2"/>
             <a:r>
-              <a:rPr lang="de-DE" smtClean="0"/>
+              <a:rPr lang="de-DE"/>
               <a:t>Dritte Ebene</a:t>
             </a:r>
           </a:p>
           <a:p>
             <a:pPr lvl="3"/>
             <a:r>
-              <a:rPr lang="de-DE" smtClean="0"/>
+              <a:rPr lang="de-DE"/>
               <a:t>Vierte Ebene</a:t>
             </a:r>
           </a:p>
           <a:p>
             <a:pPr lvl="4"/>
             <a:r>
-              <a:rPr lang="de-DE" smtClean="0"/>
+              <a:rPr lang="de-DE"/>
               <a:t>Fünfte Ebene</a:t>
             </a:r>
             <a:endParaRPr lang="en-US" dirty="0"/>
@@ -588,7 +597,7 @@
           <a:p>
             <a:fld id="{A3C79E79-5633-4DAD-A3E3-B36D650BAA39}" type="datetimeFigureOut">
               <a:rPr lang="en-US" smtClean="0"/>
-              <a:t>1/3/2018</a:t>
+              <a:t>1/4/2018</a:t>
             </a:fld>
             <a:endParaRPr lang="en-US"/>
           </a:p>
@@ -630,7 +639,7 @@
           <a:p>
             <a:fld id="{D8A040A9-1A12-4BB5-A188-BAB776D626BB}" type="slidenum">
               <a:rPr lang="en-US" smtClean="0"/>
-              <a:t>‹Nr.›</a:t>
+              <a:t>‹#›</a:t>
             </a:fld>
             <a:endParaRPr lang="en-US"/>
           </a:p>
@@ -682,7 +691,7 @@
           <a:lstStyle/>
           <a:p>
             <a:r>
-              <a:rPr lang="de-DE" smtClean="0"/>
+              <a:rPr lang="de-DE"/>
               <a:t>Titelmasterformat durch Klicken bearbeiten</a:t>
             </a:r>
             <a:endParaRPr lang="en-US" dirty="0"/>
@@ -706,35 +715,35 @@
           <a:p>
             <a:pPr lvl="0"/>
             <a:r>
-              <a:rPr lang="de-DE" smtClean="0"/>
+              <a:rPr lang="de-DE"/>
               <a:t>Textmasterformat bearbeiten</a:t>
             </a:r>
           </a:p>
           <a:p>
             <a:pPr lvl="1"/>
             <a:r>
-              <a:rPr lang="de-DE" smtClean="0"/>
+              <a:rPr lang="de-DE"/>
               <a:t>Zweite Ebene</a:t>
             </a:r>
           </a:p>
           <a:p>
             <a:pPr lvl="2"/>
             <a:r>
-              <a:rPr lang="de-DE" smtClean="0"/>
+              <a:rPr lang="de-DE"/>
               <a:t>Dritte Ebene</a:t>
             </a:r>
           </a:p>
           <a:p>
             <a:pPr lvl="3"/>
             <a:r>
-              <a:rPr lang="de-DE" smtClean="0"/>
+              <a:rPr lang="de-DE"/>
               <a:t>Vierte Ebene</a:t>
             </a:r>
           </a:p>
           <a:p>
             <a:pPr lvl="4"/>
             <a:r>
-              <a:rPr lang="de-DE" smtClean="0"/>
+              <a:rPr lang="de-DE"/>
               <a:t>Fünfte Ebene</a:t>
             </a:r>
             <a:endParaRPr lang="en-US" dirty="0"/>
@@ -758,7 +767,7 @@
           <a:p>
             <a:fld id="{A3C79E79-5633-4DAD-A3E3-B36D650BAA39}" type="datetimeFigureOut">
               <a:rPr lang="en-US" smtClean="0"/>
-              <a:t>1/3/2018</a:t>
+              <a:t>1/4/2018</a:t>
             </a:fld>
             <a:endParaRPr lang="en-US"/>
           </a:p>
@@ -800,7 +809,7 @@
           <a:p>
             <a:fld id="{D8A040A9-1A12-4BB5-A188-BAB776D626BB}" type="slidenum">
               <a:rPr lang="en-US" smtClean="0"/>
-              <a:t>‹Nr.›</a:t>
+              <a:t>‹#›</a:t>
             </a:fld>
             <a:endParaRPr lang="en-US"/>
           </a:p>
@@ -861,7 +870,7 @@
           </a:lstStyle>
           <a:p>
             <a:r>
-              <a:rPr lang="de-DE" smtClean="0"/>
+              <a:rPr lang="de-DE"/>
               <a:t>Titelmasterformat durch Klicken bearbeiten</a:t>
             </a:r>
             <a:endParaRPr lang="en-US" dirty="0"/>
@@ -979,7 +988,7 @@
           <a:p>
             <a:pPr lvl="0"/>
             <a:r>
-              <a:rPr lang="de-DE" smtClean="0"/>
+              <a:rPr lang="de-DE"/>
               <a:t>Textmasterformat bearbeiten</a:t>
             </a:r>
           </a:p>
@@ -1002,7 +1011,7 @@
           <a:p>
             <a:fld id="{A3C79E79-5633-4DAD-A3E3-B36D650BAA39}" type="datetimeFigureOut">
               <a:rPr lang="en-US" smtClean="0"/>
-              <a:t>1/3/2018</a:t>
+              <a:t>1/4/2018</a:t>
             </a:fld>
             <a:endParaRPr lang="en-US"/>
           </a:p>
@@ -1044,7 +1053,7 @@
           <a:p>
             <a:fld id="{D8A040A9-1A12-4BB5-A188-BAB776D626BB}" type="slidenum">
               <a:rPr lang="en-US" smtClean="0"/>
-              <a:t>‹Nr.›</a:t>
+              <a:t>‹#›</a:t>
             </a:fld>
             <a:endParaRPr lang="en-US"/>
           </a:p>
@@ -1096,7 +1105,7 @@
           <a:lstStyle/>
           <a:p>
             <a:r>
-              <a:rPr lang="de-DE" smtClean="0"/>
+              <a:rPr lang="de-DE"/>
               <a:t>Titelmasterformat durch Klicken bearbeiten</a:t>
             </a:r>
             <a:endParaRPr lang="en-US" dirty="0"/>
@@ -1125,35 +1134,35 @@
           <a:p>
             <a:pPr lvl="0"/>
             <a:r>
-              <a:rPr lang="de-DE" smtClean="0"/>
+              <a:rPr lang="de-DE"/>
               <a:t>Textmasterformat bearbeiten</a:t>
             </a:r>
           </a:p>
           <a:p>
             <a:pPr lvl="1"/>
             <a:r>
-              <a:rPr lang="de-DE" smtClean="0"/>
+              <a:rPr lang="de-DE"/>
               <a:t>Zweite Ebene</a:t>
             </a:r>
           </a:p>
           <a:p>
             <a:pPr lvl="2"/>
             <a:r>
-              <a:rPr lang="de-DE" smtClean="0"/>
+              <a:rPr lang="de-DE"/>
               <a:t>Dritte Ebene</a:t>
             </a:r>
           </a:p>
           <a:p>
             <a:pPr lvl="3"/>
             <a:r>
-              <a:rPr lang="de-DE" smtClean="0"/>
+              <a:rPr lang="de-DE"/>
               <a:t>Vierte Ebene</a:t>
             </a:r>
           </a:p>
           <a:p>
             <a:pPr lvl="4"/>
             <a:r>
-              <a:rPr lang="de-DE" smtClean="0"/>
+              <a:rPr lang="de-DE"/>
               <a:t>Fünfte Ebene</a:t>
             </a:r>
             <a:endParaRPr lang="en-US" dirty="0"/>
@@ -1182,35 +1191,35 @@
           <a:p>
             <a:pPr lvl="0"/>
             <a:r>
-              <a:rPr lang="de-DE" smtClean="0"/>
+              <a:rPr lang="de-DE"/>
               <a:t>Textmasterformat bearbeiten</a:t>
             </a:r>
           </a:p>
           <a:p>
             <a:pPr lvl="1"/>
             <a:r>
-              <a:rPr lang="de-DE" smtClean="0"/>
+              <a:rPr lang="de-DE"/>
               <a:t>Zweite Ebene</a:t>
             </a:r>
           </a:p>
           <a:p>
             <a:pPr lvl="2"/>
             <a:r>
-              <a:rPr lang="de-DE" smtClean="0"/>
+              <a:rPr lang="de-DE"/>
               <a:t>Dritte Ebene</a:t>
             </a:r>
           </a:p>
           <a:p>
             <a:pPr lvl="3"/>
             <a:r>
-              <a:rPr lang="de-DE" smtClean="0"/>
+              <a:rPr lang="de-DE"/>
               <a:t>Vierte Ebene</a:t>
             </a:r>
           </a:p>
           <a:p>
             <a:pPr lvl="4"/>
             <a:r>
-              <a:rPr lang="de-DE" smtClean="0"/>
+              <a:rPr lang="de-DE"/>
               <a:t>Fünfte Ebene</a:t>
             </a:r>
             <a:endParaRPr lang="en-US" dirty="0"/>
@@ -1234,7 +1243,7 @@
           <a:p>
             <a:fld id="{A3C79E79-5633-4DAD-A3E3-B36D650BAA39}" type="datetimeFigureOut">
               <a:rPr lang="en-US" smtClean="0"/>
-              <a:t>1/3/2018</a:t>
+              <a:t>1/4/2018</a:t>
             </a:fld>
             <a:endParaRPr lang="en-US"/>
           </a:p>
@@ -1276,7 +1285,7 @@
           <a:p>
             <a:fld id="{D8A040A9-1A12-4BB5-A188-BAB776D626BB}" type="slidenum">
               <a:rPr lang="en-US" smtClean="0"/>
-              <a:t>‹Nr.›</a:t>
+              <a:t>‹#›</a:t>
             </a:fld>
             <a:endParaRPr lang="en-US"/>
           </a:p>
@@ -1333,7 +1342,7 @@
           <a:lstStyle/>
           <a:p>
             <a:r>
-              <a:rPr lang="de-DE" smtClean="0"/>
+              <a:rPr lang="de-DE"/>
               <a:t>Titelmasterformat durch Klicken bearbeiten</a:t>
             </a:r>
             <a:endParaRPr lang="en-US" dirty="0"/>
@@ -1399,7 +1408,7 @@
           <a:p>
             <a:pPr lvl="0"/>
             <a:r>
-              <a:rPr lang="de-DE" smtClean="0"/>
+              <a:rPr lang="de-DE"/>
               <a:t>Textmasterformat bearbeiten</a:t>
             </a:r>
           </a:p>
@@ -1427,35 +1436,35 @@
           <a:p>
             <a:pPr lvl="0"/>
             <a:r>
-              <a:rPr lang="de-DE" smtClean="0"/>
+              <a:rPr lang="de-DE"/>
               <a:t>Textmasterformat bearbeiten</a:t>
             </a:r>
           </a:p>
           <a:p>
             <a:pPr lvl="1"/>
             <a:r>
-              <a:rPr lang="de-DE" smtClean="0"/>
+              <a:rPr lang="de-DE"/>
               <a:t>Zweite Ebene</a:t>
             </a:r>
           </a:p>
           <a:p>
             <a:pPr lvl="2"/>
             <a:r>
-              <a:rPr lang="de-DE" smtClean="0"/>
+              <a:rPr lang="de-DE"/>
               <a:t>Dritte Ebene</a:t>
             </a:r>
           </a:p>
           <a:p>
             <a:pPr lvl="3"/>
             <a:r>
-              <a:rPr lang="de-DE" smtClean="0"/>
+              <a:rPr lang="de-DE"/>
               <a:t>Vierte Ebene</a:t>
             </a:r>
           </a:p>
           <a:p>
             <a:pPr lvl="4"/>
             <a:r>
-              <a:rPr lang="de-DE" smtClean="0"/>
+              <a:rPr lang="de-DE"/>
               <a:t>Fünfte Ebene</a:t>
             </a:r>
             <a:endParaRPr lang="en-US" dirty="0"/>
@@ -1521,7 +1530,7 @@
           <a:p>
             <a:pPr lvl="0"/>
             <a:r>
-              <a:rPr lang="de-DE" smtClean="0"/>
+              <a:rPr lang="de-DE"/>
               <a:t>Textmasterformat bearbeiten</a:t>
             </a:r>
           </a:p>
@@ -1549,35 +1558,35 @@
           <a:p>
             <a:pPr lvl="0"/>
             <a:r>
-              <a:rPr lang="de-DE" smtClean="0"/>
+              <a:rPr lang="de-DE"/>
               <a:t>Textmasterformat bearbeiten</a:t>
             </a:r>
           </a:p>
           <a:p>
             <a:pPr lvl="1"/>
             <a:r>
-              <a:rPr lang="de-DE" smtClean="0"/>
+              <a:rPr lang="de-DE"/>
               <a:t>Zweite Ebene</a:t>
             </a:r>
           </a:p>
           <a:p>
             <a:pPr lvl="2"/>
             <a:r>
-              <a:rPr lang="de-DE" smtClean="0"/>
+              <a:rPr lang="de-DE"/>
               <a:t>Dritte Ebene</a:t>
             </a:r>
           </a:p>
           <a:p>
             <a:pPr lvl="3"/>
             <a:r>
-              <a:rPr lang="de-DE" smtClean="0"/>
+              <a:rPr lang="de-DE"/>
               <a:t>Vierte Ebene</a:t>
             </a:r>
           </a:p>
           <a:p>
             <a:pPr lvl="4"/>
             <a:r>
-              <a:rPr lang="de-DE" smtClean="0"/>
+              <a:rPr lang="de-DE"/>
               <a:t>Fünfte Ebene</a:t>
             </a:r>
             <a:endParaRPr lang="en-US" dirty="0"/>
@@ -1601,7 +1610,7 @@
           <a:p>
             <a:fld id="{A3C79E79-5633-4DAD-A3E3-B36D650BAA39}" type="datetimeFigureOut">
               <a:rPr lang="en-US" smtClean="0"/>
-              <a:t>1/3/2018</a:t>
+              <a:t>1/4/2018</a:t>
             </a:fld>
             <a:endParaRPr lang="en-US"/>
           </a:p>
@@ -1643,7 +1652,7 @@
           <a:p>
             <a:fld id="{D8A040A9-1A12-4BB5-A188-BAB776D626BB}" type="slidenum">
               <a:rPr lang="en-US" smtClean="0"/>
-              <a:t>‹Nr.›</a:t>
+              <a:t>‹#›</a:t>
             </a:fld>
             <a:endParaRPr lang="en-US"/>
           </a:p>
@@ -1695,7 +1704,7 @@
           <a:lstStyle/>
           <a:p>
             <a:r>
-              <a:rPr lang="de-DE" smtClean="0"/>
+              <a:rPr lang="de-DE"/>
               <a:t>Titelmasterformat durch Klicken bearbeiten</a:t>
             </a:r>
             <a:endParaRPr lang="en-US" dirty="0"/>
@@ -1719,7 +1728,7 @@
           <a:p>
             <a:fld id="{A3C79E79-5633-4DAD-A3E3-B36D650BAA39}" type="datetimeFigureOut">
               <a:rPr lang="en-US" smtClean="0"/>
-              <a:t>1/3/2018</a:t>
+              <a:t>1/4/2018</a:t>
             </a:fld>
             <a:endParaRPr lang="en-US"/>
           </a:p>
@@ -1761,7 +1770,7 @@
           <a:p>
             <a:fld id="{D8A040A9-1A12-4BB5-A188-BAB776D626BB}" type="slidenum">
               <a:rPr lang="en-US" smtClean="0"/>
-              <a:t>‹Nr.›</a:t>
+              <a:t>‹#›</a:t>
             </a:fld>
             <a:endParaRPr lang="en-US"/>
           </a:p>
@@ -1814,7 +1823,7 @@
           <a:p>
             <a:fld id="{A3C79E79-5633-4DAD-A3E3-B36D650BAA39}" type="datetimeFigureOut">
               <a:rPr lang="en-US" smtClean="0"/>
-              <a:t>1/3/2018</a:t>
+              <a:t>1/4/2018</a:t>
             </a:fld>
             <a:endParaRPr lang="en-US"/>
           </a:p>
@@ -1856,7 +1865,7 @@
           <a:p>
             <a:fld id="{D8A040A9-1A12-4BB5-A188-BAB776D626BB}" type="slidenum">
               <a:rPr lang="en-US" smtClean="0"/>
-              <a:t>‹Nr.›</a:t>
+              <a:t>‹#›</a:t>
             </a:fld>
             <a:endParaRPr lang="en-US"/>
           </a:p>
@@ -1917,7 +1926,7 @@
           </a:lstStyle>
           <a:p>
             <a:r>
-              <a:rPr lang="de-DE" smtClean="0"/>
+              <a:rPr lang="de-DE"/>
               <a:t>Titelmasterformat durch Klicken bearbeiten</a:t>
             </a:r>
             <a:endParaRPr lang="en-US" dirty="0"/>
@@ -1974,35 +1983,35 @@
           <a:p>
             <a:pPr lvl="0"/>
             <a:r>
-              <a:rPr lang="de-DE" smtClean="0"/>
+              <a:rPr lang="de-DE"/>
               <a:t>Textmasterformat bearbeiten</a:t>
             </a:r>
           </a:p>
           <a:p>
             <a:pPr lvl="1"/>
             <a:r>
-              <a:rPr lang="de-DE" smtClean="0"/>
+              <a:rPr lang="de-DE"/>
               <a:t>Zweite Ebene</a:t>
             </a:r>
           </a:p>
           <a:p>
             <a:pPr lvl="2"/>
             <a:r>
-              <a:rPr lang="de-DE" smtClean="0"/>
+              <a:rPr lang="de-DE"/>
               <a:t>Dritte Ebene</a:t>
             </a:r>
           </a:p>
           <a:p>
             <a:pPr lvl="3"/>
             <a:r>
-              <a:rPr lang="de-DE" smtClean="0"/>
+              <a:rPr lang="de-DE"/>
               <a:t>Vierte Ebene</a:t>
             </a:r>
           </a:p>
           <a:p>
             <a:pPr lvl="4"/>
             <a:r>
-              <a:rPr lang="de-DE" smtClean="0"/>
+              <a:rPr lang="de-DE"/>
               <a:t>Fünfte Ebene</a:t>
             </a:r>
             <a:endParaRPr lang="en-US" dirty="0"/>
@@ -2068,7 +2077,7 @@
           <a:p>
             <a:pPr lvl="0"/>
             <a:r>
-              <a:rPr lang="de-DE" smtClean="0"/>
+              <a:rPr lang="de-DE"/>
               <a:t>Textmasterformat bearbeiten</a:t>
             </a:r>
           </a:p>
@@ -2091,7 +2100,7 @@
           <a:p>
             <a:fld id="{A3C79E79-5633-4DAD-A3E3-B36D650BAA39}" type="datetimeFigureOut">
               <a:rPr lang="en-US" smtClean="0"/>
-              <a:t>1/3/2018</a:t>
+              <a:t>1/4/2018</a:t>
             </a:fld>
             <a:endParaRPr lang="en-US"/>
           </a:p>
@@ -2133,7 +2142,7 @@
           <a:p>
             <a:fld id="{D8A040A9-1A12-4BB5-A188-BAB776D626BB}" type="slidenum">
               <a:rPr lang="en-US" smtClean="0"/>
-              <a:t>‹Nr.›</a:t>
+              <a:t>‹#›</a:t>
             </a:fld>
             <a:endParaRPr lang="en-US"/>
           </a:p>
@@ -2194,7 +2203,7 @@
           </a:lstStyle>
           <a:p>
             <a:r>
-              <a:rPr lang="de-DE" smtClean="0"/>
+              <a:rPr lang="de-DE"/>
               <a:t>Titelmasterformat durch Klicken bearbeiten</a:t>
             </a:r>
             <a:endParaRPr lang="en-US" dirty="0"/>
@@ -2259,7 +2268,7 @@
           </a:lstStyle>
           <a:p>
             <a:r>
-              <a:rPr lang="de-DE" smtClean="0"/>
+              <a:rPr lang="de-DE"/>
               <a:t>Bild durch Klicken auf Symbol hinzufügen</a:t>
             </a:r>
             <a:endParaRPr lang="en-US" dirty="0"/>
@@ -2325,7 +2334,7 @@
           <a:p>
             <a:pPr lvl="0"/>
             <a:r>
-              <a:rPr lang="de-DE" smtClean="0"/>
+              <a:rPr lang="de-DE"/>
               <a:t>Textmasterformat bearbeiten</a:t>
             </a:r>
           </a:p>
@@ -2348,7 +2357,7 @@
           <a:p>
             <a:fld id="{A3C79E79-5633-4DAD-A3E3-B36D650BAA39}" type="datetimeFigureOut">
               <a:rPr lang="en-US" smtClean="0"/>
-              <a:t>1/3/2018</a:t>
+              <a:t>1/4/2018</a:t>
             </a:fld>
             <a:endParaRPr lang="en-US"/>
           </a:p>
@@ -2390,7 +2399,7 @@
           <a:p>
             <a:fld id="{D8A040A9-1A12-4BB5-A188-BAB776D626BB}" type="slidenum">
               <a:rPr lang="en-US" smtClean="0"/>
-              <a:t>‹Nr.›</a:t>
+              <a:t>‹#›</a:t>
             </a:fld>
             <a:endParaRPr lang="en-US"/>
           </a:p>
@@ -2457,7 +2466,7 @@
           <a:lstStyle/>
           <a:p>
             <a:r>
-              <a:rPr lang="de-DE" smtClean="0"/>
+              <a:rPr lang="de-DE"/>
               <a:t>Titelmasterformat durch Klicken bearbeiten</a:t>
             </a:r>
             <a:endParaRPr lang="en-US" dirty="0"/>
@@ -2491,35 +2500,35 @@
           <a:p>
             <a:pPr lvl="0"/>
             <a:r>
-              <a:rPr lang="de-DE" smtClean="0"/>
+              <a:rPr lang="de-DE"/>
               <a:t>Textmasterformat bearbeiten</a:t>
             </a:r>
           </a:p>
           <a:p>
             <a:pPr lvl="1"/>
             <a:r>
-              <a:rPr lang="de-DE" smtClean="0"/>
+              <a:rPr lang="de-DE"/>
               <a:t>Zweite Ebene</a:t>
             </a:r>
           </a:p>
           <a:p>
             <a:pPr lvl="2"/>
             <a:r>
-              <a:rPr lang="de-DE" smtClean="0"/>
+              <a:rPr lang="de-DE"/>
               <a:t>Dritte Ebene</a:t>
             </a:r>
           </a:p>
           <a:p>
             <a:pPr lvl="3"/>
             <a:r>
-              <a:rPr lang="de-DE" smtClean="0"/>
+              <a:rPr lang="de-DE"/>
               <a:t>Vierte Ebene</a:t>
             </a:r>
           </a:p>
           <a:p>
             <a:pPr lvl="4"/>
             <a:r>
-              <a:rPr lang="de-DE" smtClean="0"/>
+              <a:rPr lang="de-DE"/>
               <a:t>Fünfte Ebene</a:t>
             </a:r>
             <a:endParaRPr lang="en-US" dirty="0"/>
@@ -2561,7 +2570,7 @@
           <a:p>
             <a:fld id="{A3C79E79-5633-4DAD-A3E3-B36D650BAA39}" type="datetimeFigureOut">
               <a:rPr lang="en-US" smtClean="0"/>
-              <a:t>1/3/2018</a:t>
+              <a:t>1/4/2018</a:t>
             </a:fld>
             <a:endParaRPr lang="en-US"/>
           </a:p>
@@ -2639,7 +2648,7 @@
           <a:p>
             <a:fld id="{D8A040A9-1A12-4BB5-A188-BAB776D626BB}" type="slidenum">
               <a:rPr lang="en-US" smtClean="0"/>
-              <a:t>‹Nr.›</a:t>
+              <a:t>‹#›</a:t>
             </a:fld>
             <a:endParaRPr lang="en-US"/>
           </a:p>
@@ -3124,7 +3133,7 @@
           <a:lstStyle/>
           <a:p>
             <a:r>
-              <a:rPr lang="en-US" sz="10000" dirty="0" smtClean="0">
+              <a:rPr lang="en-US" sz="10000" dirty="0">
                 <a:solidFill>
                   <a:schemeClr val="accent4"/>
                 </a:solidFill>
@@ -3230,7 +3239,7 @@
           <a:p>
             <a:pPr algn="ctr"/>
             <a:r>
-              <a:rPr lang="en-US" sz="3600" dirty="0" smtClean="0">
+              <a:rPr lang="en-US" sz="3600" dirty="0">
                 <a:latin typeface="Franklin Gothic Medium" panose="020B0603020102020204" pitchFamily="34" charset="0"/>
                 <a:cs typeface="Aharoni" panose="02010803020104030203" pitchFamily="2" charset="-79"/>
               </a:rPr>
@@ -3270,10 +3279,9 @@
           <a:p>
             <a:pPr algn="just"/>
             <a:r>
-              <a:rPr lang="en-US" sz="2400" dirty="0" smtClean="0"/>
+              <a:rPr lang="en-US" sz="2400" dirty="0"/>
               <a:t>The Internet has become more and more a platform for user-generated content. Especially the movie industry is interesting for many users and there are different platforms which offer exchange of information about movies or rating systems, e.g. IMDb. The aim of this project is to use this user generated-content to build a recommender system and to figure out which factors lead to a good user rating. </a:t>
             </a:r>
-            <a:endParaRPr lang="en-US" sz="2400" dirty="0"/>
           </a:p>
         </p:txBody>
       </p:sp>
@@ -3384,7 +3392,7 @@
             <a:p>
               <a:pPr algn="ctr"/>
               <a:r>
-                <a:rPr lang="en-US" sz="3600" dirty="0" smtClean="0">
+                <a:rPr lang="en-US" sz="3600" dirty="0">
                   <a:latin typeface="Franklin Gothic Medium" panose="020B0603020102020204" pitchFamily="34" charset="0"/>
                   <a:cs typeface="Aharoni" panose="02010803020104030203" pitchFamily="2" charset="-79"/>
                 </a:rPr>
@@ -3459,39 +3467,39 @@
           <a:p>
             <a:pPr algn="just"/>
             <a:r>
-              <a:rPr lang="en-US" sz="2400" dirty="0" smtClean="0"/>
+              <a:rPr lang="en-US" sz="2400" dirty="0"/>
               <a:t>Our project is based on datasets from 2 sources. The first part is gathered from </a:t>
             </a:r>
             <a:r>
-              <a:rPr lang="en-US" sz="2400" dirty="0" err="1" smtClean="0"/>
+              <a:rPr lang="en-US" sz="2400" dirty="0" err="1"/>
               <a:t>kaggle</a:t>
             </a:r>
             <a:r>
-              <a:rPr lang="en-US" sz="2400" dirty="0" smtClean="0"/>
+              <a:rPr lang="en-US" sz="2400" dirty="0"/>
               <a:t>-website. It contains metadata about movies, actors, genres, keywords and single user ratings. The size is </a:t>
             </a:r>
             <a:r>
-              <a:rPr lang="en-US" sz="2400" b="1" dirty="0" smtClean="0"/>
+              <a:rPr lang="en-US" sz="2400" b="1" dirty="0"/>
               <a:t>about 900 MB</a:t>
             </a:r>
             <a:r>
-              <a:rPr lang="en-US" sz="2400" dirty="0" smtClean="0"/>
+              <a:rPr lang="en-US" sz="2400" dirty="0"/>
               <a:t> and it has over </a:t>
             </a:r>
             <a:r>
-              <a:rPr lang="en-US" sz="2400" b="1" dirty="0" smtClean="0"/>
+              <a:rPr lang="en-US" sz="2400" b="1" dirty="0"/>
               <a:t>45.000</a:t>
             </a:r>
             <a:r>
-              <a:rPr lang="en-US" sz="2400" dirty="0" smtClean="0"/>
+              <a:rPr lang="en-US" sz="2400" dirty="0"/>
               <a:t> movies. Additionally we collected data from IMDb  and got rating data with more than </a:t>
             </a:r>
             <a:r>
-              <a:rPr lang="en-US" sz="2400" b="1" dirty="0" smtClean="0"/>
+              <a:rPr lang="en-US" sz="2400" b="1" dirty="0"/>
               <a:t>45.000</a:t>
             </a:r>
             <a:r>
-              <a:rPr lang="en-US" sz="2400" dirty="0" smtClean="0"/>
+              <a:rPr lang="en-US" sz="2400" dirty="0"/>
               <a:t> entries. </a:t>
             </a:r>
           </a:p>
@@ -3502,12 +3510,8 @@
           <a:p>
             <a:pPr algn="just"/>
             <a:r>
-              <a:rPr lang="en-US" sz="2400" dirty="0" smtClean="0"/>
-              <a:t>All in one, our dataset </a:t>
-            </a:r>
-            <a:r>
               <a:rPr lang="en-US" sz="2400" dirty="0"/>
-              <a:t>is an ensemble of data collected from </a:t>
+              <a:t>All in one, our dataset is an ensemble of data collected from </a:t>
             </a:r>
             <a:r>
               <a:rPr lang="en-US" sz="2400" b="1" dirty="0"/>
@@ -3518,26 +3522,21 @@
               <a:t>, </a:t>
             </a:r>
             <a:r>
-              <a:rPr lang="en-US" sz="2400" b="1" dirty="0" smtClean="0"/>
+              <a:rPr lang="en-US" sz="2400" b="1" dirty="0"/>
               <a:t>IMDb</a:t>
             </a:r>
             <a:r>
-              <a:rPr lang="en-US" sz="2400" dirty="0" smtClean="0"/>
-              <a:t> </a:t>
-            </a:r>
-            <a:r>
               <a:rPr lang="en-US" sz="2400" dirty="0"/>
-              <a:t>and </a:t>
+              <a:t> and </a:t>
             </a:r>
             <a:r>
               <a:rPr lang="en-US" sz="2400" b="1" dirty="0" err="1"/>
               <a:t>GroupLens</a:t>
             </a:r>
             <a:r>
-              <a:rPr lang="en-US" sz="2400" dirty="0" smtClean="0"/>
+              <a:rPr lang="en-US" sz="2400" dirty="0"/>
               <a:t>.</a:t>
             </a:r>
-            <a:endParaRPr lang="en-US" sz="2400" dirty="0" smtClean="0"/>
           </a:p>
         </p:txBody>
       </p:sp>
@@ -3685,7 +3684,7 @@
             <a:p>
               <a:pPr algn="ctr"/>
               <a:r>
-                <a:rPr lang="en-US" sz="3600" dirty="0" smtClean="0">
+                <a:rPr lang="en-US" sz="3600" dirty="0">
                   <a:latin typeface="Franklin Gothic Medium" panose="020B0603020102020204" pitchFamily="34" charset="0"/>
                   <a:cs typeface="Aharoni" panose="02010803020104030203" pitchFamily="2" charset="-79"/>
                 </a:rPr>
@@ -3792,7 +3791,7 @@
           <a:p>
             <a:pPr algn="ctr"/>
             <a:r>
-              <a:rPr lang="en-US" sz="3600" dirty="0" smtClean="0">
+              <a:rPr lang="en-US" sz="3600" dirty="0">
                 <a:latin typeface="Franklin Gothic Medium" panose="020B0603020102020204" pitchFamily="34" charset="0"/>
                 <a:cs typeface="Aharoni" panose="02010803020104030203" pitchFamily="2" charset="-79"/>
               </a:rPr>
@@ -3829,10 +3828,9 @@
           <a:p>
             <a:pPr algn="just"/>
             <a:r>
-              <a:rPr lang="en-US" sz="2400" dirty="0" smtClean="0"/>
+              <a:rPr lang="en-US" sz="2400" dirty="0"/>
               <a:t>To figure out which factors might implicate good or outstanding user ratings, first of all the mean rating of the different rating systems had to be calculated for each area such as keywords, actors etc.. Therefore the average rating from all movies where e.g. a single keyword appears was calculated. Afterwards the mean rating was used to create a ranking of top 5 and worse 5 ratings. </a:t>
             </a:r>
-            <a:endParaRPr lang="en-US" sz="2400" dirty="0"/>
           </a:p>
         </p:txBody>
       </p:sp>
@@ -3860,10 +3858,9 @@
           <a:p>
             <a:pPr algn="just"/>
             <a:r>
-              <a:rPr lang="en-US" sz="2400" dirty="0" smtClean="0"/>
+              <a:rPr lang="en-US" sz="2400" dirty="0"/>
               <a:t>For determining top actors and actresses, we took these, who appear in more than 10 movies. The top 5 actors of all movies had already been dead for several years. That’s the reason we made another ranking considering just movies of the last 10 years. </a:t>
             </a:r>
-            <a:endParaRPr lang="en-US" sz="2400" dirty="0"/>
           </a:p>
         </p:txBody>
       </p:sp>
@@ -3963,8 +3960,8 @@
         </p:nvSpPr>
         <p:spPr>
           <a:xfrm>
-            <a:off x="20880000" y="3960000"/>
-            <a:ext cx="9000000" cy="2677656"/>
+            <a:off x="20700000" y="4014371"/>
+            <a:ext cx="9000000" cy="1569660"/>
           </a:xfrm>
           <a:prstGeom prst="rect">
             <a:avLst/>
@@ -3979,392 +3976,9 @@
           <a:p>
             <a:pPr algn="just"/>
             <a:r>
-              <a:rPr lang="en-US" sz="2400" dirty="0" err="1" smtClean="0"/>
-              <a:t>Sdsds</a:t>
-            </a:r>
-            <a:r>
-              <a:rPr lang="en-US" sz="2400" dirty="0" smtClean="0"/>
-              <a:t> </a:t>
-            </a:r>
-            <a:r>
-              <a:rPr lang="en-US" sz="2400" dirty="0" err="1" smtClean="0"/>
-              <a:t>dsdsdsd</a:t>
-            </a:r>
-            <a:r>
-              <a:rPr lang="en-US" sz="2400" dirty="0" smtClean="0"/>
-              <a:t> </a:t>
-            </a:r>
-            <a:r>
-              <a:rPr lang="en-US" sz="2400" dirty="0" err="1" smtClean="0"/>
-              <a:t>lask</a:t>
-            </a:r>
-            <a:r>
-              <a:rPr lang="en-US" sz="2400" dirty="0" smtClean="0"/>
-              <a:t> </a:t>
-            </a:r>
-            <a:r>
-              <a:rPr lang="en-US" sz="2400" dirty="0" err="1" smtClean="0"/>
-              <a:t>döka</a:t>
-            </a:r>
-            <a:r>
-              <a:rPr lang="en-US" sz="2400" dirty="0" smtClean="0"/>
-              <a:t>  </a:t>
-            </a:r>
-            <a:r>
-              <a:rPr lang="en-US" sz="2400" dirty="0" err="1" smtClean="0"/>
-              <a:t>ösldkö</a:t>
-            </a:r>
-            <a:r>
-              <a:rPr lang="en-US" sz="2400" dirty="0" smtClean="0"/>
-              <a:t> </a:t>
-            </a:r>
-            <a:r>
-              <a:rPr lang="en-US" sz="2400" dirty="0" err="1" smtClean="0"/>
-              <a:t>laskd</a:t>
-            </a:r>
-            <a:r>
-              <a:rPr lang="en-US" sz="2400" dirty="0" smtClean="0"/>
-              <a:t> </a:t>
-            </a:r>
-            <a:r>
-              <a:rPr lang="en-US" sz="2400" dirty="0" err="1" smtClean="0"/>
-              <a:t>öka</a:t>
-            </a:r>
-            <a:r>
-              <a:rPr lang="en-US" sz="2400" dirty="0" smtClean="0"/>
-              <a:t> </a:t>
-            </a:r>
-            <a:r>
-              <a:rPr lang="en-US" sz="2400" dirty="0" err="1" smtClean="0"/>
-              <a:t>sdölkasdöl</a:t>
-            </a:r>
-            <a:r>
-              <a:rPr lang="en-US" sz="2400" dirty="0" smtClean="0"/>
-              <a:t> </a:t>
-            </a:r>
-            <a:r>
-              <a:rPr lang="en-US" sz="2400" dirty="0" err="1" smtClean="0"/>
-              <a:t>kölas</a:t>
-            </a:r>
-            <a:r>
-              <a:rPr lang="en-US" sz="2400" dirty="0" smtClean="0"/>
-              <a:t> </a:t>
-            </a:r>
-            <a:r>
-              <a:rPr lang="en-US" sz="2400" dirty="0" err="1" smtClean="0"/>
-              <a:t>kklj</a:t>
-            </a:r>
-            <a:r>
-              <a:rPr lang="en-US" sz="2400" dirty="0" smtClean="0"/>
-              <a:t> </a:t>
-            </a:r>
-            <a:r>
-              <a:rPr lang="en-US" sz="2400" dirty="0" err="1" smtClean="0"/>
-              <a:t>kjkjasd</a:t>
-            </a:r>
-            <a:r>
-              <a:rPr lang="en-US" sz="2400" dirty="0" smtClean="0"/>
-              <a:t> </a:t>
-            </a:r>
-            <a:r>
-              <a:rPr lang="en-US" sz="2400" dirty="0" err="1" smtClean="0"/>
-              <a:t>lkjks</a:t>
-            </a:r>
-            <a:r>
-              <a:rPr lang="en-US" sz="2400" dirty="0" smtClean="0"/>
-              <a:t> </a:t>
-            </a:r>
-            <a:r>
-              <a:rPr lang="en-US" sz="2400" dirty="0" err="1" smtClean="0"/>
-              <a:t>lkjdse</a:t>
-            </a:r>
-            <a:r>
-              <a:rPr lang="en-US" sz="2400" dirty="0" smtClean="0"/>
-              <a:t> </a:t>
-            </a:r>
-            <a:r>
-              <a:rPr lang="en-US" sz="2400" dirty="0" err="1" smtClean="0"/>
-              <a:t>lkerkjasd</a:t>
-            </a:r>
-            <a:r>
-              <a:rPr lang="en-US" sz="2400" dirty="0" smtClean="0"/>
-              <a:t> </a:t>
-            </a:r>
-            <a:r>
-              <a:rPr lang="en-US" sz="2400" dirty="0" err="1" smtClean="0"/>
-              <a:t>sadlkmsd</a:t>
-            </a:r>
-            <a:r>
-              <a:rPr lang="en-US" sz="2400" dirty="0" smtClean="0"/>
-              <a:t> </a:t>
-            </a:r>
-            <a:r>
-              <a:rPr lang="en-US" sz="2400" dirty="0" err="1" smtClean="0"/>
-              <a:t>salkdjkj</a:t>
-            </a:r>
-            <a:r>
-              <a:rPr lang="en-US" sz="2400" dirty="0" smtClean="0"/>
-              <a:t> sad </a:t>
-            </a:r>
-            <a:r>
-              <a:rPr lang="en-US" sz="2400" dirty="0" err="1" smtClean="0"/>
-              <a:t>sadklkjsad</a:t>
-            </a:r>
-            <a:r>
-              <a:rPr lang="en-US" sz="2400" dirty="0" smtClean="0"/>
-              <a:t> </a:t>
-            </a:r>
-            <a:r>
-              <a:rPr lang="en-US" sz="2400" dirty="0" err="1" smtClean="0"/>
-              <a:t>klasdlkj</a:t>
-            </a:r>
-            <a:r>
-              <a:rPr lang="en-US" sz="2400" dirty="0" smtClean="0"/>
-              <a:t> </a:t>
-            </a:r>
-            <a:r>
-              <a:rPr lang="en-US" sz="2400" dirty="0" err="1" smtClean="0"/>
-              <a:t>asdkjl</a:t>
-            </a:r>
-            <a:r>
-              <a:rPr lang="en-US" sz="2400" dirty="0" smtClean="0"/>
-              <a:t>  </a:t>
-            </a:r>
-            <a:r>
-              <a:rPr lang="en-US" sz="2400" dirty="0" err="1" smtClean="0"/>
-              <a:t>kas</a:t>
-            </a:r>
-            <a:r>
-              <a:rPr lang="en-US" sz="2400" dirty="0" smtClean="0"/>
-              <a:t> </a:t>
-            </a:r>
-            <a:r>
-              <a:rPr lang="en-US" sz="2400" dirty="0" err="1" smtClean="0"/>
-              <a:t>jdklsa</a:t>
-            </a:r>
-            <a:r>
-              <a:rPr lang="en-US" sz="2400" dirty="0" smtClean="0"/>
-              <a:t> </a:t>
-            </a:r>
-            <a:r>
-              <a:rPr lang="en-US" sz="2400" dirty="0" err="1" smtClean="0"/>
-              <a:t>klasjdkjasdlkj</a:t>
-            </a:r>
-            <a:r>
-              <a:rPr lang="en-US" sz="2400" dirty="0" smtClean="0"/>
-              <a:t> </a:t>
-            </a:r>
-            <a:r>
-              <a:rPr lang="en-US" sz="2400" dirty="0" err="1" smtClean="0"/>
-              <a:t>dsadk</a:t>
-            </a:r>
-            <a:r>
-              <a:rPr lang="en-US" sz="2400" dirty="0" smtClean="0"/>
-              <a:t> </a:t>
-            </a:r>
-            <a:r>
-              <a:rPr lang="en-US" sz="2400" dirty="0" err="1" smtClean="0"/>
-              <a:t>lkasdjlaksjd</a:t>
-            </a:r>
-            <a:r>
-              <a:rPr lang="en-US" sz="2400" dirty="0" smtClean="0"/>
-              <a:t> </a:t>
-            </a:r>
-            <a:r>
-              <a:rPr lang="en-US" sz="2400" dirty="0" err="1" smtClean="0"/>
-              <a:t>Sdsds</a:t>
-            </a:r>
-            <a:r>
-              <a:rPr lang="en-US" sz="2400" dirty="0" smtClean="0"/>
-              <a:t> </a:t>
-            </a:r>
-            <a:r>
-              <a:rPr lang="en-US" sz="2400" dirty="0" err="1" smtClean="0"/>
-              <a:t>dsdsdsd</a:t>
-            </a:r>
-            <a:r>
-              <a:rPr lang="en-US" sz="2400" dirty="0" smtClean="0"/>
-              <a:t> </a:t>
-            </a:r>
-            <a:r>
-              <a:rPr lang="en-US" sz="2400" dirty="0" err="1" smtClean="0"/>
-              <a:t>lask</a:t>
-            </a:r>
-            <a:r>
-              <a:rPr lang="en-US" sz="2400" dirty="0" smtClean="0"/>
-              <a:t> </a:t>
-            </a:r>
-            <a:r>
-              <a:rPr lang="en-US" sz="2400" dirty="0" err="1" smtClean="0"/>
-              <a:t>döka</a:t>
-            </a:r>
-            <a:r>
-              <a:rPr lang="en-US" sz="2400" dirty="0" smtClean="0"/>
-              <a:t>  </a:t>
-            </a:r>
-            <a:r>
-              <a:rPr lang="en-US" sz="2400" dirty="0" err="1" smtClean="0"/>
-              <a:t>ösldkö</a:t>
-            </a:r>
-            <a:r>
-              <a:rPr lang="en-US" sz="2400" dirty="0" smtClean="0"/>
-              <a:t> </a:t>
-            </a:r>
-            <a:r>
-              <a:rPr lang="en-US" sz="2400" dirty="0" err="1" smtClean="0"/>
-              <a:t>laskd</a:t>
-            </a:r>
-            <a:r>
-              <a:rPr lang="en-US" sz="2400" dirty="0" smtClean="0"/>
-              <a:t> </a:t>
-            </a:r>
-            <a:r>
-              <a:rPr lang="en-US" sz="2400" dirty="0" err="1" smtClean="0"/>
-              <a:t>öka</a:t>
-            </a:r>
-            <a:r>
-              <a:rPr lang="en-US" sz="2400" dirty="0" smtClean="0"/>
-              <a:t> </a:t>
-            </a:r>
-            <a:r>
-              <a:rPr lang="en-US" sz="2400" dirty="0" err="1" smtClean="0"/>
-              <a:t>sdölkasdöl</a:t>
-            </a:r>
-            <a:r>
-              <a:rPr lang="en-US" sz="2400" dirty="0" smtClean="0"/>
-              <a:t> </a:t>
-            </a:r>
-            <a:r>
-              <a:rPr lang="en-US" sz="2400" dirty="0" err="1" smtClean="0"/>
-              <a:t>kölas</a:t>
-            </a:r>
-            <a:r>
-              <a:rPr lang="en-US" sz="2400" dirty="0" smtClean="0"/>
-              <a:t> </a:t>
-            </a:r>
-            <a:r>
-              <a:rPr lang="en-US" sz="2400" dirty="0" err="1" smtClean="0"/>
-              <a:t>kklj</a:t>
-            </a:r>
-            <a:r>
-              <a:rPr lang="en-US" sz="2400" dirty="0" smtClean="0"/>
-              <a:t> </a:t>
-            </a:r>
-            <a:r>
-              <a:rPr lang="en-US" sz="2400" dirty="0" err="1" smtClean="0"/>
-              <a:t>kjkjasd</a:t>
-            </a:r>
-            <a:r>
-              <a:rPr lang="en-US" sz="2400" dirty="0" smtClean="0"/>
-              <a:t> </a:t>
-            </a:r>
-            <a:r>
-              <a:rPr lang="en-US" sz="2400" dirty="0" err="1" smtClean="0"/>
-              <a:t>lkjks</a:t>
-            </a:r>
-            <a:r>
-              <a:rPr lang="en-US" sz="2400" dirty="0" smtClean="0"/>
-              <a:t> </a:t>
-            </a:r>
-            <a:r>
-              <a:rPr lang="en-US" sz="2400" dirty="0" err="1" smtClean="0"/>
-              <a:t>lkjdse</a:t>
-            </a:r>
-            <a:r>
-              <a:rPr lang="en-US" sz="2400" dirty="0" smtClean="0"/>
-              <a:t> </a:t>
-            </a:r>
-            <a:r>
-              <a:rPr lang="en-US" sz="2400" dirty="0" err="1" smtClean="0"/>
-              <a:t>lkerkjasd</a:t>
-            </a:r>
-            <a:r>
-              <a:rPr lang="en-US" sz="2400" dirty="0" smtClean="0"/>
-              <a:t> </a:t>
-            </a:r>
-            <a:r>
-              <a:rPr lang="en-US" sz="2400" dirty="0" err="1" smtClean="0"/>
-              <a:t>sadlkmsd</a:t>
-            </a:r>
-            <a:r>
-              <a:rPr lang="en-US" sz="2400" dirty="0" smtClean="0"/>
-              <a:t> </a:t>
-            </a:r>
-            <a:r>
-              <a:rPr lang="en-US" sz="2400" dirty="0" err="1" smtClean="0"/>
-              <a:t>salkdjkj</a:t>
-            </a:r>
-            <a:r>
-              <a:rPr lang="en-US" sz="2400" dirty="0" smtClean="0"/>
-              <a:t> sad </a:t>
-            </a:r>
-            <a:r>
-              <a:rPr lang="en-US" sz="2400" dirty="0" err="1" smtClean="0"/>
-              <a:t>sadklkjsad</a:t>
-            </a:r>
-            <a:r>
-              <a:rPr lang="en-US" sz="2400" dirty="0" smtClean="0"/>
-              <a:t> </a:t>
-            </a:r>
-            <a:r>
-              <a:rPr lang="en-US" sz="2400" dirty="0" err="1" smtClean="0"/>
-              <a:t>klasdlkj</a:t>
-            </a:r>
-            <a:r>
-              <a:rPr lang="en-US" sz="2400" dirty="0" smtClean="0"/>
-              <a:t> </a:t>
-            </a:r>
-            <a:r>
-              <a:rPr lang="en-US" sz="2400" dirty="0" err="1" smtClean="0"/>
-              <a:t>asdkjl</a:t>
-            </a:r>
-            <a:r>
-              <a:rPr lang="en-US" sz="2400" dirty="0" smtClean="0"/>
-              <a:t>  </a:t>
-            </a:r>
-            <a:r>
-              <a:rPr lang="en-US" sz="2400" dirty="0" err="1" smtClean="0"/>
-              <a:t>kas</a:t>
-            </a:r>
-            <a:r>
-              <a:rPr lang="en-US" sz="2400" dirty="0" smtClean="0"/>
-              <a:t> </a:t>
-            </a:r>
-            <a:r>
-              <a:rPr lang="en-US" sz="2400" dirty="0" err="1" smtClean="0"/>
-              <a:t>jdklsa</a:t>
-            </a:r>
-            <a:r>
-              <a:rPr lang="en-US" sz="2400" dirty="0" smtClean="0"/>
-              <a:t> </a:t>
-            </a:r>
-            <a:r>
-              <a:rPr lang="en-US" sz="2400" dirty="0" err="1" smtClean="0"/>
-              <a:t>klasjdkjasdlkj</a:t>
-            </a:r>
-            <a:r>
-              <a:rPr lang="en-US" sz="2400" dirty="0" smtClean="0"/>
-              <a:t> </a:t>
-            </a:r>
-            <a:r>
-              <a:rPr lang="en-US" sz="2400" dirty="0" err="1" smtClean="0"/>
-              <a:t>dsadk</a:t>
-            </a:r>
-            <a:r>
-              <a:rPr lang="en-US" sz="2400" dirty="0" smtClean="0"/>
-              <a:t> </a:t>
-            </a:r>
-            <a:r>
-              <a:rPr lang="en-US" sz="2400" dirty="0" err="1" smtClean="0"/>
-              <a:t>lkasdjlaksjd</a:t>
-            </a:r>
-            <a:r>
-              <a:rPr lang="en-US" sz="2400" dirty="0" smtClean="0"/>
-              <a:t> </a:t>
-            </a:r>
-          </a:p>
-          <a:p>
-            <a:pPr algn="just"/>
+              <a:rPr lang="et-EE" sz="2400" dirty="0"/>
+              <a:t>We have built  5 separate recommender systems. All the systems use different parts from our data and you can find more information about each system below. There’s also one additional system, which connects all the other systems and should give the best recommendations.</a:t>
+            </a:r>
             <a:endParaRPr lang="en-US" sz="2400" dirty="0"/>
           </a:p>
         </p:txBody>
@@ -4403,14 +4017,14 @@
               <a:t> </a:t>
             </a:r>
             <a:r>
-              <a:rPr lang="en-US" sz="7200" dirty="0" smtClean="0">
+              <a:rPr lang="en-US" sz="7200" dirty="0">
                 <a:solidFill>
                   <a:schemeClr val="bg1"/>
                 </a:solidFill>
               </a:rPr>
               <a:t>- Success Factors and Recommender System</a:t>
             </a:r>
-            <a:endParaRPr lang="en-US" sz="7200" dirty="0" smtClean="0">
+            <a:endParaRPr lang="en-US" sz="7200" dirty="0">
               <a:solidFill>
                 <a:schemeClr val="bg1"/>
               </a:solidFill>
@@ -4665,7 +4279,7 @@
             <a:p>
               <a:pPr algn="ctr"/>
               <a:r>
-                <a:rPr lang="en-US" sz="3200" dirty="0" smtClean="0">
+                <a:rPr lang="en-US" sz="3200" dirty="0">
                   <a:latin typeface="Franklin Gothic Medium" panose="020B0603020102020204" pitchFamily="34" charset="0"/>
                   <a:cs typeface="Aharoni" panose="02010803020104030203" pitchFamily="2" charset="-79"/>
                 </a:rPr>
@@ -4786,7 +4400,7 @@
             <a:p>
               <a:pPr algn="ctr"/>
               <a:r>
-                <a:rPr lang="en-US" sz="3200" dirty="0" smtClean="0">
+                <a:rPr lang="en-US" sz="3200" dirty="0">
                   <a:latin typeface="Franklin Gothic Medium" panose="020B0603020102020204" pitchFamily="34" charset="0"/>
                   <a:cs typeface="Aharoni" panose="02010803020104030203" pitchFamily="2" charset="-79"/>
                 </a:rPr>
@@ -4907,7 +4521,7 @@
             <a:p>
               <a:pPr algn="ctr"/>
               <a:r>
-                <a:rPr lang="en-US" sz="3200" dirty="0" smtClean="0">
+                <a:rPr lang="en-US" sz="3200" dirty="0">
                   <a:latin typeface="Franklin Gothic Medium" panose="020B0603020102020204" pitchFamily="34" charset="0"/>
                   <a:cs typeface="Aharoni" panose="02010803020104030203" pitchFamily="2" charset="-79"/>
                 </a:rPr>
@@ -5028,7 +4642,7 @@
             <a:p>
               <a:pPr algn="ctr"/>
               <a:r>
-                <a:rPr lang="en-US" sz="3200" dirty="0" smtClean="0">
+                <a:rPr lang="en-US" sz="3200" dirty="0">
                   <a:latin typeface="Franklin Gothic Medium" panose="020B0603020102020204" pitchFamily="34" charset="0"/>
                   <a:cs typeface="Aharoni" panose="02010803020104030203" pitchFamily="2" charset="-79"/>
                 </a:rPr>
@@ -5066,10 +4680,9 @@
           <a:p>
             <a:pPr algn="just"/>
             <a:r>
-              <a:rPr lang="en-US" sz="2400" dirty="0" smtClean="0"/>
+              <a:rPr lang="en-US" sz="2400" dirty="0"/>
               <a:t>For the evaluation, we just took keywords, which occurs in more than 50 movies. We also used them to generate a top/flop ranking of relationships and animals. </a:t>
             </a:r>
-            <a:endParaRPr lang="en-US" sz="2400" dirty="0"/>
           </a:p>
         </p:txBody>
       </p:sp>
@@ -5097,10 +4710,9 @@
           <a:p>
             <a:pPr algn="just"/>
             <a:r>
-              <a:rPr lang="en-US" sz="2400" dirty="0" smtClean="0"/>
+              <a:rPr lang="en-US" sz="2400" dirty="0"/>
               <a:t>There are 20 genres in total inside the dataset. For this analysis we just used movies with over 1000 votes to get a more evaluable result. The following plot shows, that the median of history movies is the highest and the median of the music genre the lowest. Foreign movies have a wide range which reaches high average ratings, but the median is quite low. </a:t>
             </a:r>
-            <a:endParaRPr lang="en-US" sz="2400" dirty="0"/>
           </a:p>
         </p:txBody>
       </p:sp>
@@ -5128,10 +4740,9 @@
           <a:p>
             <a:pPr algn="just"/>
             <a:r>
-              <a:rPr lang="en-US" sz="2400" dirty="0" smtClean="0"/>
+              <a:rPr lang="en-US" sz="2400" dirty="0"/>
               <a:t>Movies containing the keyword “classic noir” got the best mean rating result, which is reinforced by the fact that all top 5 actors are already dead. Movies with horses and cats got outstanding rating results, while movies with dogs and sharks got under-average ratings. Gay and sister-sister relationships might be more interesting for users than parent-child relationships.</a:t>
             </a:r>
-            <a:endParaRPr lang="en-US" sz="2400" dirty="0"/>
           </a:p>
         </p:txBody>
       </p:sp>
@@ -5157,13 +4768,79 @@
           <a:lstStyle/>
           <a:p>
             <a:r>
-              <a:rPr lang="en-US" sz="2400" i="1" dirty="0" smtClean="0"/>
+              <a:rPr lang="en-US" sz="2400" i="1" dirty="0"/>
               <a:t>https://github.com/mariellee/datamining2017</a:t>
             </a:r>
-            <a:endParaRPr lang="en-US" sz="2400" i="1" dirty="0"/>
-          </a:p>
-        </p:txBody>
-      </p:sp>
+          </a:p>
+        </p:txBody>
+      </p:sp>
+      <p:sp>
+        <p:nvSpPr>
+          <p:cNvPr id="48" name="Textfeld 44">
+            <a:extLst>
+              <a:ext uri="{FF2B5EF4-FFF2-40B4-BE49-F238E27FC236}">
+                <a16:creationId xmlns:a16="http://schemas.microsoft.com/office/drawing/2014/main" id="{AEB88A7C-3A39-4106-BB07-A40780E1D79E}"/>
+              </a:ext>
+            </a:extLst>
+          </p:cNvPr>
+          <p:cNvSpPr txBox="1"/>
+          <p:nvPr/>
+        </p:nvSpPr>
+        <p:spPr>
+          <a:xfrm>
+            <a:off x="20700000" y="5476140"/>
+            <a:ext cx="5065780" cy="2308324"/>
+          </a:xfrm>
+          <a:prstGeom prst="rect">
+            <a:avLst/>
+          </a:prstGeom>
+          <a:noFill/>
+        </p:spPr>
+        <p:txBody>
+          <a:bodyPr wrap="square" rtlCol="0">
+            <a:spAutoFit/>
+          </a:bodyPr>
+          <a:lstStyle/>
+          <a:p>
+            <a:pPr algn="just"/>
+            <a:r>
+              <a:rPr lang="et-EE" sz="2400" dirty="0"/>
+              <a:t>Most of the systems are using information, how you have persnonally rated seen movies. In the right you can see sample movie ratings that are used by the systems. Below you can also see, systems’s recommendations</a:t>
+            </a:r>
+            <a:endParaRPr lang="en-US" sz="2400" dirty="0"/>
+          </a:p>
+        </p:txBody>
+      </p:sp>
+      <p:pic>
+        <p:nvPicPr>
+          <p:cNvPr id="2" name="Picture 1">
+            <a:extLst>
+              <a:ext uri="{FF2B5EF4-FFF2-40B4-BE49-F238E27FC236}">
+                <a16:creationId xmlns:a16="http://schemas.microsoft.com/office/drawing/2014/main" id="{D57817D0-46FA-4B7D-9A2A-720A7BC6A431}"/>
+              </a:ext>
+            </a:extLst>
+          </p:cNvPr>
+          <p:cNvPicPr>
+            <a:picLocks noChangeAspect="1"/>
+          </p:cNvPicPr>
+          <p:nvPr/>
+        </p:nvPicPr>
+        <p:blipFill>
+          <a:blip r:embed="rId10"/>
+          <a:stretch>
+            <a:fillRect/>
+          </a:stretch>
+        </p:blipFill>
+        <p:spPr>
+          <a:xfrm>
+            <a:off x="25784591" y="5584031"/>
+            <a:ext cx="3915409" cy="2281641"/>
+          </a:xfrm>
+          <a:prstGeom prst="rect">
+            <a:avLst/>
+          </a:prstGeom>
+        </p:spPr>
+      </p:pic>
     </p:spTree>
     <p:extLst>
       <p:ext uri="{BB962C8B-B14F-4D97-AF65-F5344CB8AC3E}">
@@ -5174,13 +4851,6 @@
   <p:clrMapOvr>
     <a:masterClrMapping/>
   </p:clrMapOvr>
-  <p:timing>
-    <p:tnLst>
-      <p:par>
-        <p:cTn id="1" dur="indefinite" restart="never" nodeType="tmRoot"/>
-      </p:par>
-    </p:tnLst>
-  </p:timing>
 </p:sld>
 </file>
 

</xml_diff>

<commit_message>
4  seperate recommender systems are covered on the poster
</commit_message>
<xml_diff>
--- a/poster/poster_dm_a1.pptx
+++ b/poster/poster_dm_a1.pptx
@@ -247,7 +247,7 @@
           <a:p>
             <a:fld id="{A3C79E79-5633-4DAD-A3E3-B36D650BAA39}" type="datetimeFigureOut">
               <a:rPr lang="en-US" smtClean="0"/>
-              <a:t>1/4/2018</a:t>
+              <a:t>1/5/2018</a:t>
             </a:fld>
             <a:endParaRPr lang="en-US"/>
           </a:p>
@@ -417,7 +417,7 @@
           <a:p>
             <a:fld id="{A3C79E79-5633-4DAD-A3E3-B36D650BAA39}" type="datetimeFigureOut">
               <a:rPr lang="en-US" smtClean="0"/>
-              <a:t>1/4/2018</a:t>
+              <a:t>1/5/2018</a:t>
             </a:fld>
             <a:endParaRPr lang="en-US"/>
           </a:p>
@@ -597,7 +597,7 @@
           <a:p>
             <a:fld id="{A3C79E79-5633-4DAD-A3E3-B36D650BAA39}" type="datetimeFigureOut">
               <a:rPr lang="en-US" smtClean="0"/>
-              <a:t>1/4/2018</a:t>
+              <a:t>1/5/2018</a:t>
             </a:fld>
             <a:endParaRPr lang="en-US"/>
           </a:p>
@@ -767,7 +767,7 @@
           <a:p>
             <a:fld id="{A3C79E79-5633-4DAD-A3E3-B36D650BAA39}" type="datetimeFigureOut">
               <a:rPr lang="en-US" smtClean="0"/>
-              <a:t>1/4/2018</a:t>
+              <a:t>1/5/2018</a:t>
             </a:fld>
             <a:endParaRPr lang="en-US"/>
           </a:p>
@@ -1011,7 +1011,7 @@
           <a:p>
             <a:fld id="{A3C79E79-5633-4DAD-A3E3-B36D650BAA39}" type="datetimeFigureOut">
               <a:rPr lang="en-US" smtClean="0"/>
-              <a:t>1/4/2018</a:t>
+              <a:t>1/5/2018</a:t>
             </a:fld>
             <a:endParaRPr lang="en-US"/>
           </a:p>
@@ -1243,7 +1243,7 @@
           <a:p>
             <a:fld id="{A3C79E79-5633-4DAD-A3E3-B36D650BAA39}" type="datetimeFigureOut">
               <a:rPr lang="en-US" smtClean="0"/>
-              <a:t>1/4/2018</a:t>
+              <a:t>1/5/2018</a:t>
             </a:fld>
             <a:endParaRPr lang="en-US"/>
           </a:p>
@@ -1610,7 +1610,7 @@
           <a:p>
             <a:fld id="{A3C79E79-5633-4DAD-A3E3-B36D650BAA39}" type="datetimeFigureOut">
               <a:rPr lang="en-US" smtClean="0"/>
-              <a:t>1/4/2018</a:t>
+              <a:t>1/5/2018</a:t>
             </a:fld>
             <a:endParaRPr lang="en-US"/>
           </a:p>
@@ -1728,7 +1728,7 @@
           <a:p>
             <a:fld id="{A3C79E79-5633-4DAD-A3E3-B36D650BAA39}" type="datetimeFigureOut">
               <a:rPr lang="en-US" smtClean="0"/>
-              <a:t>1/4/2018</a:t>
+              <a:t>1/5/2018</a:t>
             </a:fld>
             <a:endParaRPr lang="en-US"/>
           </a:p>
@@ -1823,7 +1823,7 @@
           <a:p>
             <a:fld id="{A3C79E79-5633-4DAD-A3E3-B36D650BAA39}" type="datetimeFigureOut">
               <a:rPr lang="en-US" smtClean="0"/>
-              <a:t>1/4/2018</a:t>
+              <a:t>1/5/2018</a:t>
             </a:fld>
             <a:endParaRPr lang="en-US"/>
           </a:p>
@@ -2100,7 +2100,7 @@
           <a:p>
             <a:fld id="{A3C79E79-5633-4DAD-A3E3-B36D650BAA39}" type="datetimeFigureOut">
               <a:rPr lang="en-US" smtClean="0"/>
-              <a:t>1/4/2018</a:t>
+              <a:t>1/5/2018</a:t>
             </a:fld>
             <a:endParaRPr lang="en-US"/>
           </a:p>
@@ -2357,7 +2357,7 @@
           <a:p>
             <a:fld id="{A3C79E79-5633-4DAD-A3E3-B36D650BAA39}" type="datetimeFigureOut">
               <a:rPr lang="en-US" smtClean="0"/>
-              <a:t>1/4/2018</a:t>
+              <a:t>1/5/2018</a:t>
             </a:fld>
             <a:endParaRPr lang="en-US"/>
           </a:p>
@@ -2570,7 +2570,7 @@
           <a:p>
             <a:fld id="{A3C79E79-5633-4DAD-A3E3-B36D650BAA39}" type="datetimeFigureOut">
               <a:rPr lang="en-US" smtClean="0"/>
-              <a:t>1/4/2018</a:t>
+              <a:t>1/5/2018</a:t>
             </a:fld>
             <a:endParaRPr lang="en-US"/>
           </a:p>
@@ -3540,43 +3540,6 @@
           </a:p>
         </p:txBody>
       </p:sp>
-      <p:cxnSp>
-        <p:nvCxnSpPr>
-          <p:cNvPr id="21" name="Gerader Verbinder 20"/>
-          <p:cNvCxnSpPr/>
-          <p:nvPr/>
-        </p:nvCxnSpPr>
-        <p:spPr>
-          <a:xfrm>
-            <a:off x="20160000" y="2880000"/>
-            <a:ext cx="0" cy="18000000"/>
-          </a:xfrm>
-          <a:prstGeom prst="line">
-            <a:avLst/>
-          </a:prstGeom>
-          <a:ln>
-            <a:solidFill>
-              <a:schemeClr val="bg1">
-                <a:lumMod val="85000"/>
-              </a:schemeClr>
-            </a:solidFill>
-          </a:ln>
-        </p:spPr>
-        <p:style>
-          <a:lnRef idx="1">
-            <a:schemeClr val="dk1"/>
-          </a:lnRef>
-          <a:fillRef idx="0">
-            <a:schemeClr val="dk1"/>
-          </a:fillRef>
-          <a:effectRef idx="0">
-            <a:schemeClr val="dk1"/>
-          </a:effectRef>
-          <a:fontRef idx="minor">
-            <a:schemeClr val="tx1"/>
-          </a:fontRef>
-        </p:style>
-      </p:cxnSp>
       <p:grpSp>
         <p:nvGrpSpPr>
           <p:cNvPr id="67" name="Gruppieren 66"/>
@@ -3961,7 +3924,7 @@
         <p:spPr>
           <a:xfrm>
             <a:off x="20700000" y="4014371"/>
-            <a:ext cx="9000000" cy="1569660"/>
+            <a:ext cx="9000000" cy="2308324"/>
           </a:xfrm>
           <a:prstGeom prst="rect">
             <a:avLst/>
@@ -3977,7 +3940,7 @@
             <a:pPr algn="just"/>
             <a:r>
               <a:rPr lang="et-EE" sz="2400" dirty="0"/>
-              <a:t>We have built  5 separate recommender systems. All the systems use different parts from our data and you can find more information about each system below. There’s also one additional system, which connects all the other systems and should give the best recommendations.</a:t>
+              <a:t>We have built 4 separate recommender systems. All the systems use different parts from our data. They base on self declared distances from other movies for recommendations and you can find more information about each system below. There’s also one additional system, which connects all the other systems and it should give the best recommendations.</a:t>
             </a:r>
             <a:endParaRPr lang="en-US" sz="2400" dirty="0"/>
           </a:p>
@@ -4788,7 +4751,7 @@
         </p:nvSpPr>
         <p:spPr>
           <a:xfrm>
-            <a:off x="20700000" y="5476140"/>
+            <a:off x="20645088" y="6256472"/>
             <a:ext cx="5065780" cy="2308324"/>
           </a:xfrm>
           <a:prstGeom prst="rect">
@@ -4833,14 +4796,296 @@
         </p:blipFill>
         <p:spPr>
           <a:xfrm>
-            <a:off x="25784591" y="5584031"/>
-            <a:ext cx="3915409" cy="2281641"/>
+            <a:off x="25839503" y="6282979"/>
+            <a:ext cx="3915409" cy="2294775"/>
           </a:xfrm>
           <a:prstGeom prst="rect">
             <a:avLst/>
           </a:prstGeom>
         </p:spPr>
       </p:pic>
+      <p:sp>
+        <p:nvSpPr>
+          <p:cNvPr id="57" name="Textfeld 78">
+            <a:extLst>
+              <a:ext uri="{FF2B5EF4-FFF2-40B4-BE49-F238E27FC236}">
+                <a16:creationId xmlns:a16="http://schemas.microsoft.com/office/drawing/2014/main" id="{E284023B-582E-4ADB-9310-52DCA4EEA521}"/>
+              </a:ext>
+            </a:extLst>
+          </p:cNvPr>
+          <p:cNvSpPr txBox="1"/>
+          <p:nvPr/>
+        </p:nvSpPr>
+        <p:spPr>
+          <a:xfrm>
+            <a:off x="20699998" y="8621048"/>
+            <a:ext cx="5084591" cy="2308324"/>
+          </a:xfrm>
+          <a:prstGeom prst="rect">
+            <a:avLst/>
+          </a:prstGeom>
+          <a:noFill/>
+        </p:spPr>
+        <p:txBody>
+          <a:bodyPr wrap="square" rtlCol="0">
+            <a:spAutoFit/>
+          </a:bodyPr>
+          <a:lstStyle/>
+          <a:p>
+            <a:pPr algn="just"/>
+            <a:r>
+              <a:rPr lang="et-EE" sz="2400" b="1" dirty="0"/>
+              <a:t>System 1 </a:t>
+            </a:r>
+            <a:r>
+              <a:rPr lang="et-EE" sz="2400" dirty="0"/>
+              <a:t>– It’s the only system that isn’t using your ratings. It recommends you movies that have recieved good ratings wring many people, have recieved many critics and reviews and are popular in general.</a:t>
+            </a:r>
+            <a:endParaRPr lang="en-US" sz="2400" dirty="0"/>
+          </a:p>
+        </p:txBody>
+      </p:sp>
+      <p:sp>
+        <p:nvSpPr>
+          <p:cNvPr id="59" name="Textfeld 78">
+            <a:extLst>
+              <a:ext uri="{FF2B5EF4-FFF2-40B4-BE49-F238E27FC236}">
+                <a16:creationId xmlns:a16="http://schemas.microsoft.com/office/drawing/2014/main" id="{AFC1FBE8-97A6-44D8-96C2-9C3D3652282A}"/>
+              </a:ext>
+            </a:extLst>
+          </p:cNvPr>
+          <p:cNvSpPr txBox="1"/>
+          <p:nvPr/>
+        </p:nvSpPr>
+        <p:spPr>
+          <a:xfrm>
+            <a:off x="20699998" y="10971544"/>
+            <a:ext cx="5084591" cy="1569660"/>
+          </a:xfrm>
+          <a:prstGeom prst="rect">
+            <a:avLst/>
+          </a:prstGeom>
+          <a:noFill/>
+        </p:spPr>
+        <p:txBody>
+          <a:bodyPr wrap="square" rtlCol="0">
+            <a:spAutoFit/>
+          </a:bodyPr>
+          <a:lstStyle/>
+          <a:p>
+            <a:pPr algn="just"/>
+            <a:r>
+              <a:rPr lang="et-EE" sz="2400" b="1" dirty="0"/>
+              <a:t>System 2 </a:t>
+            </a:r>
+            <a:r>
+              <a:rPr lang="et-EE" sz="2400" dirty="0"/>
+              <a:t>– It’s recommending movies based on actors. It gives higher scores to the movies that have actors, whose movies you have liked before.</a:t>
+            </a:r>
+            <a:endParaRPr lang="en-US" sz="2400" dirty="0"/>
+          </a:p>
+        </p:txBody>
+      </p:sp>
+      <p:sp>
+        <p:nvSpPr>
+          <p:cNvPr id="70" name="Textfeld 78">
+            <a:extLst>
+              <a:ext uri="{FF2B5EF4-FFF2-40B4-BE49-F238E27FC236}">
+                <a16:creationId xmlns:a16="http://schemas.microsoft.com/office/drawing/2014/main" id="{86A7426B-F236-4F16-B7D6-CF9A30BAD66F}"/>
+              </a:ext>
+            </a:extLst>
+          </p:cNvPr>
+          <p:cNvSpPr txBox="1"/>
+          <p:nvPr/>
+        </p:nvSpPr>
+        <p:spPr>
+          <a:xfrm>
+            <a:off x="20699998" y="12710777"/>
+            <a:ext cx="5084591" cy="1938992"/>
+          </a:xfrm>
+          <a:prstGeom prst="rect">
+            <a:avLst/>
+          </a:prstGeom>
+          <a:noFill/>
+        </p:spPr>
+        <p:txBody>
+          <a:bodyPr wrap="square" rtlCol="0">
+            <a:spAutoFit/>
+          </a:bodyPr>
+          <a:lstStyle/>
+          <a:p>
+            <a:pPr algn="just"/>
+            <a:r>
+              <a:rPr lang="et-EE" sz="2400" b="1" dirty="0"/>
+              <a:t>System 3 </a:t>
+            </a:r>
+            <a:r>
+              <a:rPr lang="et-EE" sz="2400" dirty="0"/>
+              <a:t>– It’s recommending you movies based on genres. Movies with genres that you have given better ratings than other genres will come up in the top with this system.</a:t>
+            </a:r>
+            <a:endParaRPr lang="en-US" sz="2400" dirty="0"/>
+          </a:p>
+        </p:txBody>
+      </p:sp>
+      <p:pic>
+        <p:nvPicPr>
+          <p:cNvPr id="8" name="Picture 7">
+            <a:extLst>
+              <a:ext uri="{FF2B5EF4-FFF2-40B4-BE49-F238E27FC236}">
+                <a16:creationId xmlns:a16="http://schemas.microsoft.com/office/drawing/2014/main" id="{C7682A10-E657-4A09-B6DB-311BF0AF34F4}"/>
+              </a:ext>
+            </a:extLst>
+          </p:cNvPr>
+          <p:cNvPicPr>
+            <a:picLocks noChangeAspect="1"/>
+          </p:cNvPicPr>
+          <p:nvPr/>
+        </p:nvPicPr>
+        <p:blipFill>
+          <a:blip r:embed="rId11"/>
+          <a:stretch>
+            <a:fillRect/>
+          </a:stretch>
+        </p:blipFill>
+        <p:spPr>
+          <a:xfrm>
+            <a:off x="25784590" y="10963769"/>
+            <a:ext cx="3970322" cy="1611832"/>
+          </a:xfrm>
+          <a:prstGeom prst="rect">
+            <a:avLst/>
+          </a:prstGeom>
+        </p:spPr>
+      </p:pic>
+      <p:pic>
+        <p:nvPicPr>
+          <p:cNvPr id="9" name="Picture 8">
+            <a:extLst>
+              <a:ext uri="{FF2B5EF4-FFF2-40B4-BE49-F238E27FC236}">
+                <a16:creationId xmlns:a16="http://schemas.microsoft.com/office/drawing/2014/main" id="{D04A824F-5495-49FC-B749-8C60AD2D9A4B}"/>
+              </a:ext>
+            </a:extLst>
+          </p:cNvPr>
+          <p:cNvPicPr>
+            <a:picLocks noChangeAspect="1"/>
+          </p:cNvPicPr>
+          <p:nvPr/>
+        </p:nvPicPr>
+        <p:blipFill>
+          <a:blip r:embed="rId12"/>
+          <a:stretch>
+            <a:fillRect/>
+          </a:stretch>
+        </p:blipFill>
+        <p:spPr>
+          <a:xfrm>
+            <a:off x="25865879" y="8701015"/>
+            <a:ext cx="3889033" cy="1944517"/>
+          </a:xfrm>
+          <a:prstGeom prst="rect">
+            <a:avLst/>
+          </a:prstGeom>
+        </p:spPr>
+      </p:pic>
+      <p:pic>
+        <p:nvPicPr>
+          <p:cNvPr id="10" name="Picture 9">
+            <a:extLst>
+              <a:ext uri="{FF2B5EF4-FFF2-40B4-BE49-F238E27FC236}">
+                <a16:creationId xmlns:a16="http://schemas.microsoft.com/office/drawing/2014/main" id="{5FF538A2-FFC4-4BE0-AF68-0B11CCB462A3}"/>
+              </a:ext>
+            </a:extLst>
+          </p:cNvPr>
+          <p:cNvPicPr>
+            <a:picLocks noChangeAspect="1"/>
+          </p:cNvPicPr>
+          <p:nvPr/>
+        </p:nvPicPr>
+        <p:blipFill>
+          <a:blip r:embed="rId13"/>
+          <a:stretch>
+            <a:fillRect/>
+          </a:stretch>
+        </p:blipFill>
+        <p:spPr>
+          <a:xfrm>
+            <a:off x="25784589" y="15025094"/>
+            <a:ext cx="3970323" cy="1843845"/>
+          </a:xfrm>
+          <a:prstGeom prst="rect">
+            <a:avLst/>
+          </a:prstGeom>
+        </p:spPr>
+      </p:pic>
+      <p:pic>
+        <p:nvPicPr>
+          <p:cNvPr id="11" name="Picture 10">
+            <a:extLst>
+              <a:ext uri="{FF2B5EF4-FFF2-40B4-BE49-F238E27FC236}">
+                <a16:creationId xmlns:a16="http://schemas.microsoft.com/office/drawing/2014/main" id="{295D3388-97F0-433D-9E7C-06C59E2FD653}"/>
+              </a:ext>
+            </a:extLst>
+          </p:cNvPr>
+          <p:cNvPicPr>
+            <a:picLocks noChangeAspect="1"/>
+          </p:cNvPicPr>
+          <p:nvPr/>
+        </p:nvPicPr>
+        <p:blipFill>
+          <a:blip r:embed="rId14"/>
+          <a:stretch>
+            <a:fillRect/>
+          </a:stretch>
+        </p:blipFill>
+        <p:spPr>
+          <a:xfrm>
+            <a:off x="25784589" y="12770035"/>
+            <a:ext cx="3970323" cy="1859014"/>
+          </a:xfrm>
+          <a:prstGeom prst="rect">
+            <a:avLst/>
+          </a:prstGeom>
+        </p:spPr>
+      </p:pic>
+      <p:sp>
+        <p:nvSpPr>
+          <p:cNvPr id="16" name="Rectangle 15">
+            <a:extLst>
+              <a:ext uri="{FF2B5EF4-FFF2-40B4-BE49-F238E27FC236}">
+                <a16:creationId xmlns:a16="http://schemas.microsoft.com/office/drawing/2014/main" id="{1480C494-7C81-4C29-8564-DBA8B9961EEA}"/>
+              </a:ext>
+            </a:extLst>
+          </p:cNvPr>
+          <p:cNvSpPr/>
+          <p:nvPr/>
+        </p:nvSpPr>
+        <p:spPr>
+          <a:xfrm>
+            <a:off x="20771679" y="14935336"/>
+            <a:ext cx="4939189" cy="1938992"/>
+          </a:xfrm>
+          <a:prstGeom prst="rect">
+            <a:avLst/>
+          </a:prstGeom>
+        </p:spPr>
+        <p:txBody>
+          <a:bodyPr wrap="square">
+            <a:spAutoFit/>
+          </a:bodyPr>
+          <a:lstStyle/>
+          <a:p>
+            <a:pPr algn="just"/>
+            <a:r>
+              <a:rPr lang="et-EE" sz="2400" b="1" dirty="0"/>
+              <a:t>System 4 </a:t>
+            </a:r>
+            <a:r>
+              <a:rPr lang="et-EE" sz="2400" dirty="0"/>
+              <a:t>– it’s recommending you movies based on it’s story content. There are avilable keywords for every movie and this system recommends movies with similar story keywords</a:t>
+            </a:r>
+          </a:p>
+        </p:txBody>
+      </p:sp>
     </p:spTree>
     <p:extLst>
       <p:ext uri="{BB962C8B-B14F-4D97-AF65-F5344CB8AC3E}">

</xml_diff>

<commit_message>
Poster should be ready now
</commit_message>
<xml_diff>
--- a/poster/poster_dm_a1.pptx
+++ b/poster/poster_dm_a1.pptx
@@ -3923,8 +3923,8 @@
         </p:nvSpPr>
         <p:spPr>
           <a:xfrm>
-            <a:off x="20700000" y="4014371"/>
-            <a:ext cx="9000000" cy="2308324"/>
+            <a:off x="20699998" y="3649212"/>
+            <a:ext cx="9054914" cy="1938992"/>
           </a:xfrm>
           <a:prstGeom prst="rect">
             <a:avLst/>
@@ -3940,7 +3940,7 @@
             <a:pPr algn="just"/>
             <a:r>
               <a:rPr lang="et-EE" sz="2400" dirty="0"/>
-              <a:t>We have built 4 separate recommender systems. All the systems use different parts from our data. They base on self declared distances from other movies for recommendations and you can find more information about each system below. There’s also one additional system, which connects all the other systems and it should give the best recommendations.</a:t>
+              <a:t>We have built 5 separate recommender systems, which use different parts from our data. They base on self declared distance measures. It’s possible to find more information about each system below. There’s also one additional system, which connects all the other systems and it should give the best recommendations in general.</a:t>
             </a:r>
             <a:endParaRPr lang="en-US" sz="2400" dirty="0"/>
           </a:p>
@@ -4751,8 +4751,8 @@
         </p:nvSpPr>
         <p:spPr>
           <a:xfrm>
-            <a:off x="20645088" y="6256472"/>
-            <a:ext cx="5065780" cy="2308324"/>
+            <a:off x="20694755" y="5515743"/>
+            <a:ext cx="5403743" cy="2308324"/>
           </a:xfrm>
           <a:prstGeom prst="rect">
             <a:avLst/>
@@ -4768,42 +4768,12 @@
             <a:pPr algn="just"/>
             <a:r>
               <a:rPr lang="et-EE" sz="2400" dirty="0"/>
-              <a:t>Most of the systems are using information, how you have persnonally rated seen movies. In the right you can see sample movie ratings that are used by the systems. Below you can also see, systems’s recommendations</a:t>
+              <a:t>Most of the systems are using information, how you have persnonally rated seen movies. In the right you can see sample movie ratings that are used by the systems. Below you can also see, systems’s recommendations.</a:t>
             </a:r>
             <a:endParaRPr lang="en-US" sz="2400" dirty="0"/>
           </a:p>
         </p:txBody>
       </p:sp>
-      <p:pic>
-        <p:nvPicPr>
-          <p:cNvPr id="2" name="Picture 1">
-            <a:extLst>
-              <a:ext uri="{FF2B5EF4-FFF2-40B4-BE49-F238E27FC236}">
-                <a16:creationId xmlns:a16="http://schemas.microsoft.com/office/drawing/2014/main" id="{D57817D0-46FA-4B7D-9A2A-720A7BC6A431}"/>
-              </a:ext>
-            </a:extLst>
-          </p:cNvPr>
-          <p:cNvPicPr>
-            <a:picLocks noChangeAspect="1"/>
-          </p:cNvPicPr>
-          <p:nvPr/>
-        </p:nvPicPr>
-        <p:blipFill>
-          <a:blip r:embed="rId10"/>
-          <a:stretch>
-            <a:fillRect/>
-          </a:stretch>
-        </p:blipFill>
-        <p:spPr>
-          <a:xfrm>
-            <a:off x="25839503" y="6282979"/>
-            <a:ext cx="3915409" cy="2294775"/>
-          </a:xfrm>
-          <a:prstGeom prst="rect">
-            <a:avLst/>
-          </a:prstGeom>
-        </p:spPr>
-      </p:pic>
       <p:sp>
         <p:nvSpPr>
           <p:cNvPr id="57" name="Textfeld 78">
@@ -4818,8 +4788,8 @@
         </p:nvSpPr>
         <p:spPr>
           <a:xfrm>
-            <a:off x="20699998" y="8621048"/>
-            <a:ext cx="5084591" cy="2308324"/>
+            <a:off x="20726684" y="7835613"/>
+            <a:ext cx="5339883" cy="1938992"/>
           </a:xfrm>
           <a:prstGeom prst="rect">
             <a:avLst/>
@@ -4839,7 +4809,7 @@
             </a:r>
             <a:r>
               <a:rPr lang="et-EE" sz="2400" dirty="0"/>
-              <a:t>– It’s the only system that isn’t using your ratings. It recommends you movies that have recieved good ratings wring many people, have recieved many critics and reviews and are popular in general.</a:t>
+              <a:t>– It’s the only system that isn’t using your ratings. It recommends movies that have recieved good ratings from many people, many critics, many reviews and are popular in general.</a:t>
             </a:r>
             <a:endParaRPr lang="en-US" sz="2400" dirty="0"/>
           </a:p>
@@ -4859,8 +4829,8 @@
         </p:nvSpPr>
         <p:spPr>
           <a:xfrm>
-            <a:off x="20699998" y="10971544"/>
-            <a:ext cx="5084591" cy="1569660"/>
+            <a:off x="20694755" y="9846555"/>
+            <a:ext cx="5371812" cy="1569660"/>
           </a:xfrm>
           <a:prstGeom prst="rect">
             <a:avLst/>
@@ -4900,8 +4870,8 @@
         </p:nvSpPr>
         <p:spPr>
           <a:xfrm>
-            <a:off x="20699998" y="12710777"/>
-            <a:ext cx="5084591" cy="1938992"/>
+            <a:off x="20699997" y="11602517"/>
+            <a:ext cx="5366569" cy="1938992"/>
           </a:xfrm>
           <a:prstGeom prst="rect">
             <a:avLst/>
@@ -4921,7 +4891,7 @@
             </a:r>
             <a:r>
               <a:rPr lang="et-EE" sz="2400" dirty="0"/>
-              <a:t>– It’s recommending you movies based on genres. Movies with genres that you have given better ratings than other genres will come up in the top with this system.</a:t>
+              <a:t>– It’s recommending movies based on genres. Movies with genres that you have given better ratings than other genres will come up in the top with this system.</a:t>
             </a:r>
             <a:endParaRPr lang="en-US" sz="2400" dirty="0"/>
           </a:p>
@@ -4942,45 +4912,15 @@
           <p:nvPr/>
         </p:nvPicPr>
         <p:blipFill>
-          <a:blip r:embed="rId11"/>
+          <a:blip r:embed="rId10"/>
           <a:stretch>
             <a:fillRect/>
           </a:stretch>
         </p:blipFill>
         <p:spPr>
           <a:xfrm>
-            <a:off x="25784590" y="10963769"/>
-            <a:ext cx="3970322" cy="1611832"/>
-          </a:xfrm>
-          <a:prstGeom prst="rect">
-            <a:avLst/>
-          </a:prstGeom>
-        </p:spPr>
-      </p:pic>
-      <p:pic>
-        <p:nvPicPr>
-          <p:cNvPr id="9" name="Picture 8">
-            <a:extLst>
-              <a:ext uri="{FF2B5EF4-FFF2-40B4-BE49-F238E27FC236}">
-                <a16:creationId xmlns:a16="http://schemas.microsoft.com/office/drawing/2014/main" id="{D04A824F-5495-49FC-B749-8C60AD2D9A4B}"/>
-              </a:ext>
-            </a:extLst>
-          </p:cNvPr>
-          <p:cNvPicPr>
-            <a:picLocks noChangeAspect="1"/>
-          </p:cNvPicPr>
-          <p:nvPr/>
-        </p:nvPicPr>
-        <p:blipFill>
-          <a:blip r:embed="rId12"/>
-          <a:stretch>
-            <a:fillRect/>
-          </a:stretch>
-        </p:blipFill>
-        <p:spPr>
-          <a:xfrm>
-            <a:off x="25865879" y="8701015"/>
-            <a:ext cx="3889033" cy="1944517"/>
+            <a:off x="26098498" y="9955428"/>
+            <a:ext cx="3656414" cy="1513495"/>
           </a:xfrm>
           <a:prstGeom prst="rect">
             <a:avLst/>
@@ -5002,15 +4942,15 @@
           <p:nvPr/>
         </p:nvPicPr>
         <p:blipFill>
-          <a:blip r:embed="rId13"/>
+          <a:blip r:embed="rId11"/>
           <a:stretch>
             <a:fillRect/>
           </a:stretch>
         </p:blipFill>
         <p:spPr>
           <a:xfrm>
-            <a:off x="25784589" y="15025094"/>
-            <a:ext cx="3970323" cy="1843845"/>
+            <a:off x="26103017" y="13689828"/>
+            <a:ext cx="3688345" cy="1712892"/>
           </a:xfrm>
           <a:prstGeom prst="rect">
             <a:avLst/>
@@ -5032,15 +4972,15 @@
           <p:nvPr/>
         </p:nvPicPr>
         <p:blipFill>
-          <a:blip r:embed="rId14"/>
+          <a:blip r:embed="rId12"/>
           <a:stretch>
             <a:fillRect/>
           </a:stretch>
         </p:blipFill>
         <p:spPr>
           <a:xfrm>
-            <a:off x="25784589" y="12770035"/>
-            <a:ext cx="3970323" cy="1859014"/>
+            <a:off x="26103017" y="11708521"/>
+            <a:ext cx="3688345" cy="1726984"/>
           </a:xfrm>
           <a:prstGeom prst="rect">
             <a:avLst/>
@@ -5061,8 +5001,8 @@
         </p:nvSpPr>
         <p:spPr>
           <a:xfrm>
-            <a:off x="20771679" y="14935336"/>
-            <a:ext cx="4939189" cy="1938992"/>
+            <a:off x="20694755" y="13541509"/>
+            <a:ext cx="5371811" cy="2308324"/>
           </a:xfrm>
           <a:prstGeom prst="rect">
             <a:avLst/>
@@ -5081,11 +5021,244 @@
             </a:r>
             <a:r>
               <a:rPr lang="et-EE" sz="2400" dirty="0"/>
-              <a:t>– it’s recommending you movies based on it’s story content. There are avilable keywords for every movie and this system recommends movies with similar story keywords</a:t>
-            </a:r>
-          </a:p>
-        </p:txBody>
-      </p:sp>
+              <a:t>– it’s recommending movies based on it’s story. In the data, there are avilable keywords for every movie and this system recommends movies with similar keywords that have been liked by the user before.</a:t>
+            </a:r>
+          </a:p>
+        </p:txBody>
+      </p:sp>
+      <p:sp>
+        <p:nvSpPr>
+          <p:cNvPr id="3" name="Rectangle 2">
+            <a:extLst>
+              <a:ext uri="{FF2B5EF4-FFF2-40B4-BE49-F238E27FC236}">
+                <a16:creationId xmlns:a16="http://schemas.microsoft.com/office/drawing/2014/main" id="{215CEC20-F4D0-425E-89CD-FCBEF80243F1}"/>
+              </a:ext>
+            </a:extLst>
+          </p:cNvPr>
+          <p:cNvSpPr/>
+          <p:nvPr/>
+        </p:nvSpPr>
+        <p:spPr>
+          <a:xfrm>
+            <a:off x="20694755" y="18264429"/>
+            <a:ext cx="4260745" cy="1569660"/>
+          </a:xfrm>
+          <a:prstGeom prst="rect">
+            <a:avLst/>
+          </a:prstGeom>
+        </p:spPr>
+        <p:txBody>
+          <a:bodyPr wrap="square">
+            <a:spAutoFit/>
+          </a:bodyPr>
+          <a:lstStyle/>
+          <a:p>
+            <a:pPr algn="just"/>
+            <a:r>
+              <a:rPr lang="et-EE" sz="2400" b="1" dirty="0"/>
+              <a:t>General system </a:t>
+            </a:r>
+            <a:r>
+              <a:rPr lang="et-EE" sz="2400" dirty="0"/>
+              <a:t>uses all previous systems with self defined weights for every systems’s score.</a:t>
+            </a:r>
+          </a:p>
+        </p:txBody>
+      </p:sp>
+      <p:sp>
+        <p:nvSpPr>
+          <p:cNvPr id="12" name="Rectangle 11">
+            <a:extLst>
+              <a:ext uri="{FF2B5EF4-FFF2-40B4-BE49-F238E27FC236}">
+                <a16:creationId xmlns:a16="http://schemas.microsoft.com/office/drawing/2014/main" id="{69FCAF59-702E-4CF2-8F08-91A9C5B7C186}"/>
+              </a:ext>
+            </a:extLst>
+          </p:cNvPr>
+          <p:cNvSpPr/>
+          <p:nvPr/>
+        </p:nvSpPr>
+        <p:spPr>
+          <a:xfrm>
+            <a:off x="20720244" y="15849833"/>
+            <a:ext cx="5320832" cy="1938992"/>
+          </a:xfrm>
+          <a:prstGeom prst="rect">
+            <a:avLst/>
+          </a:prstGeom>
+        </p:spPr>
+        <p:txBody>
+          <a:bodyPr wrap="square">
+            <a:spAutoFit/>
+          </a:bodyPr>
+          <a:lstStyle/>
+          <a:p>
+            <a:pPr algn="just"/>
+            <a:r>
+              <a:rPr lang="et-EE" sz="2400" b="1" dirty="0"/>
+              <a:t>System 5 </a:t>
+            </a:r>
+            <a:r>
+              <a:rPr lang="et-EE" sz="2400" dirty="0"/>
+              <a:t>– This recommender system will find other people who have been rating movies in commn way like you and then recommends movies that the similar persons have liked.</a:t>
+            </a:r>
+            <a:endParaRPr lang="et-EE" dirty="0"/>
+          </a:p>
+        </p:txBody>
+      </p:sp>
+      <p:sp>
+        <p:nvSpPr>
+          <p:cNvPr id="18" name="Rectangle 17">
+            <a:extLst>
+              <a:ext uri="{FF2B5EF4-FFF2-40B4-BE49-F238E27FC236}">
+                <a16:creationId xmlns:a16="http://schemas.microsoft.com/office/drawing/2014/main" id="{BFAD8F58-CE33-4FC5-8B5D-E82B6001C706}"/>
+              </a:ext>
+            </a:extLst>
+          </p:cNvPr>
+          <p:cNvSpPr/>
+          <p:nvPr/>
+        </p:nvSpPr>
+        <p:spPr>
+          <a:xfrm>
+            <a:off x="20178812" y="20725805"/>
+            <a:ext cx="3876860" cy="461665"/>
+          </a:xfrm>
+          <a:prstGeom prst="rect">
+            <a:avLst/>
+          </a:prstGeom>
+        </p:spPr>
+        <p:txBody>
+          <a:bodyPr wrap="square">
+            <a:spAutoFit/>
+          </a:bodyPr>
+          <a:lstStyle/>
+          <a:p>
+            <a:r>
+              <a:rPr lang="et-EE" sz="2400" i="1" dirty="0"/>
+              <a:t>Marielle Egert, Andreas Bau</a:t>
+            </a:r>
+          </a:p>
+        </p:txBody>
+      </p:sp>
+      <p:pic>
+        <p:nvPicPr>
+          <p:cNvPr id="19" name="Picture 18">
+            <a:extLst>
+              <a:ext uri="{FF2B5EF4-FFF2-40B4-BE49-F238E27FC236}">
+                <a16:creationId xmlns:a16="http://schemas.microsoft.com/office/drawing/2014/main" id="{C0A82C56-B1CD-46D3-891E-49CF5E4A589A}"/>
+              </a:ext>
+            </a:extLst>
+          </p:cNvPr>
+          <p:cNvPicPr>
+            <a:picLocks noChangeAspect="1"/>
+          </p:cNvPicPr>
+          <p:nvPr/>
+        </p:nvPicPr>
+        <p:blipFill>
+          <a:blip r:embed="rId13"/>
+          <a:stretch>
+            <a:fillRect/>
+          </a:stretch>
+        </p:blipFill>
+        <p:spPr>
+          <a:xfrm>
+            <a:off x="26098498" y="15802458"/>
+            <a:ext cx="3692864" cy="1647956"/>
+          </a:xfrm>
+          <a:prstGeom prst="rect">
+            <a:avLst/>
+          </a:prstGeom>
+        </p:spPr>
+      </p:pic>
+      <p:pic>
+        <p:nvPicPr>
+          <p:cNvPr id="21" name="Picture 20">
+            <a:extLst>
+              <a:ext uri="{FF2B5EF4-FFF2-40B4-BE49-F238E27FC236}">
+                <a16:creationId xmlns:a16="http://schemas.microsoft.com/office/drawing/2014/main" id="{5AFFACE8-E5C8-4B9B-A582-3EE03F3C4AD7}"/>
+              </a:ext>
+            </a:extLst>
+          </p:cNvPr>
+          <p:cNvPicPr>
+            <a:picLocks noChangeAspect="1"/>
+          </p:cNvPicPr>
+          <p:nvPr/>
+        </p:nvPicPr>
+        <p:blipFill>
+          <a:blip r:embed="rId14"/>
+          <a:stretch>
+            <a:fillRect/>
+          </a:stretch>
+        </p:blipFill>
+        <p:spPr>
+          <a:xfrm>
+            <a:off x="25050750" y="17489817"/>
+            <a:ext cx="4704162" cy="3098228"/>
+          </a:xfrm>
+          <a:prstGeom prst="rect">
+            <a:avLst/>
+          </a:prstGeom>
+        </p:spPr>
+      </p:pic>
+      <p:pic>
+        <p:nvPicPr>
+          <p:cNvPr id="28" name="Picture 27">
+            <a:extLst>
+              <a:ext uri="{FF2B5EF4-FFF2-40B4-BE49-F238E27FC236}">
+                <a16:creationId xmlns:a16="http://schemas.microsoft.com/office/drawing/2014/main" id="{46842DDC-11D8-44D3-B005-A1F8B317DA2E}"/>
+              </a:ext>
+            </a:extLst>
+          </p:cNvPr>
+          <p:cNvPicPr>
+            <a:picLocks noChangeAspect="1"/>
+          </p:cNvPicPr>
+          <p:nvPr/>
+        </p:nvPicPr>
+        <p:blipFill>
+          <a:blip r:embed="rId15"/>
+          <a:stretch>
+            <a:fillRect/>
+          </a:stretch>
+        </p:blipFill>
+        <p:spPr>
+          <a:xfrm>
+            <a:off x="26130430" y="5444860"/>
+            <a:ext cx="3584810" cy="2476778"/>
+          </a:xfrm>
+          <a:prstGeom prst="rect">
+            <a:avLst/>
+          </a:prstGeom>
+        </p:spPr>
+      </p:pic>
+      <p:pic>
+        <p:nvPicPr>
+          <p:cNvPr id="30" name="Picture 29">
+            <a:extLst>
+              <a:ext uri="{FF2B5EF4-FFF2-40B4-BE49-F238E27FC236}">
+                <a16:creationId xmlns:a16="http://schemas.microsoft.com/office/drawing/2014/main" id="{281B1CEB-4F96-490D-BDA3-B49B1DE0CA17}"/>
+              </a:ext>
+            </a:extLst>
+          </p:cNvPr>
+          <p:cNvPicPr>
+            <a:picLocks noChangeAspect="1"/>
+          </p:cNvPicPr>
+          <p:nvPr/>
+        </p:nvPicPr>
+        <p:blipFill>
+          <a:blip r:embed="rId16"/>
+          <a:stretch>
+            <a:fillRect/>
+          </a:stretch>
+        </p:blipFill>
+        <p:spPr>
+          <a:xfrm>
+            <a:off x="26130430" y="8027117"/>
+            <a:ext cx="3619436" cy="1822832"/>
+          </a:xfrm>
+          <a:prstGeom prst="rect">
+            <a:avLst/>
+          </a:prstGeom>
+        </p:spPr>
+      </p:pic>
     </p:spTree>
     <p:extLst>
       <p:ext uri="{BB962C8B-B14F-4D97-AF65-F5344CB8AC3E}">

</xml_diff>